<commit_message>
Created component file and welcome message
Welcome component created - version 1
</commit_message>
<xml_diff>
--- a/022_91893+_+91897+Documentation.pptx
+++ b/022_91893+_+91897+Documentation.pptx
@@ -269,13 +269,98 @@
 <file path=ppt/revisionInfo.xml><?xml version="1.0" encoding="utf-8"?>
 <p1510:revInfo xmlns:a="http://schemas.openxmlformats.org/drawingml/2006/main" xmlns:r="http://schemas.openxmlformats.org/officeDocument/2006/relationships" xmlns:p1510="http://schemas.microsoft.com/office/powerpoint/2015/10/main">
   <p1510:revLst>
-    <p1510:client id="{4F71BE14-C53D-0861-4E1D-406D0C4E55B4}" v="10" dt="2022-02-05T23:55:44.511"/>
+    <p1510:client id="{A4AAC254-D7E0-4DF8-8DE4-52E7473F4233}" v="2" dt="2022-02-09T23:21:55.589"/>
   </p1510:revLst>
 </p1510:revInfo>
 </file>
 
 <file path=ppt/changesInfos/changesInfo1.xml><?xml version="1.0" encoding="utf-8"?>
 <pc:chgInfo xmlns:a="http://schemas.openxmlformats.org/drawingml/2006/main" xmlns:r="http://schemas.openxmlformats.org/officeDocument/2006/relationships" xmlns:ac="http://schemas.microsoft.com/office/drawing/2013/main/command" xmlns:pc="http://schemas.microsoft.com/office/powerpoint/2013/main/command">
+  <pc:docChgLst>
+    <pc:chgData name="Jodek" userId="e5b00c06eb42c71a" providerId="LiveId" clId="{A4AAC254-D7E0-4DF8-8DE4-52E7473F4233}"/>
+    <pc:docChg chg="modSld">
+      <pc:chgData name="Jodek" userId="e5b00c06eb42c71a" providerId="LiveId" clId="{A4AAC254-D7E0-4DF8-8DE4-52E7473F4233}" dt="2022-02-15T12:14:11.714" v="24" actId="1076"/>
+      <pc:docMkLst>
+        <pc:docMk/>
+      </pc:docMkLst>
+      <pc:sldChg chg="modSp mod">
+        <pc:chgData name="Jodek" userId="e5b00c06eb42c71a" providerId="LiveId" clId="{A4AAC254-D7E0-4DF8-8DE4-52E7473F4233}" dt="2022-02-09T23:20:42.072" v="1" actId="20577"/>
+        <pc:sldMkLst>
+          <pc:docMk/>
+          <pc:sldMk cId="0" sldId="256"/>
+        </pc:sldMkLst>
+        <pc:spChg chg="mod">
+          <ac:chgData name="Jodek" userId="e5b00c06eb42c71a" providerId="LiveId" clId="{A4AAC254-D7E0-4DF8-8DE4-52E7473F4233}" dt="2022-02-09T23:20:42.072" v="1" actId="20577"/>
+          <ac:spMkLst>
+            <pc:docMk/>
+            <pc:sldMk cId="0" sldId="256"/>
+            <ac:spMk id="55" creationId="{00000000-0000-0000-0000-000000000000}"/>
+          </ac:spMkLst>
+        </pc:spChg>
+      </pc:sldChg>
+      <pc:sldChg chg="addSp modSp mod">
+        <pc:chgData name="Jodek" userId="e5b00c06eb42c71a" providerId="LiveId" clId="{A4AAC254-D7E0-4DF8-8DE4-52E7473F4233}" dt="2022-02-09T23:24:19.614" v="4" actId="1076"/>
+        <pc:sldMkLst>
+          <pc:docMk/>
+          <pc:sldMk cId="0" sldId="258"/>
+        </pc:sldMkLst>
+        <pc:picChg chg="add mod">
+          <ac:chgData name="Jodek" userId="e5b00c06eb42c71a" providerId="LiveId" clId="{A4AAC254-D7E0-4DF8-8DE4-52E7473F4233}" dt="2022-02-09T23:24:19.614" v="4" actId="1076"/>
+          <ac:picMkLst>
+            <pc:docMk/>
+            <pc:sldMk cId="0" sldId="258"/>
+            <ac:picMk id="3" creationId="{2CCC78B3-179D-497A-996F-3F48BC7AB0B9}"/>
+          </ac:picMkLst>
+        </pc:picChg>
+      </pc:sldChg>
+      <pc:sldChg chg="addSp modSp mod">
+        <pc:chgData name="Jodek" userId="e5b00c06eb42c71a" providerId="LiveId" clId="{A4AAC254-D7E0-4DF8-8DE4-52E7473F4233}" dt="2022-02-15T12:09:47.108" v="7" actId="1076"/>
+        <pc:sldMkLst>
+          <pc:docMk/>
+          <pc:sldMk cId="0" sldId="259"/>
+        </pc:sldMkLst>
+        <pc:picChg chg="add mod">
+          <ac:chgData name="Jodek" userId="e5b00c06eb42c71a" providerId="LiveId" clId="{A4AAC254-D7E0-4DF8-8DE4-52E7473F4233}" dt="2022-02-15T12:09:47.108" v="7" actId="1076"/>
+          <ac:picMkLst>
+            <pc:docMk/>
+            <pc:sldMk cId="0" sldId="259"/>
+            <ac:picMk id="3" creationId="{C3F9201F-1FB7-46F9-8596-88E82D665E13}"/>
+          </ac:picMkLst>
+        </pc:picChg>
+      </pc:sldChg>
+      <pc:sldChg chg="addSp modSp mod">
+        <pc:chgData name="Jodek" userId="e5b00c06eb42c71a" providerId="LiveId" clId="{A4AAC254-D7E0-4DF8-8DE4-52E7473F4233}" dt="2022-02-15T12:14:11.714" v="24" actId="1076"/>
+        <pc:sldMkLst>
+          <pc:docMk/>
+          <pc:sldMk cId="0" sldId="260"/>
+        </pc:sldMkLst>
+        <pc:graphicFrameChg chg="mod modGraphic">
+          <ac:chgData name="Jodek" userId="e5b00c06eb42c71a" providerId="LiveId" clId="{A4AAC254-D7E0-4DF8-8DE4-52E7473F4233}" dt="2022-02-15T12:10:10.160" v="13" actId="1076"/>
+          <ac:graphicFrameMkLst>
+            <pc:docMk/>
+            <pc:sldMk cId="0" sldId="260"/>
+            <ac:graphicFrameMk id="79" creationId="{00000000-0000-0000-0000-000000000000}"/>
+          </ac:graphicFrameMkLst>
+        </pc:graphicFrameChg>
+        <pc:picChg chg="add mod">
+          <ac:chgData name="Jodek" userId="e5b00c06eb42c71a" providerId="LiveId" clId="{A4AAC254-D7E0-4DF8-8DE4-52E7473F4233}" dt="2022-02-15T12:13:37.062" v="17" actId="1076"/>
+          <ac:picMkLst>
+            <pc:docMk/>
+            <pc:sldMk cId="0" sldId="260"/>
+            <ac:picMk id="3" creationId="{B11CD947-7C10-4B99-A015-CCFFE01D9548}"/>
+          </ac:picMkLst>
+        </pc:picChg>
+        <pc:picChg chg="add mod">
+          <ac:chgData name="Jodek" userId="e5b00c06eb42c71a" providerId="LiveId" clId="{A4AAC254-D7E0-4DF8-8DE4-52E7473F4233}" dt="2022-02-15T12:14:11.714" v="24" actId="1076"/>
+          <ac:picMkLst>
+            <pc:docMk/>
+            <pc:sldMk cId="0" sldId="260"/>
+            <ac:picMk id="5" creationId="{9D4A9542-99CE-4F84-963F-79DBE7959CED}"/>
+          </ac:picMkLst>
+        </pc:picChg>
+      </pc:sldChg>
+    </pc:docChg>
+  </pc:docChgLst>
   <pc:docChgLst>
     <pc:chgData name="Mark Glasse" userId="S::m.glasse@sanctamaria.school.nz::4001b6f1-9796-4fe4-a857-9145db2b6168" providerId="AD" clId="Web-{4F71BE14-C53D-0861-4E1D-406D0C4E55B4}"/>
     <pc:docChg chg="modSld">
@@ -6405,23 +6490,24 @@
                   <a:srgbClr val="274E13"/>
                 </a:solidFill>
               </a:rPr>
-              <a:t>Link to </a:t>
+              <a:t>Link to github Repository: </a:t>
             </a:r>
             <a:r>
-              <a:rPr lang="en" sz="2000" b="1" dirty="0" err="1">
+              <a:rPr lang="en-NZ" sz="2000" b="1" dirty="0">
+                <a:solidFill>
+                  <a:srgbClr val="274E13"/>
+                </a:solidFill>
+                <a:hlinkClick r:id="rId3"/>
+              </a:rPr>
+              <a:t>https://github.com/Joemamasahbsdh/pizza.bot</a:t>
+            </a:r>
+            <a:r>
+              <a:rPr lang="en-NZ" sz="2000" b="1" dirty="0">
                 <a:solidFill>
                   <a:srgbClr val="274E13"/>
                 </a:solidFill>
               </a:rPr>
-              <a:t>github</a:t>
-            </a:r>
-            <a:r>
-              <a:rPr lang="en" sz="2000" b="1" dirty="0">
-                <a:solidFill>
-                  <a:srgbClr val="274E13"/>
-                </a:solidFill>
-              </a:rPr>
-              <a:t> Repository: </a:t>
+              <a:t> </a:t>
             </a:r>
             <a:endParaRPr sz="2000" b="1" dirty="0">
               <a:solidFill>
@@ -6447,7 +6533,7 @@
               <a:buFont typeface="Arial"/>
               <a:buNone/>
             </a:pPr>
-            <a:endParaRPr sz="2000">
+            <a:endParaRPr sz="2000" dirty="0">
               <a:solidFill>
                 <a:srgbClr val="274E13"/>
               </a:solidFill>
@@ -6477,23 +6563,16 @@
                   <a:srgbClr val="274E13"/>
                 </a:solidFill>
               </a:rPr>
-              <a:t>Links to </a:t>
+              <a:t>Links to trello board / project management tools:</a:t>
             </a:r>
             <a:r>
-              <a:rPr lang="en" sz="2000" b="1" dirty="0" err="1">
+              <a:rPr lang="en-NZ" sz="2000" b="1" dirty="0">
                 <a:solidFill>
                   <a:srgbClr val="274E13"/>
                 </a:solidFill>
+                <a:hlinkClick r:id="rId4"/>
               </a:rPr>
-              <a:t>trello</a:t>
-            </a:r>
-            <a:r>
-              <a:rPr lang="en" sz="2000" b="1" dirty="0">
-                <a:solidFill>
-                  <a:srgbClr val="274E13"/>
-                </a:solidFill>
-              </a:rPr>
-              <a:t> board / project management tools:</a:t>
+              <a:t>Trello</a:t>
             </a:r>
             <a:endParaRPr sz="2000" dirty="0"/>
           </a:p>
@@ -6853,6 +6932,36 @@
           </a:p>
         </p:txBody>
       </p:sp>
+      <p:pic>
+        <p:nvPicPr>
+          <p:cNvPr id="3" name="Picture 2">
+            <a:extLst>
+              <a:ext uri="{FF2B5EF4-FFF2-40B4-BE49-F238E27FC236}">
+                <a16:creationId xmlns:a16="http://schemas.microsoft.com/office/drawing/2014/main" id="{2CCC78B3-179D-497A-996F-3F48BC7AB0B9}"/>
+              </a:ext>
+            </a:extLst>
+          </p:cNvPr>
+          <p:cNvPicPr>
+            <a:picLocks noChangeAspect="1"/>
+          </p:cNvPicPr>
+          <p:nvPr/>
+        </p:nvPicPr>
+        <p:blipFill>
+          <a:blip r:embed="rId3"/>
+          <a:stretch>
+            <a:fillRect/>
+          </a:stretch>
+        </p:blipFill>
+        <p:spPr>
+          <a:xfrm>
+            <a:off x="2048256" y="2468025"/>
+            <a:ext cx="5047488" cy="2514873"/>
+          </a:xfrm>
+          <a:prstGeom prst="rect">
+            <a:avLst/>
+          </a:prstGeom>
+        </p:spPr>
+      </p:pic>
     </p:spTree>
   </p:cSld>
   <p:clrMapOvr>
@@ -6928,6 +7037,36 @@
           </a:p>
         </p:txBody>
       </p:sp>
+      <p:pic>
+        <p:nvPicPr>
+          <p:cNvPr id="3" name="Picture 2">
+            <a:extLst>
+              <a:ext uri="{FF2B5EF4-FFF2-40B4-BE49-F238E27FC236}">
+                <a16:creationId xmlns:a16="http://schemas.microsoft.com/office/drawing/2014/main" id="{C3F9201F-1FB7-46F9-8596-88E82D665E13}"/>
+              </a:ext>
+            </a:extLst>
+          </p:cNvPr>
+          <p:cNvPicPr>
+            <a:picLocks noChangeAspect="1"/>
+          </p:cNvPicPr>
+          <p:nvPr/>
+        </p:nvPicPr>
+        <p:blipFill>
+          <a:blip r:embed="rId3"/>
+          <a:stretch>
+            <a:fillRect/>
+          </a:stretch>
+        </p:blipFill>
+        <p:spPr>
+          <a:xfrm>
+            <a:off x="417442" y="1017725"/>
+            <a:ext cx="7832035" cy="3669868"/>
+          </a:xfrm>
+          <a:prstGeom prst="rect">
+            <a:avLst/>
+          </a:prstGeom>
+        </p:spPr>
+      </p:pic>
     </p:spTree>
   </p:cSld>
   <p:clrMapOvr>
@@ -6999,10 +7138,16 @@
         <p:nvGraphicFramePr>
           <p:cNvPr id="79" name="Google Shape;79;p17"/>
           <p:cNvGraphicFramePr/>
-          <p:nvPr/>
+          <p:nvPr>
+            <p:extLst>
+              <p:ext uri="{D42A27DB-BD31-4B8C-83A1-F6EECF244321}">
+                <p14:modId xmlns:p14="http://schemas.microsoft.com/office/powerpoint/2010/main" val="1786980145"/>
+              </p:ext>
+            </p:extLst>
+          </p:nvPr>
         </p:nvGraphicFramePr>
         <p:xfrm>
-          <a:off x="382475" y="1267725"/>
+          <a:off x="411091" y="3913302"/>
           <a:ext cx="8520600" cy="914340"/>
         </p:xfrm>
         <a:graphic>
@@ -7028,7 +7173,7 @@
                   </a:extLst>
                 </a:gridCol>
               </a:tblGrid>
-              <a:tr h="381000">
+              <a:tr h="0">
                 <a:tc>
                   <a:txBody>
                     <a:bodyPr/>
@@ -7044,10 +7189,10 @@
                         <a:buNone/>
                       </a:pPr>
                       <a:r>
-                        <a:rPr lang="en" sz="1800" b="1"/>
+                        <a:rPr lang="en" sz="1800" b="1" dirty="0"/>
                         <a:t>Test Case</a:t>
                       </a:r>
-                      <a:endParaRPr sz="1800" b="1"/>
+                      <a:endParaRPr sz="1800" b="1" dirty="0"/>
                     </a:p>
                   </a:txBody>
                   <a:tcPr marL="91425" marR="91425" marT="91425" marB="91425">
@@ -7104,7 +7249,7 @@
                         </a:spcAft>
                         <a:buNone/>
                       </a:pPr>
-                      <a:endParaRPr sz="1800"/>
+                      <a:endParaRPr sz="1800" dirty="0"/>
                     </a:p>
                   </a:txBody>
                   <a:tcPr marL="91425" marR="91425" marT="91425" marB="91425"/>
@@ -7123,7 +7268,7 @@
                         </a:spcAft>
                         <a:buNone/>
                       </a:pPr>
-                      <a:endParaRPr sz="1800"/>
+                      <a:endParaRPr sz="1800" dirty="0"/>
                     </a:p>
                   </a:txBody>
                   <a:tcPr marL="91425" marR="91425" marT="91425" marB="91425"/>
@@ -7138,6 +7283,66 @@
           </a:graphicData>
         </a:graphic>
       </p:graphicFrame>
+      <p:pic>
+        <p:nvPicPr>
+          <p:cNvPr id="3" name="Picture 2">
+            <a:extLst>
+              <a:ext uri="{FF2B5EF4-FFF2-40B4-BE49-F238E27FC236}">
+                <a16:creationId xmlns:a16="http://schemas.microsoft.com/office/drawing/2014/main" id="{B11CD947-7C10-4B99-A015-CCFFE01D9548}"/>
+              </a:ext>
+            </a:extLst>
+          </p:cNvPr>
+          <p:cNvPicPr>
+            <a:picLocks noChangeAspect="1"/>
+          </p:cNvPicPr>
+          <p:nvPr/>
+        </p:nvPicPr>
+        <p:blipFill>
+          <a:blip r:embed="rId3"/>
+          <a:stretch>
+            <a:fillRect/>
+          </a:stretch>
+        </p:blipFill>
+        <p:spPr>
+          <a:xfrm>
+            <a:off x="212309" y="1017725"/>
+            <a:ext cx="4119564" cy="1766888"/>
+          </a:xfrm>
+          <a:prstGeom prst="rect">
+            <a:avLst/>
+          </a:prstGeom>
+        </p:spPr>
+      </p:pic>
+      <p:pic>
+        <p:nvPicPr>
+          <p:cNvPr id="5" name="Picture 4">
+            <a:extLst>
+              <a:ext uri="{FF2B5EF4-FFF2-40B4-BE49-F238E27FC236}">
+                <a16:creationId xmlns:a16="http://schemas.microsoft.com/office/drawing/2014/main" id="{9D4A9542-99CE-4F84-963F-79DBE7959CED}"/>
+              </a:ext>
+            </a:extLst>
+          </p:cNvPr>
+          <p:cNvPicPr>
+            <a:picLocks noChangeAspect="1"/>
+          </p:cNvPicPr>
+          <p:nvPr/>
+        </p:nvPicPr>
+        <p:blipFill>
+          <a:blip r:embed="rId4"/>
+          <a:stretch>
+            <a:fillRect/>
+          </a:stretch>
+        </p:blipFill>
+        <p:spPr>
+          <a:xfrm>
+            <a:off x="4522304" y="1343075"/>
+            <a:ext cx="4119564" cy="1017123"/>
+          </a:xfrm>
+          <a:prstGeom prst="rect">
+            <a:avLst/>
+          </a:prstGeom>
+        </p:spPr>
+      </p:pic>
     </p:spTree>
   </p:cSld>
   <p:clrMapOvr>

</xml_diff>

<commit_message>
Created pick up or delivery menu
Created different versions of menu refining it in version 4
</commit_message>
<xml_diff>
--- a/022_91893+_+91897+Documentation.pptx
+++ b/022_91893+_+91897+Documentation.pptx
@@ -5,7 +5,7 @@
     <p:sldMasterId id="2147483659" r:id="rId1"/>
   </p:sldMasterIdLst>
   <p:notesMasterIdLst>
-    <p:notesMasterId r:id="rId12"/>
+    <p:notesMasterId r:id="rId16"/>
   </p:notesMasterIdLst>
   <p:sldIdLst>
     <p:sldId id="256" r:id="rId2"/>
@@ -15,9 +15,13 @@
     <p:sldId id="260" r:id="rId6"/>
     <p:sldId id="263" r:id="rId7"/>
     <p:sldId id="265" r:id="rId8"/>
-    <p:sldId id="264" r:id="rId9"/>
-    <p:sldId id="261" r:id="rId10"/>
-    <p:sldId id="262" r:id="rId11"/>
+    <p:sldId id="266" r:id="rId9"/>
+    <p:sldId id="264" r:id="rId10"/>
+    <p:sldId id="267" r:id="rId11"/>
+    <p:sldId id="268" r:id="rId12"/>
+    <p:sldId id="269" r:id="rId13"/>
+    <p:sldId id="261" r:id="rId14"/>
+    <p:sldId id="262" r:id="rId15"/>
   </p:sldIdLst>
   <p:sldSz cx="9144000" cy="5143500" type="screen16x9"/>
   <p:notesSz cx="6858000" cy="9144000"/>
@@ -272,7 +276,7 @@
 <file path=ppt/revisionInfo.xml><?xml version="1.0" encoding="utf-8"?>
 <p1510:revInfo xmlns:a="http://schemas.openxmlformats.org/drawingml/2006/main" xmlns:r="http://schemas.openxmlformats.org/officeDocument/2006/relationships" xmlns:p1510="http://schemas.microsoft.com/office/powerpoint/2015/10/main">
   <p1510:revLst>
-    <p1510:client id="{A4AAC254-D7E0-4DF8-8DE4-52E7473F4233}" v="5" dt="2022-02-17T10:12:12.763"/>
+    <p1510:client id="{A4AAC254-D7E0-4DF8-8DE4-52E7473F4233}" v="6" dt="2022-02-20T21:48:21.628"/>
   </p1510:revLst>
 </p1510:revInfo>
 </file>
@@ -281,8 +285,8 @@
 <pc:chgInfo xmlns:a="http://schemas.openxmlformats.org/drawingml/2006/main" xmlns:r="http://schemas.openxmlformats.org/officeDocument/2006/relationships" xmlns:ac="http://schemas.microsoft.com/office/drawing/2013/main/command" xmlns:pc="http://schemas.microsoft.com/office/powerpoint/2013/main/command">
   <pc:docChgLst>
     <pc:chgData name="Jodek" userId="e5b00c06eb42c71a" providerId="LiveId" clId="{A4AAC254-D7E0-4DF8-8DE4-52E7473F4233}"/>
-    <pc:docChg chg="custSel addSld modSld">
-      <pc:chgData name="Jodek" userId="e5b00c06eb42c71a" providerId="LiveId" clId="{A4AAC254-D7E0-4DF8-8DE4-52E7473F4233}" dt="2022-02-17T10:12:22.235" v="492" actId="20577"/>
+    <pc:docChg chg="custSel addSld modSld sldOrd">
+      <pc:chgData name="Jodek" userId="e5b00c06eb42c71a" providerId="LiveId" clId="{A4AAC254-D7E0-4DF8-8DE4-52E7473F4233}" dt="2022-02-21T22:45:06.049" v="1153" actId="1076"/>
       <pc:docMkLst>
         <pc:docMk/>
       </pc:docMkLst>
@@ -481,14 +485,14 @@
           </ac:picMkLst>
         </pc:picChg>
       </pc:sldChg>
-      <pc:sldChg chg="modSp add mod">
-        <pc:chgData name="Jodek" userId="e5b00c06eb42c71a" providerId="LiveId" clId="{A4AAC254-D7E0-4DF8-8DE4-52E7473F4233}" dt="2022-02-17T10:09:31.646" v="374" actId="14734"/>
+      <pc:sldChg chg="addSp delSp modSp add mod">
+        <pc:chgData name="Jodek" userId="e5b00c06eb42c71a" providerId="LiveId" clId="{A4AAC254-D7E0-4DF8-8DE4-52E7473F4233}" dt="2022-02-20T21:17:52.501" v="794" actId="20577"/>
         <pc:sldMkLst>
           <pc:docMk/>
           <pc:sldMk cId="3427482966" sldId="264"/>
         </pc:sldMkLst>
         <pc:spChg chg="mod">
-          <ac:chgData name="Jodek" userId="e5b00c06eb42c71a" providerId="LiveId" clId="{A4AAC254-D7E0-4DF8-8DE4-52E7473F4233}" dt="2022-02-17T10:06:13.592" v="199" actId="20577"/>
+          <ac:chgData name="Jodek" userId="e5b00c06eb42c71a" providerId="LiveId" clId="{A4AAC254-D7E0-4DF8-8DE4-52E7473F4233}" dt="2022-02-20T21:15:01.027" v="647" actId="20577"/>
           <ac:spMkLst>
             <pc:docMk/>
             <pc:sldMk cId="3427482966" sldId="264"/>
@@ -496,16 +500,40 @@
           </ac:spMkLst>
         </pc:spChg>
         <pc:graphicFrameChg chg="mod modGraphic">
-          <ac:chgData name="Jodek" userId="e5b00c06eb42c71a" providerId="LiveId" clId="{A4AAC254-D7E0-4DF8-8DE4-52E7473F4233}" dt="2022-02-17T10:09:31.646" v="374" actId="14734"/>
+          <ac:chgData name="Jodek" userId="e5b00c06eb42c71a" providerId="LiveId" clId="{A4AAC254-D7E0-4DF8-8DE4-52E7473F4233}" dt="2022-02-20T21:17:52.501" v="794" actId="20577"/>
           <ac:graphicFrameMkLst>
             <pc:docMk/>
             <pc:sldMk cId="3427482966" sldId="264"/>
             <ac:graphicFrameMk id="79" creationId="{00000000-0000-0000-0000-000000000000}"/>
           </ac:graphicFrameMkLst>
         </pc:graphicFrameChg>
+        <pc:picChg chg="del">
+          <ac:chgData name="Jodek" userId="e5b00c06eb42c71a" providerId="LiveId" clId="{A4AAC254-D7E0-4DF8-8DE4-52E7473F4233}" dt="2022-02-20T21:15:03.947" v="649" actId="478"/>
+          <ac:picMkLst>
+            <pc:docMk/>
+            <pc:sldMk cId="3427482966" sldId="264"/>
+            <ac:picMk id="3" creationId="{A6F8F1CA-4423-4F47-839D-94983EBDB959}"/>
+          </ac:picMkLst>
+        </pc:picChg>
+        <pc:picChg chg="del">
+          <ac:chgData name="Jodek" userId="e5b00c06eb42c71a" providerId="LiveId" clId="{A4AAC254-D7E0-4DF8-8DE4-52E7473F4233}" dt="2022-02-20T21:15:03.335" v="648" actId="478"/>
+          <ac:picMkLst>
+            <pc:docMk/>
+            <pc:sldMk cId="3427482966" sldId="264"/>
+            <ac:picMk id="4" creationId="{976A0231-75F0-4183-92B1-9941888C23F8}"/>
+          </ac:picMkLst>
+        </pc:picChg>
+        <pc:picChg chg="add mod">
+          <ac:chgData name="Jodek" userId="e5b00c06eb42c71a" providerId="LiveId" clId="{A4AAC254-D7E0-4DF8-8DE4-52E7473F4233}" dt="2022-02-20T21:16:15.200" v="653" actId="1076"/>
+          <ac:picMkLst>
+            <pc:docMk/>
+            <pc:sldMk cId="3427482966" sldId="264"/>
+            <ac:picMk id="5" creationId="{C25B2C43-CDCB-4690-B8A6-BB4E44298424}"/>
+          </ac:picMkLst>
+        </pc:picChg>
       </pc:sldChg>
-      <pc:sldChg chg="modSp new mod">
-        <pc:chgData name="Jodek" userId="e5b00c06eb42c71a" providerId="LiveId" clId="{A4AAC254-D7E0-4DF8-8DE4-52E7473F4233}" dt="2022-02-17T10:07:33.482" v="254" actId="20577"/>
+      <pc:sldChg chg="addSp modSp new mod">
+        <pc:chgData name="Jodek" userId="e5b00c06eb42c71a" providerId="LiveId" clId="{A4AAC254-D7E0-4DF8-8DE4-52E7473F4233}" dt="2022-02-17T11:15:15.309" v="502" actId="1076"/>
         <pc:sldMkLst>
           <pc:docMk/>
           <pc:sldMk cId="3446248947" sldId="265"/>
@@ -518,6 +546,186 @@
             <ac:spMk id="2" creationId="{C3DFE246-6269-4B71-B16A-DAFB87B63AF2}"/>
           </ac:spMkLst>
         </pc:spChg>
+        <pc:picChg chg="add mod">
+          <ac:chgData name="Jodek" userId="e5b00c06eb42c71a" providerId="LiveId" clId="{A4AAC254-D7E0-4DF8-8DE4-52E7473F4233}" dt="2022-02-17T11:15:15.309" v="502" actId="1076"/>
+          <ac:picMkLst>
+            <pc:docMk/>
+            <pc:sldMk cId="3446248947" sldId="265"/>
+            <ac:picMk id="5" creationId="{5B487D94-EF87-4D06-BB95-183998455A5F}"/>
+          </ac:picMkLst>
+        </pc:picChg>
+      </pc:sldChg>
+      <pc:sldChg chg="addSp modSp add mod ord">
+        <pc:chgData name="Jodek" userId="e5b00c06eb42c71a" providerId="LiveId" clId="{A4AAC254-D7E0-4DF8-8DE4-52E7473F4233}" dt="2022-02-20T21:18:07.704" v="796"/>
+        <pc:sldMkLst>
+          <pc:docMk/>
+          <pc:sldMk cId="2073674580" sldId="266"/>
+        </pc:sldMkLst>
+        <pc:spChg chg="mod">
+          <ac:chgData name="Jodek" userId="e5b00c06eb42c71a" providerId="LiveId" clId="{A4AAC254-D7E0-4DF8-8DE4-52E7473F4233}" dt="2022-02-17T11:07:45.246" v="499" actId="20577"/>
+          <ac:spMkLst>
+            <pc:docMk/>
+            <pc:sldMk cId="2073674580" sldId="266"/>
+            <ac:spMk id="78" creationId="{00000000-0000-0000-0000-000000000000}"/>
+          </ac:spMkLst>
+        </pc:spChg>
+        <pc:graphicFrameChg chg="modGraphic">
+          <ac:chgData name="Jodek" userId="e5b00c06eb42c71a" providerId="LiveId" clId="{A4AAC254-D7E0-4DF8-8DE4-52E7473F4233}" dt="2022-02-20T21:14:43.388" v="644" actId="20577"/>
+          <ac:graphicFrameMkLst>
+            <pc:docMk/>
+            <pc:sldMk cId="2073674580" sldId="266"/>
+            <ac:graphicFrameMk id="79" creationId="{00000000-0000-0000-0000-000000000000}"/>
+          </ac:graphicFrameMkLst>
+        </pc:graphicFrameChg>
+        <pc:picChg chg="add mod">
+          <ac:chgData name="Jodek" userId="e5b00c06eb42c71a" providerId="LiveId" clId="{A4AAC254-D7E0-4DF8-8DE4-52E7473F4233}" dt="2022-02-20T21:14:01.396" v="507" actId="1076"/>
+          <ac:picMkLst>
+            <pc:docMk/>
+            <pc:sldMk cId="2073674580" sldId="266"/>
+            <ac:picMk id="3" creationId="{23BA341E-02C3-4385-BCD0-BEFE97FE294C}"/>
+          </ac:picMkLst>
+        </pc:picChg>
+      </pc:sldChg>
+      <pc:sldChg chg="addSp delSp modSp add mod">
+        <pc:chgData name="Jodek" userId="e5b00c06eb42c71a" providerId="LiveId" clId="{A4AAC254-D7E0-4DF8-8DE4-52E7473F4233}" dt="2022-02-20T21:49:18.899" v="993" actId="20577"/>
+        <pc:sldMkLst>
+          <pc:docMk/>
+          <pc:sldMk cId="4010920224" sldId="267"/>
+        </pc:sldMkLst>
+        <pc:spChg chg="mod">
+          <ac:chgData name="Jodek" userId="e5b00c06eb42c71a" providerId="LiveId" clId="{A4AAC254-D7E0-4DF8-8DE4-52E7473F4233}" dt="2022-02-20T21:18:13.921" v="799" actId="20577"/>
+          <ac:spMkLst>
+            <pc:docMk/>
+            <pc:sldMk cId="4010920224" sldId="267"/>
+            <ac:spMk id="78" creationId="{00000000-0000-0000-0000-000000000000}"/>
+          </ac:spMkLst>
+        </pc:spChg>
+        <pc:graphicFrameChg chg="modGraphic">
+          <ac:chgData name="Jodek" userId="e5b00c06eb42c71a" providerId="LiveId" clId="{A4AAC254-D7E0-4DF8-8DE4-52E7473F4233}" dt="2022-02-20T21:49:18.899" v="993" actId="20577"/>
+          <ac:graphicFrameMkLst>
+            <pc:docMk/>
+            <pc:sldMk cId="4010920224" sldId="267"/>
+            <ac:graphicFrameMk id="79" creationId="{00000000-0000-0000-0000-000000000000}"/>
+          </ac:graphicFrameMkLst>
+        </pc:graphicFrameChg>
+        <pc:picChg chg="add mod">
+          <ac:chgData name="Jodek" userId="e5b00c06eb42c71a" providerId="LiveId" clId="{A4AAC254-D7E0-4DF8-8DE4-52E7473F4233}" dt="2022-02-20T21:25:05.909" v="810" actId="1076"/>
+          <ac:picMkLst>
+            <pc:docMk/>
+            <pc:sldMk cId="4010920224" sldId="267"/>
+            <ac:picMk id="3" creationId="{C353732A-898B-4A36-ACF6-A992F91231E8}"/>
+          </ac:picMkLst>
+        </pc:picChg>
+        <pc:picChg chg="del">
+          <ac:chgData name="Jodek" userId="e5b00c06eb42c71a" providerId="LiveId" clId="{A4AAC254-D7E0-4DF8-8DE4-52E7473F4233}" dt="2022-02-20T21:18:16.658" v="800" actId="478"/>
+          <ac:picMkLst>
+            <pc:docMk/>
+            <pc:sldMk cId="4010920224" sldId="267"/>
+            <ac:picMk id="5" creationId="{C25B2C43-CDCB-4690-B8A6-BB4E44298424}"/>
+          </ac:picMkLst>
+        </pc:picChg>
+      </pc:sldChg>
+      <pc:sldChg chg="addSp delSp modSp add mod">
+        <pc:chgData name="Jodek" userId="e5b00c06eb42c71a" providerId="LiveId" clId="{A4AAC254-D7E0-4DF8-8DE4-52E7473F4233}" dt="2022-02-20T21:48:21.628" v="960"/>
+        <pc:sldMkLst>
+          <pc:docMk/>
+          <pc:sldMk cId="2848548919" sldId="268"/>
+        </pc:sldMkLst>
+        <pc:spChg chg="mod">
+          <ac:chgData name="Jodek" userId="e5b00c06eb42c71a" providerId="LiveId" clId="{A4AAC254-D7E0-4DF8-8DE4-52E7473F4233}" dt="2022-02-20T21:18:21.785" v="803" actId="20577"/>
+          <ac:spMkLst>
+            <pc:docMk/>
+            <pc:sldMk cId="2848548919" sldId="268"/>
+            <ac:spMk id="78" creationId="{00000000-0000-0000-0000-000000000000}"/>
+          </ac:spMkLst>
+        </pc:spChg>
+        <pc:graphicFrameChg chg="mod">
+          <ac:chgData name="Jodek" userId="e5b00c06eb42c71a" providerId="LiveId" clId="{A4AAC254-D7E0-4DF8-8DE4-52E7473F4233}" dt="2022-02-20T21:48:21.628" v="960"/>
+          <ac:graphicFrameMkLst>
+            <pc:docMk/>
+            <pc:sldMk cId="2848548919" sldId="268"/>
+            <ac:graphicFrameMk id="79" creationId="{00000000-0000-0000-0000-000000000000}"/>
+          </ac:graphicFrameMkLst>
+        </pc:graphicFrameChg>
+        <pc:picChg chg="add del">
+          <ac:chgData name="Jodek" userId="e5b00c06eb42c71a" providerId="LiveId" clId="{A4AAC254-D7E0-4DF8-8DE4-52E7473F4233}" dt="2022-02-20T21:24:57.557" v="805" actId="478"/>
+          <ac:picMkLst>
+            <pc:docMk/>
+            <pc:sldMk cId="2848548919" sldId="268"/>
+            <ac:picMk id="3" creationId="{E5D3D265-EA6B-47B7-B097-AC1B81320E5B}"/>
+          </ac:picMkLst>
+        </pc:picChg>
+        <pc:picChg chg="add mod">
+          <ac:chgData name="Jodek" userId="e5b00c06eb42c71a" providerId="LiveId" clId="{A4AAC254-D7E0-4DF8-8DE4-52E7473F4233}" dt="2022-02-20T21:45:59.284" v="851" actId="1076"/>
+          <ac:picMkLst>
+            <pc:docMk/>
+            <pc:sldMk cId="2848548919" sldId="268"/>
+            <ac:picMk id="5" creationId="{93123D94-09D7-4135-8F26-C15D3FF26643}"/>
+          </ac:picMkLst>
+        </pc:picChg>
+        <pc:picChg chg="add mod">
+          <ac:chgData name="Jodek" userId="e5b00c06eb42c71a" providerId="LiveId" clId="{A4AAC254-D7E0-4DF8-8DE4-52E7473F4233}" dt="2022-02-20T21:46:36.294" v="853" actId="1076"/>
+          <ac:picMkLst>
+            <pc:docMk/>
+            <pc:sldMk cId="2848548919" sldId="268"/>
+            <ac:picMk id="7" creationId="{D5DD91E5-DBE9-4AD8-A0A9-D9BC1A49899F}"/>
+          </ac:picMkLst>
+        </pc:picChg>
+      </pc:sldChg>
+      <pc:sldChg chg="addSp delSp modSp add mod">
+        <pc:chgData name="Jodek" userId="e5b00c06eb42c71a" providerId="LiveId" clId="{A4AAC254-D7E0-4DF8-8DE4-52E7473F4233}" dt="2022-02-21T22:45:06.049" v="1153" actId="1076"/>
+        <pc:sldMkLst>
+          <pc:docMk/>
+          <pc:sldMk cId="3429537914" sldId="269"/>
+        </pc:sldMkLst>
+        <pc:spChg chg="mod">
+          <ac:chgData name="Jodek" userId="e5b00c06eb42c71a" providerId="LiveId" clId="{A4AAC254-D7E0-4DF8-8DE4-52E7473F4233}" dt="2022-02-20T21:49:30.295" v="1006" actId="20577"/>
+          <ac:spMkLst>
+            <pc:docMk/>
+            <pc:sldMk cId="3429537914" sldId="269"/>
+            <ac:spMk id="78" creationId="{00000000-0000-0000-0000-000000000000}"/>
+          </ac:spMkLst>
+        </pc:spChg>
+        <pc:graphicFrameChg chg="mod modGraphic">
+          <ac:chgData name="Jodek" userId="e5b00c06eb42c71a" providerId="LiveId" clId="{A4AAC254-D7E0-4DF8-8DE4-52E7473F4233}" dt="2022-02-21T22:43:25.176" v="1150" actId="20577"/>
+          <ac:graphicFrameMkLst>
+            <pc:docMk/>
+            <pc:sldMk cId="3429537914" sldId="269"/>
+            <ac:graphicFrameMk id="79" creationId="{00000000-0000-0000-0000-000000000000}"/>
+          </ac:graphicFrameMkLst>
+        </pc:graphicFrameChg>
+        <pc:picChg chg="add mod">
+          <ac:chgData name="Jodek" userId="e5b00c06eb42c71a" providerId="LiveId" clId="{A4AAC254-D7E0-4DF8-8DE4-52E7473F4233}" dt="2022-02-21T22:43:29.358" v="1151" actId="1076"/>
+          <ac:picMkLst>
+            <pc:docMk/>
+            <pc:sldMk cId="3429537914" sldId="269"/>
+            <ac:picMk id="3" creationId="{0451E2B8-D894-4F77-9CE0-D37B97F158E1}"/>
+          </ac:picMkLst>
+        </pc:picChg>
+        <pc:picChg chg="add mod">
+          <ac:chgData name="Jodek" userId="e5b00c06eb42c71a" providerId="LiveId" clId="{A4AAC254-D7E0-4DF8-8DE4-52E7473F4233}" dt="2022-02-21T22:45:06.049" v="1153" actId="1076"/>
+          <ac:picMkLst>
+            <pc:docMk/>
+            <pc:sldMk cId="3429537914" sldId="269"/>
+            <ac:picMk id="4" creationId="{85892AAC-E744-4241-997C-8CEA6780A04D}"/>
+          </ac:picMkLst>
+        </pc:picChg>
+        <pc:picChg chg="del">
+          <ac:chgData name="Jodek" userId="e5b00c06eb42c71a" providerId="LiveId" clId="{A4AAC254-D7E0-4DF8-8DE4-52E7473F4233}" dt="2022-02-20T21:49:26.521" v="995" actId="478"/>
+          <ac:picMkLst>
+            <pc:docMk/>
+            <pc:sldMk cId="3429537914" sldId="269"/>
+            <ac:picMk id="5" creationId="{93123D94-09D7-4135-8F26-C15D3FF26643}"/>
+          </ac:picMkLst>
+        </pc:picChg>
+        <pc:picChg chg="del">
+          <ac:chgData name="Jodek" userId="e5b00c06eb42c71a" providerId="LiveId" clId="{A4AAC254-D7E0-4DF8-8DE4-52E7473F4233}" dt="2022-02-20T21:49:26.860" v="996" actId="478"/>
+          <ac:picMkLst>
+            <pc:docMk/>
+            <pc:sldMk cId="3429537914" sldId="269"/>
+            <ac:picMk id="7" creationId="{D5DD91E5-DBE9-4AD8-A0A9-D9BC1A49899F}"/>
+          </ac:picMkLst>
+        </pc:picChg>
       </pc:sldChg>
     </pc:docChg>
   </pc:docChgLst>
@@ -1108,6 +1316,457 @@
 </p:notes>
 </file>
 
+<file path=ppt/notesSlides/notesSlide10.xml><?xml version="1.0" encoding="utf-8"?>
+<p:notes xmlns:a="http://schemas.openxmlformats.org/drawingml/2006/main" xmlns:r="http://schemas.openxmlformats.org/officeDocument/2006/relationships" xmlns:p="http://schemas.openxmlformats.org/presentationml/2006/main" showMasterSp="0" showMasterPhAnim="0">
+  <p:cSld>
+    <p:spTree>
+      <p:nvGrpSpPr>
+        <p:cNvPr id="1" name="Shape 74"/>
+        <p:cNvGrpSpPr/>
+        <p:nvPr/>
+      </p:nvGrpSpPr>
+      <p:grpSpPr>
+        <a:xfrm>
+          <a:off x="0" y="0"/>
+          <a:ext cx="0" cy="0"/>
+          <a:chOff x="0" y="0"/>
+          <a:chExt cx="0" cy="0"/>
+        </a:xfrm>
+      </p:grpSpPr>
+      <p:sp>
+        <p:nvSpPr>
+          <p:cNvPr id="75" name="Google Shape;75;gac10fef634_0_20:notes"/>
+          <p:cNvSpPr>
+            <a:spLocks noGrp="1" noRot="1" noChangeAspect="1"/>
+          </p:cNvSpPr>
+          <p:nvPr>
+            <p:ph type="sldImg" idx="2"/>
+          </p:nvPr>
+        </p:nvSpPr>
+        <p:spPr>
+          <a:xfrm>
+            <a:off x="381000" y="685800"/>
+            <a:ext cx="6096000" cy="3429000"/>
+          </a:xfrm>
+          <a:custGeom>
+            <a:avLst/>
+            <a:gdLst/>
+            <a:ahLst/>
+            <a:cxnLst/>
+            <a:rect l="l" t="t" r="r" b="b"/>
+            <a:pathLst>
+              <a:path w="120000" h="120000" extrusionOk="0">
+                <a:moveTo>
+                  <a:pt x="0" y="0"/>
+                </a:moveTo>
+                <a:lnTo>
+                  <a:pt x="120000" y="0"/>
+                </a:lnTo>
+                <a:lnTo>
+                  <a:pt x="120000" y="120000"/>
+                </a:lnTo>
+                <a:lnTo>
+                  <a:pt x="0" y="120000"/>
+                </a:lnTo>
+                <a:close/>
+              </a:path>
+            </a:pathLst>
+          </a:custGeom>
+        </p:spPr>
+      </p:sp>
+      <p:sp>
+        <p:nvSpPr>
+          <p:cNvPr id="76" name="Google Shape;76;gac10fef634_0_20:notes"/>
+          <p:cNvSpPr txBox="1">
+            <a:spLocks noGrp="1"/>
+          </p:cNvSpPr>
+          <p:nvPr>
+            <p:ph type="body" idx="1"/>
+          </p:nvPr>
+        </p:nvSpPr>
+        <p:spPr>
+          <a:xfrm>
+            <a:off x="685800" y="4343400"/>
+            <a:ext cx="5486400" cy="4114800"/>
+          </a:xfrm>
+          <a:prstGeom prst="rect">
+            <a:avLst/>
+          </a:prstGeom>
+        </p:spPr>
+        <p:txBody>
+          <a:bodyPr spcFirstLastPara="1" wrap="square" lIns="91425" tIns="91425" rIns="91425" bIns="91425" anchor="t" anchorCtr="0">
+            <a:noAutofit/>
+          </a:bodyPr>
+          <a:lstStyle/>
+          <a:p>
+            <a:pPr marL="0" lvl="0" indent="0" algn="l" rtl="0">
+              <a:spcBef>
+                <a:spcPts val="0"/>
+              </a:spcBef>
+              <a:spcAft>
+                <a:spcPts val="0"/>
+              </a:spcAft>
+              <a:buNone/>
+            </a:pPr>
+            <a:endParaRPr/>
+          </a:p>
+        </p:txBody>
+      </p:sp>
+    </p:spTree>
+    <p:extLst>
+      <p:ext uri="{BB962C8B-B14F-4D97-AF65-F5344CB8AC3E}">
+        <p14:creationId xmlns:p14="http://schemas.microsoft.com/office/powerpoint/2010/main" val="4106153214"/>
+      </p:ext>
+    </p:extLst>
+  </p:cSld>
+  <p:clrMapOvr>
+    <a:masterClrMapping/>
+  </p:clrMapOvr>
+</p:notes>
+</file>
+
+<file path=ppt/notesSlides/notesSlide11.xml><?xml version="1.0" encoding="utf-8"?>
+<p:notes xmlns:a="http://schemas.openxmlformats.org/drawingml/2006/main" xmlns:r="http://schemas.openxmlformats.org/officeDocument/2006/relationships" xmlns:p="http://schemas.openxmlformats.org/presentationml/2006/main" showMasterSp="0" showMasterPhAnim="0">
+  <p:cSld>
+    <p:spTree>
+      <p:nvGrpSpPr>
+        <p:cNvPr id="1" name="Shape 74"/>
+        <p:cNvGrpSpPr/>
+        <p:nvPr/>
+      </p:nvGrpSpPr>
+      <p:grpSpPr>
+        <a:xfrm>
+          <a:off x="0" y="0"/>
+          <a:ext cx="0" cy="0"/>
+          <a:chOff x="0" y="0"/>
+          <a:chExt cx="0" cy="0"/>
+        </a:xfrm>
+      </p:grpSpPr>
+      <p:sp>
+        <p:nvSpPr>
+          <p:cNvPr id="75" name="Google Shape;75;gac10fef634_0_20:notes"/>
+          <p:cNvSpPr>
+            <a:spLocks noGrp="1" noRot="1" noChangeAspect="1"/>
+          </p:cNvSpPr>
+          <p:nvPr>
+            <p:ph type="sldImg" idx="2"/>
+          </p:nvPr>
+        </p:nvSpPr>
+        <p:spPr>
+          <a:xfrm>
+            <a:off x="381000" y="685800"/>
+            <a:ext cx="6096000" cy="3429000"/>
+          </a:xfrm>
+          <a:custGeom>
+            <a:avLst/>
+            <a:gdLst/>
+            <a:ahLst/>
+            <a:cxnLst/>
+            <a:rect l="l" t="t" r="r" b="b"/>
+            <a:pathLst>
+              <a:path w="120000" h="120000" extrusionOk="0">
+                <a:moveTo>
+                  <a:pt x="0" y="0"/>
+                </a:moveTo>
+                <a:lnTo>
+                  <a:pt x="120000" y="0"/>
+                </a:lnTo>
+                <a:lnTo>
+                  <a:pt x="120000" y="120000"/>
+                </a:lnTo>
+                <a:lnTo>
+                  <a:pt x="0" y="120000"/>
+                </a:lnTo>
+                <a:close/>
+              </a:path>
+            </a:pathLst>
+          </a:custGeom>
+        </p:spPr>
+      </p:sp>
+      <p:sp>
+        <p:nvSpPr>
+          <p:cNvPr id="76" name="Google Shape;76;gac10fef634_0_20:notes"/>
+          <p:cNvSpPr txBox="1">
+            <a:spLocks noGrp="1"/>
+          </p:cNvSpPr>
+          <p:nvPr>
+            <p:ph type="body" idx="1"/>
+          </p:nvPr>
+        </p:nvSpPr>
+        <p:spPr>
+          <a:xfrm>
+            <a:off x="685800" y="4343400"/>
+            <a:ext cx="5486400" cy="4114800"/>
+          </a:xfrm>
+          <a:prstGeom prst="rect">
+            <a:avLst/>
+          </a:prstGeom>
+        </p:spPr>
+        <p:txBody>
+          <a:bodyPr spcFirstLastPara="1" wrap="square" lIns="91425" tIns="91425" rIns="91425" bIns="91425" anchor="t" anchorCtr="0">
+            <a:noAutofit/>
+          </a:bodyPr>
+          <a:lstStyle/>
+          <a:p>
+            <a:pPr marL="0" lvl="0" indent="0" algn="l" rtl="0">
+              <a:spcBef>
+                <a:spcPts val="0"/>
+              </a:spcBef>
+              <a:spcAft>
+                <a:spcPts val="0"/>
+              </a:spcAft>
+              <a:buNone/>
+            </a:pPr>
+            <a:endParaRPr/>
+          </a:p>
+        </p:txBody>
+      </p:sp>
+    </p:spTree>
+    <p:extLst>
+      <p:ext uri="{BB962C8B-B14F-4D97-AF65-F5344CB8AC3E}">
+        <p14:creationId xmlns:p14="http://schemas.microsoft.com/office/powerpoint/2010/main" val="1938462909"/>
+      </p:ext>
+    </p:extLst>
+  </p:cSld>
+  <p:clrMapOvr>
+    <a:masterClrMapping/>
+  </p:clrMapOvr>
+</p:notes>
+</file>
+
+<file path=ppt/notesSlides/notesSlide12.xml><?xml version="1.0" encoding="utf-8"?>
+<p:notes xmlns:a="http://schemas.openxmlformats.org/drawingml/2006/main" xmlns:r="http://schemas.openxmlformats.org/officeDocument/2006/relationships" xmlns:p="http://schemas.openxmlformats.org/presentationml/2006/main" showMasterSp="0" showMasterPhAnim="0">
+  <p:cSld>
+    <p:spTree>
+      <p:nvGrpSpPr>
+        <p:cNvPr id="1" name="Shape 80"/>
+        <p:cNvGrpSpPr/>
+        <p:nvPr/>
+      </p:nvGrpSpPr>
+      <p:grpSpPr>
+        <a:xfrm>
+          <a:off x="0" y="0"/>
+          <a:ext cx="0" cy="0"/>
+          <a:chOff x="0" y="0"/>
+          <a:chExt cx="0" cy="0"/>
+        </a:xfrm>
+      </p:grpSpPr>
+      <p:sp>
+        <p:nvSpPr>
+          <p:cNvPr id="81" name="Google Shape;81;gac10fef634_0_25:notes"/>
+          <p:cNvSpPr>
+            <a:spLocks noGrp="1" noRot="1" noChangeAspect="1"/>
+          </p:cNvSpPr>
+          <p:nvPr>
+            <p:ph type="sldImg" idx="2"/>
+          </p:nvPr>
+        </p:nvSpPr>
+        <p:spPr>
+          <a:xfrm>
+            <a:off x="381000" y="685800"/>
+            <a:ext cx="6096000" cy="3429000"/>
+          </a:xfrm>
+          <a:custGeom>
+            <a:avLst/>
+            <a:gdLst/>
+            <a:ahLst/>
+            <a:cxnLst/>
+            <a:rect l="l" t="t" r="r" b="b"/>
+            <a:pathLst>
+              <a:path w="120000" h="120000" extrusionOk="0">
+                <a:moveTo>
+                  <a:pt x="0" y="0"/>
+                </a:moveTo>
+                <a:lnTo>
+                  <a:pt x="120000" y="0"/>
+                </a:lnTo>
+                <a:lnTo>
+                  <a:pt x="120000" y="120000"/>
+                </a:lnTo>
+                <a:lnTo>
+                  <a:pt x="0" y="120000"/>
+                </a:lnTo>
+                <a:close/>
+              </a:path>
+            </a:pathLst>
+          </a:custGeom>
+        </p:spPr>
+      </p:sp>
+      <p:sp>
+        <p:nvSpPr>
+          <p:cNvPr id="82" name="Google Shape;82;gac10fef634_0_25:notes"/>
+          <p:cNvSpPr txBox="1">
+            <a:spLocks noGrp="1"/>
+          </p:cNvSpPr>
+          <p:nvPr>
+            <p:ph type="body" idx="1"/>
+          </p:nvPr>
+        </p:nvSpPr>
+        <p:spPr>
+          <a:xfrm>
+            <a:off x="685800" y="4343400"/>
+            <a:ext cx="5486400" cy="4114800"/>
+          </a:xfrm>
+          <a:prstGeom prst="rect">
+            <a:avLst/>
+          </a:prstGeom>
+        </p:spPr>
+        <p:txBody>
+          <a:bodyPr spcFirstLastPara="1" wrap="square" lIns="91425" tIns="91425" rIns="91425" bIns="91425" anchor="t" anchorCtr="0">
+            <a:noAutofit/>
+          </a:bodyPr>
+          <a:lstStyle/>
+          <a:p>
+            <a:pPr marL="0" lvl="0" indent="0" algn="l" rtl="0">
+              <a:spcBef>
+                <a:spcPts val="0"/>
+              </a:spcBef>
+              <a:spcAft>
+                <a:spcPts val="0"/>
+              </a:spcAft>
+              <a:buClr>
+                <a:schemeClr val="dk1"/>
+              </a:buClr>
+              <a:buSzPts val="1100"/>
+              <a:buFont typeface="Arial"/>
+              <a:buNone/>
+            </a:pPr>
+            <a:r>
+              <a:rPr lang="en"/>
+              <a:t>Your version control evidence should go here.  This could be in the form of annotated screenshots which show you you managed this process or you could make a brief screencast explaining how you implemented version control.</a:t>
+            </a:r>
+            <a:endParaRPr/>
+          </a:p>
+          <a:p>
+            <a:pPr marL="0" lvl="0" indent="0" algn="l" rtl="0">
+              <a:spcBef>
+                <a:spcPts val="0"/>
+              </a:spcBef>
+              <a:spcAft>
+                <a:spcPts val="0"/>
+              </a:spcAft>
+              <a:buNone/>
+            </a:pPr>
+            <a:endParaRPr/>
+          </a:p>
+        </p:txBody>
+      </p:sp>
+    </p:spTree>
+  </p:cSld>
+  <p:clrMapOvr>
+    <a:masterClrMapping/>
+  </p:clrMapOvr>
+</p:notes>
+</file>
+
+<file path=ppt/notesSlides/notesSlide13.xml><?xml version="1.0" encoding="utf-8"?>
+<p:notes xmlns:a="http://schemas.openxmlformats.org/drawingml/2006/main" xmlns:r="http://schemas.openxmlformats.org/officeDocument/2006/relationships" xmlns:p="http://schemas.openxmlformats.org/presentationml/2006/main" showMasterSp="0" showMasterPhAnim="0">
+  <p:cSld>
+    <p:spTree>
+      <p:nvGrpSpPr>
+        <p:cNvPr id="1" name="Shape 86"/>
+        <p:cNvGrpSpPr/>
+        <p:nvPr/>
+      </p:nvGrpSpPr>
+      <p:grpSpPr>
+        <a:xfrm>
+          <a:off x="0" y="0"/>
+          <a:ext cx="0" cy="0"/>
+          <a:chOff x="0" y="0"/>
+          <a:chExt cx="0" cy="0"/>
+        </a:xfrm>
+      </p:grpSpPr>
+      <p:sp>
+        <p:nvSpPr>
+          <p:cNvPr id="87" name="Google Shape;87;gac10fef634_0_30:notes"/>
+          <p:cNvSpPr>
+            <a:spLocks noGrp="1" noRot="1" noChangeAspect="1"/>
+          </p:cNvSpPr>
+          <p:nvPr>
+            <p:ph type="sldImg" idx="2"/>
+          </p:nvPr>
+        </p:nvSpPr>
+        <p:spPr>
+          <a:xfrm>
+            <a:off x="381000" y="685800"/>
+            <a:ext cx="6096000" cy="3429000"/>
+          </a:xfrm>
+          <a:custGeom>
+            <a:avLst/>
+            <a:gdLst/>
+            <a:ahLst/>
+            <a:cxnLst/>
+            <a:rect l="l" t="t" r="r" b="b"/>
+            <a:pathLst>
+              <a:path w="120000" h="120000" extrusionOk="0">
+                <a:moveTo>
+                  <a:pt x="0" y="0"/>
+                </a:moveTo>
+                <a:lnTo>
+                  <a:pt x="120000" y="0"/>
+                </a:lnTo>
+                <a:lnTo>
+                  <a:pt x="120000" y="120000"/>
+                </a:lnTo>
+                <a:lnTo>
+                  <a:pt x="0" y="120000"/>
+                </a:lnTo>
+                <a:close/>
+              </a:path>
+            </a:pathLst>
+          </a:custGeom>
+        </p:spPr>
+      </p:sp>
+      <p:sp>
+        <p:nvSpPr>
+          <p:cNvPr id="88" name="Google Shape;88;gac10fef634_0_30:notes"/>
+          <p:cNvSpPr txBox="1">
+            <a:spLocks noGrp="1"/>
+          </p:cNvSpPr>
+          <p:nvPr>
+            <p:ph type="body" idx="1"/>
+          </p:nvPr>
+        </p:nvSpPr>
+        <p:spPr>
+          <a:xfrm>
+            <a:off x="685800" y="4343400"/>
+            <a:ext cx="5486400" cy="4114800"/>
+          </a:xfrm>
+          <a:prstGeom prst="rect">
+            <a:avLst/>
+          </a:prstGeom>
+        </p:spPr>
+        <p:txBody>
+          <a:bodyPr spcFirstLastPara="1" wrap="square" lIns="91425" tIns="91425" rIns="91425" bIns="91425" anchor="t" anchorCtr="0">
+            <a:noAutofit/>
+          </a:bodyPr>
+          <a:lstStyle/>
+          <a:p>
+            <a:pPr marL="0" lvl="0" indent="0" algn="l" rtl="0">
+              <a:spcBef>
+                <a:spcPts val="0"/>
+              </a:spcBef>
+              <a:spcAft>
+                <a:spcPts val="0"/>
+              </a:spcAft>
+              <a:buNone/>
+            </a:pPr>
+            <a:r>
+              <a:rPr lang="en"/>
+              <a:t>Discusses how the information from planning, testing and trialling of components assisted in the development of a high-quality outcome</a:t>
+            </a:r>
+            <a:endParaRPr/>
+          </a:p>
+        </p:txBody>
+      </p:sp>
+    </p:spTree>
+  </p:cSld>
+  <p:clrMapOvr>
+    <a:masterClrMapping/>
+  </p:clrMapOvr>
+</p:notes>
+</file>
+
 <file path=ppt/notesSlides/notesSlide2.xml><?xml version="1.0" encoding="utf-8"?>
 <p:notes xmlns:a="http://schemas.openxmlformats.org/drawingml/2006/main" xmlns:r="http://schemas.openxmlformats.org/officeDocument/2006/relationships" xmlns:p="http://schemas.openxmlformats.org/presentationml/2006/main" showMasterSp="0" showMasterPhAnim="0">
   <p:cSld>
@@ -1757,7 +2416,7 @@
     </p:spTree>
     <p:extLst>
       <p:ext uri="{BB962C8B-B14F-4D97-AF65-F5344CB8AC3E}">
-        <p14:creationId xmlns:p14="http://schemas.microsoft.com/office/powerpoint/2010/main" val="969610470"/>
+        <p14:creationId xmlns:p14="http://schemas.microsoft.com/office/powerpoint/2010/main" val="3647265136"/>
       </p:ext>
     </p:extLst>
   </p:cSld>
@@ -1772,7 +2431,7 @@
   <p:cSld>
     <p:spTree>
       <p:nvGrpSpPr>
-        <p:cNvPr id="1" name="Shape 80"/>
+        <p:cNvPr id="1" name="Shape 74"/>
         <p:cNvGrpSpPr/>
         <p:nvPr/>
       </p:nvGrpSpPr>
@@ -1786,7 +2445,7 @@
       </p:grpSpPr>
       <p:sp>
         <p:nvSpPr>
-          <p:cNvPr id="81" name="Google Shape;81;gac10fef634_0_25:notes"/>
+          <p:cNvPr id="75" name="Google Shape;75;gac10fef634_0_20:notes"/>
           <p:cNvSpPr>
             <a:spLocks noGrp="1" noRot="1" noChangeAspect="1"/>
           </p:cNvSpPr>
@@ -1827,7 +2486,7 @@
       </p:sp>
       <p:sp>
         <p:nvSpPr>
-          <p:cNvPr id="82" name="Google Shape;82;gac10fef634_0_25:notes"/>
+          <p:cNvPr id="76" name="Google Shape;76;gac10fef634_0_20:notes"/>
           <p:cNvSpPr txBox="1">
             <a:spLocks noGrp="1"/>
           </p:cNvSpPr>
@@ -1857,27 +2516,6 @@
               <a:spcAft>
                 <a:spcPts val="0"/>
               </a:spcAft>
-              <a:buClr>
-                <a:schemeClr val="dk1"/>
-              </a:buClr>
-              <a:buSzPts val="1100"/>
-              <a:buFont typeface="Arial"/>
-              <a:buNone/>
-            </a:pPr>
-            <a:r>
-              <a:rPr lang="en"/>
-              <a:t>Your version control evidence should go here.  This could be in the form of annotated screenshots which show you you managed this process or you could make a brief screencast explaining how you implemented version control.</a:t>
-            </a:r>
-            <a:endParaRPr/>
-          </a:p>
-          <a:p>
-            <a:pPr marL="0" lvl="0" indent="0" algn="l" rtl="0">
-              <a:spcBef>
-                <a:spcPts val="0"/>
-              </a:spcBef>
-              <a:spcAft>
-                <a:spcPts val="0"/>
-              </a:spcAft>
               <a:buNone/>
             </a:pPr>
             <a:endParaRPr/>
@@ -1885,6 +2523,11 @@
         </p:txBody>
       </p:sp>
     </p:spTree>
+    <p:extLst>
+      <p:ext uri="{BB962C8B-B14F-4D97-AF65-F5344CB8AC3E}">
+        <p14:creationId xmlns:p14="http://schemas.microsoft.com/office/powerpoint/2010/main" val="969610470"/>
+      </p:ext>
+    </p:extLst>
   </p:cSld>
   <p:clrMapOvr>
     <a:masterClrMapping/>
@@ -1897,7 +2540,7 @@
   <p:cSld>
     <p:spTree>
       <p:nvGrpSpPr>
-        <p:cNvPr id="1" name="Shape 86"/>
+        <p:cNvPr id="1" name="Shape 74"/>
         <p:cNvGrpSpPr/>
         <p:nvPr/>
       </p:nvGrpSpPr>
@@ -1911,7 +2554,7 @@
       </p:grpSpPr>
       <p:sp>
         <p:nvSpPr>
-          <p:cNvPr id="87" name="Google Shape;87;gac10fef634_0_30:notes"/>
+          <p:cNvPr id="75" name="Google Shape;75;gac10fef634_0_20:notes"/>
           <p:cNvSpPr>
             <a:spLocks noGrp="1" noRot="1" noChangeAspect="1"/>
           </p:cNvSpPr>
@@ -1952,7 +2595,7 @@
       </p:sp>
       <p:sp>
         <p:nvSpPr>
-          <p:cNvPr id="88" name="Google Shape;88;gac10fef634_0_30:notes"/>
+          <p:cNvPr id="76" name="Google Shape;76;gac10fef634_0_20:notes"/>
           <p:cNvSpPr txBox="1">
             <a:spLocks noGrp="1"/>
           </p:cNvSpPr>
@@ -1984,15 +2627,16 @@
               </a:spcAft>
               <a:buNone/>
             </a:pPr>
-            <a:r>
-              <a:rPr lang="en"/>
-              <a:t>Discusses how the information from planning, testing and trialling of components assisted in the development of a high-quality outcome</a:t>
-            </a:r>
-            <a:endParaRPr/>
+            <a:endParaRPr dirty="0"/>
           </a:p>
         </p:txBody>
       </p:sp>
     </p:spTree>
+    <p:extLst>
+      <p:ext uri="{BB962C8B-B14F-4D97-AF65-F5344CB8AC3E}">
+        <p14:creationId xmlns:p14="http://schemas.microsoft.com/office/powerpoint/2010/main" val="3456673883"/>
+      </p:ext>
+    </p:extLst>
   </p:cSld>
   <p:clrMapOvr>
     <a:masterClrMapping/>
@@ -7042,6 +7686,1182 @@
 <file path=ppt/slides/slide10.xml><?xml version="1.0" encoding="utf-8"?>
 <p:sld xmlns:a="http://schemas.openxmlformats.org/drawingml/2006/main" xmlns:r="http://schemas.openxmlformats.org/officeDocument/2006/relationships" xmlns:p="http://schemas.openxmlformats.org/presentationml/2006/main">
   <p:cSld>
+    <p:spTree>
+      <p:nvGrpSpPr>
+        <p:cNvPr id="1" name="Shape 77"/>
+        <p:cNvGrpSpPr/>
+        <p:nvPr/>
+      </p:nvGrpSpPr>
+      <p:grpSpPr>
+        <a:xfrm>
+          <a:off x="0" y="0"/>
+          <a:ext cx="0" cy="0"/>
+          <a:chOff x="0" y="0"/>
+          <a:chExt cx="0" cy="0"/>
+        </a:xfrm>
+      </p:grpSpPr>
+      <p:sp>
+        <p:nvSpPr>
+          <p:cNvPr id="78" name="Google Shape;78;p17"/>
+          <p:cNvSpPr txBox="1">
+            <a:spLocks noGrp="1"/>
+          </p:cNvSpPr>
+          <p:nvPr>
+            <p:ph type="title"/>
+          </p:nvPr>
+        </p:nvSpPr>
+        <p:spPr>
+          <a:xfrm>
+            <a:off x="311700" y="445025"/>
+            <a:ext cx="8520600" cy="572700"/>
+          </a:xfrm>
+          <a:prstGeom prst="rect">
+            <a:avLst/>
+          </a:prstGeom>
+        </p:spPr>
+        <p:txBody>
+          <a:bodyPr spcFirstLastPara="1" wrap="square" lIns="91425" tIns="91425" rIns="91425" bIns="91425" anchor="t" anchorCtr="0">
+            <a:noAutofit/>
+          </a:bodyPr>
+          <a:lstStyle/>
+          <a:p>
+            <a:pPr marL="0" lvl="0" indent="0" algn="l" rtl="0">
+              <a:spcBef>
+                <a:spcPts val="0"/>
+              </a:spcBef>
+              <a:spcAft>
+                <a:spcPts val="0"/>
+              </a:spcAft>
+              <a:buNone/>
+            </a:pPr>
+            <a:r>
+              <a:rPr lang="en" dirty="0"/>
+              <a:t>Component 2 v3 - Test Plan (?and screenshot)</a:t>
+            </a:r>
+            <a:endParaRPr dirty="0"/>
+          </a:p>
+        </p:txBody>
+      </p:sp>
+      <p:graphicFrame>
+        <p:nvGraphicFramePr>
+          <p:cNvPr id="79" name="Google Shape;79;p17"/>
+          <p:cNvGraphicFramePr/>
+          <p:nvPr>
+            <p:extLst>
+              <p:ext uri="{D42A27DB-BD31-4B8C-83A1-F6EECF244321}">
+                <p14:modId xmlns:p14="http://schemas.microsoft.com/office/powerpoint/2010/main" val="147102463"/>
+              </p:ext>
+            </p:extLst>
+          </p:nvPr>
+        </p:nvGraphicFramePr>
+        <p:xfrm>
+          <a:off x="311700" y="3960287"/>
+          <a:ext cx="8520600" cy="1737300"/>
+        </p:xfrm>
+        <a:graphic>
+          <a:graphicData uri="http://schemas.openxmlformats.org/drawingml/2006/table">
+            <a:tbl>
+              <a:tblPr>
+                <a:noFill/>
+                <a:tableStyleId>{E1099E06-0E6B-448D-9D27-60429F06E6F4}</a:tableStyleId>
+              </a:tblPr>
+              <a:tblGrid>
+                <a:gridCol w="4260300">
+                  <a:extLst>
+                    <a:ext uri="{9D8B030D-6E8A-4147-A177-3AD203B41FA5}">
+                      <a16:colId xmlns:a16="http://schemas.microsoft.com/office/drawing/2014/main" val="20000"/>
+                    </a:ext>
+                  </a:extLst>
+                </a:gridCol>
+                <a:gridCol w="4260300">
+                  <a:extLst>
+                    <a:ext uri="{9D8B030D-6E8A-4147-A177-3AD203B41FA5}">
+                      <a16:colId xmlns:a16="http://schemas.microsoft.com/office/drawing/2014/main" val="20001"/>
+                    </a:ext>
+                  </a:extLst>
+                </a:gridCol>
+              </a:tblGrid>
+              <a:tr h="0">
+                <a:tc>
+                  <a:txBody>
+                    <a:bodyPr/>
+                    <a:lstStyle/>
+                    <a:p>
+                      <a:pPr marL="0" lvl="0" indent="0" algn="l" rtl="0">
+                        <a:spcBef>
+                          <a:spcPts val="0"/>
+                        </a:spcBef>
+                        <a:spcAft>
+                          <a:spcPts val="0"/>
+                        </a:spcAft>
+                        <a:buNone/>
+                      </a:pPr>
+                      <a:r>
+                        <a:rPr lang="en" sz="1800" b="1" dirty="0"/>
+                        <a:t>Test Case</a:t>
+                      </a:r>
+                      <a:endParaRPr sz="1800" b="1" dirty="0"/>
+                    </a:p>
+                  </a:txBody>
+                  <a:tcPr marL="91425" marR="91425" marT="91425" marB="91425">
+                    <a:solidFill>
+                      <a:srgbClr val="CCCCCC"/>
+                    </a:solidFill>
+                  </a:tcPr>
+                </a:tc>
+                <a:tc>
+                  <a:txBody>
+                    <a:bodyPr/>
+                    <a:lstStyle/>
+                    <a:p>
+                      <a:pPr marL="0" lvl="0" indent="0" algn="l" rtl="0">
+                        <a:spcBef>
+                          <a:spcPts val="0"/>
+                        </a:spcBef>
+                        <a:spcAft>
+                          <a:spcPts val="0"/>
+                        </a:spcAft>
+                        <a:buNone/>
+                      </a:pPr>
+                      <a:r>
+                        <a:rPr lang="en" sz="1800" b="1" dirty="0"/>
+                        <a:t>Expected Values</a:t>
+                      </a:r>
+                      <a:endParaRPr sz="1800" b="1" dirty="0"/>
+                    </a:p>
+                  </a:txBody>
+                  <a:tcPr marL="91425" marR="91425" marT="91425" marB="91425">
+                    <a:solidFill>
+                      <a:srgbClr val="CCCCCC"/>
+                    </a:solidFill>
+                  </a:tcPr>
+                </a:tc>
+                <a:extLst>
+                  <a:ext uri="{0D108BD9-81ED-4DB2-BD59-A6C34878D82A}">
+                    <a16:rowId xmlns:a16="http://schemas.microsoft.com/office/drawing/2014/main" val="10000"/>
+                  </a:ext>
+                </a:extLst>
+              </a:tr>
+              <a:tr h="0">
+                <a:tc>
+                  <a:txBody>
+                    <a:bodyPr/>
+                    <a:lstStyle/>
+                    <a:p>
+                      <a:pPr marL="0" lvl="0" indent="0" algn="l" rtl="0">
+                        <a:spcBef>
+                          <a:spcPts val="0"/>
+                        </a:spcBef>
+                        <a:spcAft>
+                          <a:spcPts val="0"/>
+                        </a:spcAft>
+                        <a:buNone/>
+                      </a:pPr>
+                      <a:r>
+                        <a:rPr lang="en-NZ" sz="1800" dirty="0"/>
+                        <a:t>Run programme</a:t>
+                      </a:r>
+                      <a:endParaRPr sz="1800" dirty="0"/>
+                    </a:p>
+                  </a:txBody>
+                  <a:tcPr marL="91425" marR="91425" marT="91425" marB="91425"/>
+                </a:tc>
+                <a:tc>
+                  <a:txBody>
+                    <a:bodyPr/>
+                    <a:lstStyle/>
+                    <a:p>
+                      <a:pPr marL="0" lvl="0" indent="0" algn="l" rtl="0">
+                        <a:spcBef>
+                          <a:spcPts val="0"/>
+                        </a:spcBef>
+                        <a:spcAft>
+                          <a:spcPts val="0"/>
+                        </a:spcAft>
+                        <a:buNone/>
+                      </a:pPr>
+                      <a:r>
+                        <a:rPr lang="en-NZ" sz="1800" dirty="0"/>
+                        <a:t>Enter 1 program prints pickup</a:t>
+                      </a:r>
+                    </a:p>
+                    <a:p>
+                      <a:pPr marL="0" lvl="0" indent="0" algn="l" rtl="0">
+                        <a:spcBef>
+                          <a:spcPts val="0"/>
+                        </a:spcBef>
+                        <a:spcAft>
+                          <a:spcPts val="0"/>
+                        </a:spcAft>
+                        <a:buNone/>
+                      </a:pPr>
+                      <a:r>
+                        <a:rPr lang="en-NZ" sz="1800" dirty="0"/>
+                        <a:t>Enter 2 program prints deliver</a:t>
+                      </a:r>
+                    </a:p>
+                    <a:p>
+                      <a:pPr marL="0" lvl="0" indent="0" algn="l" rtl="0">
+                        <a:spcBef>
+                          <a:spcPts val="0"/>
+                        </a:spcBef>
+                        <a:spcAft>
+                          <a:spcPts val="0"/>
+                        </a:spcAft>
+                        <a:buNone/>
+                      </a:pPr>
+                      <a:r>
+                        <a:rPr lang="en-NZ" sz="1800" dirty="0"/>
+                        <a:t>Enter invalid prints error message.</a:t>
+                      </a:r>
+                    </a:p>
+                    <a:p>
+                      <a:pPr marL="0" lvl="0" indent="0" algn="l" rtl="0">
+                        <a:spcBef>
+                          <a:spcPts val="0"/>
+                        </a:spcBef>
+                        <a:spcAft>
+                          <a:spcPts val="0"/>
+                        </a:spcAft>
+                        <a:buNone/>
+                      </a:pPr>
+                      <a:r>
+                        <a:rPr lang="en-NZ" sz="1800" dirty="0"/>
+                        <a:t>Prints value error</a:t>
+                      </a:r>
+                    </a:p>
+                  </a:txBody>
+                  <a:tcPr marL="91425" marR="91425" marT="91425" marB="91425"/>
+                </a:tc>
+                <a:extLst>
+                  <a:ext uri="{0D108BD9-81ED-4DB2-BD59-A6C34878D82A}">
+                    <a16:rowId xmlns:a16="http://schemas.microsoft.com/office/drawing/2014/main" val="10001"/>
+                  </a:ext>
+                </a:extLst>
+              </a:tr>
+            </a:tbl>
+          </a:graphicData>
+        </a:graphic>
+      </p:graphicFrame>
+      <p:pic>
+        <p:nvPicPr>
+          <p:cNvPr id="3" name="Picture 2">
+            <a:extLst>
+              <a:ext uri="{FF2B5EF4-FFF2-40B4-BE49-F238E27FC236}">
+                <a16:creationId xmlns:a16="http://schemas.microsoft.com/office/drawing/2014/main" id="{C353732A-898B-4A36-ACF6-A992F91231E8}"/>
+              </a:ext>
+            </a:extLst>
+          </p:cNvPr>
+          <p:cNvPicPr>
+            <a:picLocks noChangeAspect="1"/>
+          </p:cNvPicPr>
+          <p:nvPr/>
+        </p:nvPicPr>
+        <p:blipFill>
+          <a:blip r:embed="rId3"/>
+          <a:stretch>
+            <a:fillRect/>
+          </a:stretch>
+        </p:blipFill>
+        <p:spPr>
+          <a:xfrm>
+            <a:off x="467138" y="1017725"/>
+            <a:ext cx="3955359" cy="2888159"/>
+          </a:xfrm>
+          <a:prstGeom prst="rect">
+            <a:avLst/>
+          </a:prstGeom>
+        </p:spPr>
+      </p:pic>
+    </p:spTree>
+    <p:extLst>
+      <p:ext uri="{BB962C8B-B14F-4D97-AF65-F5344CB8AC3E}">
+        <p14:creationId xmlns:p14="http://schemas.microsoft.com/office/powerpoint/2010/main" val="4010920224"/>
+      </p:ext>
+    </p:extLst>
+  </p:cSld>
+  <p:clrMapOvr>
+    <a:masterClrMapping/>
+  </p:clrMapOvr>
+</p:sld>
+</file>
+
+<file path=ppt/slides/slide11.xml><?xml version="1.0" encoding="utf-8"?>
+<p:sld xmlns:a="http://schemas.openxmlformats.org/drawingml/2006/main" xmlns:r="http://schemas.openxmlformats.org/officeDocument/2006/relationships" xmlns:p="http://schemas.openxmlformats.org/presentationml/2006/main">
+  <p:cSld>
+    <p:spTree>
+      <p:nvGrpSpPr>
+        <p:cNvPr id="1" name="Shape 77"/>
+        <p:cNvGrpSpPr/>
+        <p:nvPr/>
+      </p:nvGrpSpPr>
+      <p:grpSpPr>
+        <a:xfrm>
+          <a:off x="0" y="0"/>
+          <a:ext cx="0" cy="0"/>
+          <a:chOff x="0" y="0"/>
+          <a:chExt cx="0" cy="0"/>
+        </a:xfrm>
+      </p:grpSpPr>
+      <p:sp>
+        <p:nvSpPr>
+          <p:cNvPr id="78" name="Google Shape;78;p17"/>
+          <p:cNvSpPr txBox="1">
+            <a:spLocks noGrp="1"/>
+          </p:cNvSpPr>
+          <p:nvPr>
+            <p:ph type="title"/>
+          </p:nvPr>
+        </p:nvSpPr>
+        <p:spPr>
+          <a:xfrm>
+            <a:off x="311700" y="445025"/>
+            <a:ext cx="8520600" cy="572700"/>
+          </a:xfrm>
+          <a:prstGeom prst="rect">
+            <a:avLst/>
+          </a:prstGeom>
+        </p:spPr>
+        <p:txBody>
+          <a:bodyPr spcFirstLastPara="1" wrap="square" lIns="91425" tIns="91425" rIns="91425" bIns="91425" anchor="t" anchorCtr="0">
+            <a:noAutofit/>
+          </a:bodyPr>
+          <a:lstStyle/>
+          <a:p>
+            <a:pPr marL="0" lvl="0" indent="0" algn="l" rtl="0">
+              <a:spcBef>
+                <a:spcPts val="0"/>
+              </a:spcBef>
+              <a:spcAft>
+                <a:spcPts val="0"/>
+              </a:spcAft>
+              <a:buNone/>
+            </a:pPr>
+            <a:r>
+              <a:rPr lang="en" dirty="0"/>
+              <a:t>Component 2 v4 - Test Plan (?and screenshot)</a:t>
+            </a:r>
+            <a:endParaRPr dirty="0"/>
+          </a:p>
+        </p:txBody>
+      </p:sp>
+      <p:graphicFrame>
+        <p:nvGraphicFramePr>
+          <p:cNvPr id="79" name="Google Shape;79;p17"/>
+          <p:cNvGraphicFramePr/>
+          <p:nvPr>
+            <p:extLst>
+              <p:ext uri="{D42A27DB-BD31-4B8C-83A1-F6EECF244321}">
+                <p14:modId xmlns:p14="http://schemas.microsoft.com/office/powerpoint/2010/main" val="3419090915"/>
+              </p:ext>
+            </p:extLst>
+          </p:nvPr>
+        </p:nvGraphicFramePr>
+        <p:xfrm>
+          <a:off x="311700" y="3960287"/>
+          <a:ext cx="8520600" cy="2468790"/>
+        </p:xfrm>
+        <a:graphic>
+          <a:graphicData uri="http://schemas.openxmlformats.org/drawingml/2006/table">
+            <a:tbl>
+              <a:tblPr>
+                <a:noFill/>
+                <a:tableStyleId>{E1099E06-0E6B-448D-9D27-60429F06E6F4}</a:tableStyleId>
+              </a:tblPr>
+              <a:tblGrid>
+                <a:gridCol w="4260300">
+                  <a:extLst>
+                    <a:ext uri="{9D8B030D-6E8A-4147-A177-3AD203B41FA5}">
+                      <a16:colId xmlns:a16="http://schemas.microsoft.com/office/drawing/2014/main" val="20000"/>
+                    </a:ext>
+                  </a:extLst>
+                </a:gridCol>
+                <a:gridCol w="4260300">
+                  <a:extLst>
+                    <a:ext uri="{9D8B030D-6E8A-4147-A177-3AD203B41FA5}">
+                      <a16:colId xmlns:a16="http://schemas.microsoft.com/office/drawing/2014/main" val="20001"/>
+                    </a:ext>
+                  </a:extLst>
+                </a:gridCol>
+              </a:tblGrid>
+              <a:tr h="0">
+                <a:tc>
+                  <a:txBody>
+                    <a:bodyPr/>
+                    <a:lstStyle/>
+                    <a:p>
+                      <a:pPr marL="0" lvl="0" indent="0" algn="l" rtl="0">
+                        <a:spcBef>
+                          <a:spcPts val="0"/>
+                        </a:spcBef>
+                        <a:spcAft>
+                          <a:spcPts val="0"/>
+                        </a:spcAft>
+                        <a:buNone/>
+                      </a:pPr>
+                      <a:r>
+                        <a:rPr lang="en" sz="1800" b="1" dirty="0"/>
+                        <a:t>Test Case</a:t>
+                      </a:r>
+                      <a:endParaRPr sz="1800" b="1" dirty="0"/>
+                    </a:p>
+                  </a:txBody>
+                  <a:tcPr marL="91425" marR="91425" marT="91425" marB="91425">
+                    <a:solidFill>
+                      <a:srgbClr val="CCCCCC"/>
+                    </a:solidFill>
+                  </a:tcPr>
+                </a:tc>
+                <a:tc>
+                  <a:txBody>
+                    <a:bodyPr/>
+                    <a:lstStyle/>
+                    <a:p>
+                      <a:pPr marL="0" lvl="0" indent="0" algn="l" rtl="0">
+                        <a:spcBef>
+                          <a:spcPts val="0"/>
+                        </a:spcBef>
+                        <a:spcAft>
+                          <a:spcPts val="0"/>
+                        </a:spcAft>
+                        <a:buNone/>
+                      </a:pPr>
+                      <a:r>
+                        <a:rPr lang="en" sz="1800" b="1" dirty="0"/>
+                        <a:t>Expected Values</a:t>
+                      </a:r>
+                      <a:endParaRPr sz="1800" b="1" dirty="0"/>
+                    </a:p>
+                  </a:txBody>
+                  <a:tcPr marL="91425" marR="91425" marT="91425" marB="91425">
+                    <a:solidFill>
+                      <a:srgbClr val="CCCCCC"/>
+                    </a:solidFill>
+                  </a:tcPr>
+                </a:tc>
+                <a:extLst>
+                  <a:ext uri="{0D108BD9-81ED-4DB2-BD59-A6C34878D82A}">
+                    <a16:rowId xmlns:a16="http://schemas.microsoft.com/office/drawing/2014/main" val="10000"/>
+                  </a:ext>
+                </a:extLst>
+              </a:tr>
+              <a:tr h="396200">
+                <a:tc>
+                  <a:txBody>
+                    <a:bodyPr/>
+                    <a:lstStyle/>
+                    <a:p>
+                      <a:pPr marL="0" lvl="0" indent="0" algn="l" rtl="0">
+                        <a:spcBef>
+                          <a:spcPts val="0"/>
+                        </a:spcBef>
+                        <a:spcAft>
+                          <a:spcPts val="0"/>
+                        </a:spcAft>
+                        <a:buNone/>
+                      </a:pPr>
+                      <a:r>
+                        <a:rPr lang="en-NZ" sz="1800" dirty="0"/>
+                        <a:t>Run programme</a:t>
+                      </a:r>
+                      <a:endParaRPr sz="1800" dirty="0"/>
+                    </a:p>
+                  </a:txBody>
+                  <a:tcPr marL="91425" marR="91425" marT="91425" marB="91425"/>
+                </a:tc>
+                <a:tc>
+                  <a:txBody>
+                    <a:bodyPr/>
+                    <a:lstStyle/>
+                    <a:p>
+                      <a:pPr marL="0" lvl="0" indent="0" algn="l" rtl="0">
+                        <a:spcBef>
+                          <a:spcPts val="0"/>
+                        </a:spcBef>
+                        <a:spcAft>
+                          <a:spcPts val="0"/>
+                        </a:spcAft>
+                        <a:buNone/>
+                      </a:pPr>
+                      <a:r>
+                        <a:rPr lang="en-US" sz="1800" dirty="0"/>
+                        <a:t>Enter 2 program prints pickup</a:t>
+                      </a:r>
+                    </a:p>
+                    <a:p>
+                      <a:pPr marL="0" lvl="0" indent="0" algn="l" rtl="0">
+                        <a:spcBef>
+                          <a:spcPts val="0"/>
+                        </a:spcBef>
+                        <a:spcAft>
+                          <a:spcPts val="0"/>
+                        </a:spcAft>
+                        <a:buNone/>
+                      </a:pPr>
+                      <a:r>
+                        <a:rPr lang="en-US" sz="1800" dirty="0"/>
+                        <a:t>Enter 1 program prints deliver</a:t>
+                      </a:r>
+                    </a:p>
+                    <a:p>
+                      <a:pPr marL="0" lvl="0" indent="0" algn="l" rtl="0">
+                        <a:spcBef>
+                          <a:spcPts val="0"/>
+                        </a:spcBef>
+                        <a:spcAft>
+                          <a:spcPts val="0"/>
+                        </a:spcAft>
+                        <a:buNone/>
+                      </a:pPr>
+                      <a:r>
+                        <a:rPr lang="en-US" sz="1800" dirty="0"/>
+                        <a:t>Enter invalid prints error message.</a:t>
+                      </a:r>
+                    </a:p>
+                    <a:p>
+                      <a:pPr marL="0" lvl="0" indent="0" algn="l" rtl="0">
+                        <a:spcBef>
+                          <a:spcPts val="0"/>
+                        </a:spcBef>
+                        <a:spcAft>
+                          <a:spcPts val="0"/>
+                        </a:spcAft>
+                        <a:buNone/>
+                      </a:pPr>
+                      <a:r>
+                        <a:rPr lang="en-US" sz="1800" dirty="0"/>
+                        <a:t>Enter number other than 1 or 2 does not work</a:t>
+                      </a:r>
+                    </a:p>
+                  </a:txBody>
+                  <a:tcPr marL="91425" marR="91425" marT="91425" marB="91425"/>
+                </a:tc>
+                <a:extLst>
+                  <a:ext uri="{0D108BD9-81ED-4DB2-BD59-A6C34878D82A}">
+                    <a16:rowId xmlns:a16="http://schemas.microsoft.com/office/drawing/2014/main" val="10001"/>
+                  </a:ext>
+                </a:extLst>
+              </a:tr>
+              <a:tr h="396200">
+                <a:tc>
+                  <a:txBody>
+                    <a:bodyPr/>
+                    <a:lstStyle/>
+                    <a:p>
+                      <a:pPr marL="0" lvl="0" indent="0" algn="l" rtl="0">
+                        <a:spcBef>
+                          <a:spcPts val="0"/>
+                        </a:spcBef>
+                        <a:spcAft>
+                          <a:spcPts val="0"/>
+                        </a:spcAft>
+                        <a:buNone/>
+                      </a:pPr>
+                      <a:endParaRPr sz="1800" dirty="0"/>
+                    </a:p>
+                  </a:txBody>
+                  <a:tcPr marL="91425" marR="91425" marT="91425" marB="91425"/>
+                </a:tc>
+                <a:tc>
+                  <a:txBody>
+                    <a:bodyPr/>
+                    <a:lstStyle/>
+                    <a:p>
+                      <a:pPr marL="0" lvl="0" indent="0" algn="l" rtl="0">
+                        <a:spcBef>
+                          <a:spcPts val="0"/>
+                        </a:spcBef>
+                        <a:spcAft>
+                          <a:spcPts val="0"/>
+                        </a:spcAft>
+                        <a:buNone/>
+                      </a:pPr>
+                      <a:endParaRPr sz="1800" dirty="0"/>
+                    </a:p>
+                  </a:txBody>
+                  <a:tcPr marL="91425" marR="91425" marT="91425" marB="91425"/>
+                </a:tc>
+                <a:extLst>
+                  <a:ext uri="{0D108BD9-81ED-4DB2-BD59-A6C34878D82A}">
+                    <a16:rowId xmlns:a16="http://schemas.microsoft.com/office/drawing/2014/main" val="735329897"/>
+                  </a:ext>
+                </a:extLst>
+              </a:tr>
+            </a:tbl>
+          </a:graphicData>
+        </a:graphic>
+      </p:graphicFrame>
+      <p:pic>
+        <p:nvPicPr>
+          <p:cNvPr id="5" name="Picture 4">
+            <a:extLst>
+              <a:ext uri="{FF2B5EF4-FFF2-40B4-BE49-F238E27FC236}">
+                <a16:creationId xmlns:a16="http://schemas.microsoft.com/office/drawing/2014/main" id="{93123D94-09D7-4135-8F26-C15D3FF26643}"/>
+              </a:ext>
+            </a:extLst>
+          </p:cNvPr>
+          <p:cNvPicPr>
+            <a:picLocks noChangeAspect="1"/>
+          </p:cNvPicPr>
+          <p:nvPr/>
+        </p:nvPicPr>
+        <p:blipFill>
+          <a:blip r:embed="rId3"/>
+          <a:stretch>
+            <a:fillRect/>
+          </a:stretch>
+        </p:blipFill>
+        <p:spPr>
+          <a:xfrm>
+            <a:off x="556591" y="1017725"/>
+            <a:ext cx="2556734" cy="2765244"/>
+          </a:xfrm>
+          <a:prstGeom prst="rect">
+            <a:avLst/>
+          </a:prstGeom>
+        </p:spPr>
+      </p:pic>
+      <p:pic>
+        <p:nvPicPr>
+          <p:cNvPr id="7" name="Picture 6">
+            <a:extLst>
+              <a:ext uri="{FF2B5EF4-FFF2-40B4-BE49-F238E27FC236}">
+                <a16:creationId xmlns:a16="http://schemas.microsoft.com/office/drawing/2014/main" id="{D5DD91E5-DBE9-4AD8-A0A9-D9BC1A49899F}"/>
+              </a:ext>
+            </a:extLst>
+          </p:cNvPr>
+          <p:cNvPicPr>
+            <a:picLocks noChangeAspect="1"/>
+          </p:cNvPicPr>
+          <p:nvPr/>
+        </p:nvPicPr>
+        <p:blipFill>
+          <a:blip r:embed="rId4"/>
+          <a:stretch>
+            <a:fillRect/>
+          </a:stretch>
+        </p:blipFill>
+        <p:spPr>
+          <a:xfrm>
+            <a:off x="3575395" y="1650806"/>
+            <a:ext cx="4219575" cy="1676400"/>
+          </a:xfrm>
+          <a:prstGeom prst="rect">
+            <a:avLst/>
+          </a:prstGeom>
+        </p:spPr>
+      </p:pic>
+    </p:spTree>
+    <p:extLst>
+      <p:ext uri="{BB962C8B-B14F-4D97-AF65-F5344CB8AC3E}">
+        <p14:creationId xmlns:p14="http://schemas.microsoft.com/office/powerpoint/2010/main" val="2848548919"/>
+      </p:ext>
+    </p:extLst>
+  </p:cSld>
+  <p:clrMapOvr>
+    <a:masterClrMapping/>
+  </p:clrMapOvr>
+</p:sld>
+</file>
+
+<file path=ppt/slides/slide12.xml><?xml version="1.0" encoding="utf-8"?>
+<p:sld xmlns:a="http://schemas.openxmlformats.org/drawingml/2006/main" xmlns:r="http://schemas.openxmlformats.org/officeDocument/2006/relationships" xmlns:p="http://schemas.openxmlformats.org/presentationml/2006/main">
+  <p:cSld>
+    <p:spTree>
+      <p:nvGrpSpPr>
+        <p:cNvPr id="1" name="Shape 77"/>
+        <p:cNvGrpSpPr/>
+        <p:nvPr/>
+      </p:nvGrpSpPr>
+      <p:grpSpPr>
+        <a:xfrm>
+          <a:off x="0" y="0"/>
+          <a:ext cx="0" cy="0"/>
+          <a:chOff x="0" y="0"/>
+          <a:chExt cx="0" cy="0"/>
+        </a:xfrm>
+      </p:grpSpPr>
+      <p:sp>
+        <p:nvSpPr>
+          <p:cNvPr id="78" name="Google Shape;78;p17"/>
+          <p:cNvSpPr txBox="1">
+            <a:spLocks noGrp="1"/>
+          </p:cNvSpPr>
+          <p:nvPr>
+            <p:ph type="title"/>
+          </p:nvPr>
+        </p:nvSpPr>
+        <p:spPr>
+          <a:xfrm>
+            <a:off x="311700" y="445025"/>
+            <a:ext cx="8520600" cy="572700"/>
+          </a:xfrm>
+          <a:prstGeom prst="rect">
+            <a:avLst/>
+          </a:prstGeom>
+        </p:spPr>
+        <p:txBody>
+          <a:bodyPr spcFirstLastPara="1" wrap="square" lIns="91425" tIns="91425" rIns="91425" bIns="91425" anchor="t" anchorCtr="0">
+            <a:noAutofit/>
+          </a:bodyPr>
+          <a:lstStyle/>
+          <a:p>
+            <a:pPr marL="0" lvl="0" indent="0" algn="l" rtl="0">
+              <a:spcBef>
+                <a:spcPts val="0"/>
+              </a:spcBef>
+              <a:spcAft>
+                <a:spcPts val="0"/>
+              </a:spcAft>
+              <a:buNone/>
+            </a:pPr>
+            <a:r>
+              <a:rPr lang="en" dirty="0"/>
+              <a:t>Component 2 v5 - Test Plan (?and screenshot)</a:t>
+            </a:r>
+            <a:endParaRPr dirty="0"/>
+          </a:p>
+        </p:txBody>
+      </p:sp>
+      <p:graphicFrame>
+        <p:nvGraphicFramePr>
+          <p:cNvPr id="79" name="Google Shape;79;p17"/>
+          <p:cNvGraphicFramePr/>
+          <p:nvPr>
+            <p:extLst>
+              <p:ext uri="{D42A27DB-BD31-4B8C-83A1-F6EECF244321}">
+                <p14:modId xmlns:p14="http://schemas.microsoft.com/office/powerpoint/2010/main" val="191609282"/>
+              </p:ext>
+            </p:extLst>
+          </p:nvPr>
+        </p:nvGraphicFramePr>
+        <p:xfrm>
+          <a:off x="381274" y="3097093"/>
+          <a:ext cx="8520600" cy="2468790"/>
+        </p:xfrm>
+        <a:graphic>
+          <a:graphicData uri="http://schemas.openxmlformats.org/drawingml/2006/table">
+            <a:tbl>
+              <a:tblPr>
+                <a:noFill/>
+                <a:tableStyleId>{E1099E06-0E6B-448D-9D27-60429F06E6F4}</a:tableStyleId>
+              </a:tblPr>
+              <a:tblGrid>
+                <a:gridCol w="1914665">
+                  <a:extLst>
+                    <a:ext uri="{9D8B030D-6E8A-4147-A177-3AD203B41FA5}">
+                      <a16:colId xmlns:a16="http://schemas.microsoft.com/office/drawing/2014/main" val="20000"/>
+                    </a:ext>
+                  </a:extLst>
+                </a:gridCol>
+                <a:gridCol w="6605935">
+                  <a:extLst>
+                    <a:ext uri="{9D8B030D-6E8A-4147-A177-3AD203B41FA5}">
+                      <a16:colId xmlns:a16="http://schemas.microsoft.com/office/drawing/2014/main" val="20001"/>
+                    </a:ext>
+                  </a:extLst>
+                </a:gridCol>
+              </a:tblGrid>
+              <a:tr h="322565">
+                <a:tc>
+                  <a:txBody>
+                    <a:bodyPr/>
+                    <a:lstStyle/>
+                    <a:p>
+                      <a:pPr marL="0" lvl="0" indent="0" algn="l" rtl="0">
+                        <a:spcBef>
+                          <a:spcPts val="0"/>
+                        </a:spcBef>
+                        <a:spcAft>
+                          <a:spcPts val="0"/>
+                        </a:spcAft>
+                        <a:buNone/>
+                      </a:pPr>
+                      <a:r>
+                        <a:rPr lang="en" sz="1800" b="1" dirty="0"/>
+                        <a:t>Test Case</a:t>
+                      </a:r>
+                      <a:endParaRPr sz="1800" b="1" dirty="0"/>
+                    </a:p>
+                  </a:txBody>
+                  <a:tcPr marL="91425" marR="91425" marT="91425" marB="91425">
+                    <a:solidFill>
+                      <a:srgbClr val="CCCCCC"/>
+                    </a:solidFill>
+                  </a:tcPr>
+                </a:tc>
+                <a:tc>
+                  <a:txBody>
+                    <a:bodyPr/>
+                    <a:lstStyle/>
+                    <a:p>
+                      <a:pPr marL="0" lvl="0" indent="0" algn="l" rtl="0">
+                        <a:spcBef>
+                          <a:spcPts val="0"/>
+                        </a:spcBef>
+                        <a:spcAft>
+                          <a:spcPts val="0"/>
+                        </a:spcAft>
+                        <a:buNone/>
+                      </a:pPr>
+                      <a:r>
+                        <a:rPr lang="en" sz="1800" b="1" dirty="0"/>
+                        <a:t>Expected Values</a:t>
+                      </a:r>
+                      <a:endParaRPr sz="1800" b="1" dirty="0"/>
+                    </a:p>
+                  </a:txBody>
+                  <a:tcPr marL="91425" marR="91425" marT="91425" marB="91425">
+                    <a:solidFill>
+                      <a:srgbClr val="CCCCCC"/>
+                    </a:solidFill>
+                  </a:tcPr>
+                </a:tc>
+                <a:extLst>
+                  <a:ext uri="{0D108BD9-81ED-4DB2-BD59-A6C34878D82A}">
+                    <a16:rowId xmlns:a16="http://schemas.microsoft.com/office/drawing/2014/main" val="10000"/>
+                  </a:ext>
+                </a:extLst>
+              </a:tr>
+              <a:tr h="396200">
+                <a:tc>
+                  <a:txBody>
+                    <a:bodyPr/>
+                    <a:lstStyle/>
+                    <a:p>
+                      <a:pPr marL="0" lvl="0" indent="0" algn="l" rtl="0">
+                        <a:spcBef>
+                          <a:spcPts val="0"/>
+                        </a:spcBef>
+                        <a:spcAft>
+                          <a:spcPts val="0"/>
+                        </a:spcAft>
+                        <a:buNone/>
+                      </a:pPr>
+                      <a:r>
+                        <a:rPr lang="en-NZ" sz="1800" dirty="0"/>
+                        <a:t>Run programme</a:t>
+                      </a:r>
+                      <a:endParaRPr sz="1800" dirty="0"/>
+                    </a:p>
+                  </a:txBody>
+                  <a:tcPr marL="91425" marR="91425" marT="91425" marB="91425"/>
+                </a:tc>
+                <a:tc>
+                  <a:txBody>
+                    <a:bodyPr/>
+                    <a:lstStyle/>
+                    <a:p>
+                      <a:pPr marL="0" lvl="0" indent="0" algn="l" rtl="0">
+                        <a:spcBef>
+                          <a:spcPts val="0"/>
+                        </a:spcBef>
+                        <a:spcAft>
+                          <a:spcPts val="0"/>
+                        </a:spcAft>
+                        <a:buNone/>
+                      </a:pPr>
+                      <a:r>
+                        <a:rPr lang="en-US" sz="1800" dirty="0"/>
+                        <a:t>Enter 2 program prints pickup</a:t>
+                      </a:r>
+                    </a:p>
+                    <a:p>
+                      <a:pPr marL="0" lvl="0" indent="0" algn="l" rtl="0">
+                        <a:spcBef>
+                          <a:spcPts val="0"/>
+                        </a:spcBef>
+                        <a:spcAft>
+                          <a:spcPts val="0"/>
+                        </a:spcAft>
+                        <a:buNone/>
+                      </a:pPr>
+                      <a:r>
+                        <a:rPr lang="en-US" sz="1800" dirty="0"/>
+                        <a:t>Enter 1 program prints deliver</a:t>
+                      </a:r>
+                    </a:p>
+                    <a:p>
+                      <a:pPr marL="0" lvl="0" indent="0" algn="l" rtl="0">
+                        <a:spcBef>
+                          <a:spcPts val="0"/>
+                        </a:spcBef>
+                        <a:spcAft>
+                          <a:spcPts val="0"/>
+                        </a:spcAft>
+                        <a:buNone/>
+                      </a:pPr>
+                      <a:r>
+                        <a:rPr lang="en-US" sz="1800" dirty="0"/>
+                        <a:t>Enter invalid entry – error message asks for input again</a:t>
+                      </a:r>
+                    </a:p>
+                    <a:p>
+                      <a:pPr marL="0" lvl="0" indent="0" algn="l" rtl="0">
+                        <a:spcBef>
+                          <a:spcPts val="0"/>
+                        </a:spcBef>
+                        <a:spcAft>
+                          <a:spcPts val="0"/>
+                        </a:spcAft>
+                        <a:buNone/>
+                      </a:pPr>
+                      <a:r>
+                        <a:rPr lang="en-US" sz="1800" dirty="0"/>
+                        <a:t>Enter number other than 1 or 2 – error message asks for entry again</a:t>
+                      </a:r>
+                    </a:p>
+                  </a:txBody>
+                  <a:tcPr marL="91425" marR="91425" marT="91425" marB="91425"/>
+                </a:tc>
+                <a:extLst>
+                  <a:ext uri="{0D108BD9-81ED-4DB2-BD59-A6C34878D82A}">
+                    <a16:rowId xmlns:a16="http://schemas.microsoft.com/office/drawing/2014/main" val="10001"/>
+                  </a:ext>
+                </a:extLst>
+              </a:tr>
+              <a:tr h="396200">
+                <a:tc>
+                  <a:txBody>
+                    <a:bodyPr/>
+                    <a:lstStyle/>
+                    <a:p>
+                      <a:pPr marL="0" lvl="0" indent="0" algn="l" rtl="0">
+                        <a:spcBef>
+                          <a:spcPts val="0"/>
+                        </a:spcBef>
+                        <a:spcAft>
+                          <a:spcPts val="0"/>
+                        </a:spcAft>
+                        <a:buNone/>
+                      </a:pPr>
+                      <a:endParaRPr sz="1800" dirty="0"/>
+                    </a:p>
+                  </a:txBody>
+                  <a:tcPr marL="91425" marR="91425" marT="91425" marB="91425"/>
+                </a:tc>
+                <a:tc>
+                  <a:txBody>
+                    <a:bodyPr/>
+                    <a:lstStyle/>
+                    <a:p>
+                      <a:pPr marL="0" lvl="0" indent="0" algn="l" rtl="0">
+                        <a:spcBef>
+                          <a:spcPts val="0"/>
+                        </a:spcBef>
+                        <a:spcAft>
+                          <a:spcPts val="0"/>
+                        </a:spcAft>
+                        <a:buNone/>
+                      </a:pPr>
+                      <a:endParaRPr lang="en-US" sz="1800" dirty="0"/>
+                    </a:p>
+                  </a:txBody>
+                  <a:tcPr marL="91425" marR="91425" marT="91425" marB="91425"/>
+                </a:tc>
+                <a:extLst>
+                  <a:ext uri="{0D108BD9-81ED-4DB2-BD59-A6C34878D82A}">
+                    <a16:rowId xmlns:a16="http://schemas.microsoft.com/office/drawing/2014/main" val="3549096836"/>
+                  </a:ext>
+                </a:extLst>
+              </a:tr>
+            </a:tbl>
+          </a:graphicData>
+        </a:graphic>
+      </p:graphicFrame>
+      <p:pic>
+        <p:nvPicPr>
+          <p:cNvPr id="3" name="Picture 2">
+            <a:extLst>
+              <a:ext uri="{FF2B5EF4-FFF2-40B4-BE49-F238E27FC236}">
+                <a16:creationId xmlns:a16="http://schemas.microsoft.com/office/drawing/2014/main" id="{0451E2B8-D894-4F77-9CE0-D37B97F158E1}"/>
+              </a:ext>
+            </a:extLst>
+          </p:cNvPr>
+          <p:cNvPicPr>
+            <a:picLocks noChangeAspect="1"/>
+          </p:cNvPicPr>
+          <p:nvPr/>
+        </p:nvPicPr>
+        <p:blipFill>
+          <a:blip r:embed="rId3"/>
+          <a:stretch>
+            <a:fillRect/>
+          </a:stretch>
+        </p:blipFill>
+        <p:spPr>
+          <a:xfrm>
+            <a:off x="526773" y="898940"/>
+            <a:ext cx="2445445" cy="2198153"/>
+          </a:xfrm>
+          <a:prstGeom prst="rect">
+            <a:avLst/>
+          </a:prstGeom>
+        </p:spPr>
+      </p:pic>
+      <p:pic>
+        <p:nvPicPr>
+          <p:cNvPr id="4" name="Picture 3">
+            <a:extLst>
+              <a:ext uri="{FF2B5EF4-FFF2-40B4-BE49-F238E27FC236}">
+                <a16:creationId xmlns:a16="http://schemas.microsoft.com/office/drawing/2014/main" id="{85892AAC-E744-4241-997C-8CEA6780A04D}"/>
+              </a:ext>
+            </a:extLst>
+          </p:cNvPr>
+          <p:cNvPicPr>
+            <a:picLocks noChangeAspect="1"/>
+          </p:cNvPicPr>
+          <p:nvPr/>
+        </p:nvPicPr>
+        <p:blipFill>
+          <a:blip r:embed="rId4"/>
+          <a:stretch>
+            <a:fillRect/>
+          </a:stretch>
+        </p:blipFill>
+        <p:spPr>
+          <a:xfrm>
+            <a:off x="3117717" y="1016941"/>
+            <a:ext cx="4781550" cy="1962150"/>
+          </a:xfrm>
+          <a:prstGeom prst="rect">
+            <a:avLst/>
+          </a:prstGeom>
+        </p:spPr>
+      </p:pic>
+    </p:spTree>
+    <p:extLst>
+      <p:ext uri="{BB962C8B-B14F-4D97-AF65-F5344CB8AC3E}">
+        <p14:creationId xmlns:p14="http://schemas.microsoft.com/office/powerpoint/2010/main" val="3429537914"/>
+      </p:ext>
+    </p:extLst>
+  </p:cSld>
+  <p:clrMapOvr>
+    <a:masterClrMapping/>
+  </p:clrMapOvr>
+</p:sld>
+</file>
+
+<file path=ppt/slides/slide13.xml><?xml version="1.0" encoding="utf-8"?>
+<p:sld xmlns:a="http://schemas.openxmlformats.org/drawingml/2006/main" xmlns:r="http://schemas.openxmlformats.org/officeDocument/2006/relationships" xmlns:p="http://schemas.openxmlformats.org/presentationml/2006/main">
+  <p:cSld>
+    <p:bg>
+      <p:bgPr>
+        <a:solidFill>
+          <a:srgbClr val="D9EAD3"/>
+        </a:solidFill>
+        <a:effectLst/>
+      </p:bgPr>
+    </p:bg>
+    <p:spTree>
+      <p:nvGrpSpPr>
+        <p:cNvPr id="1" name="Shape 83"/>
+        <p:cNvGrpSpPr/>
+        <p:nvPr/>
+      </p:nvGrpSpPr>
+      <p:grpSpPr>
+        <a:xfrm>
+          <a:off x="0" y="0"/>
+          <a:ext cx="0" cy="0"/>
+          <a:chOff x="0" y="0"/>
+          <a:chExt cx="0" cy="0"/>
+        </a:xfrm>
+      </p:grpSpPr>
+      <p:sp>
+        <p:nvSpPr>
+          <p:cNvPr id="84" name="Google Shape;84;p18"/>
+          <p:cNvSpPr txBox="1">
+            <a:spLocks noGrp="1"/>
+          </p:cNvSpPr>
+          <p:nvPr>
+            <p:ph type="title"/>
+          </p:nvPr>
+        </p:nvSpPr>
+        <p:spPr>
+          <a:xfrm>
+            <a:off x="311700" y="445025"/>
+            <a:ext cx="8520600" cy="572700"/>
+          </a:xfrm>
+          <a:prstGeom prst="rect">
+            <a:avLst/>
+          </a:prstGeom>
+        </p:spPr>
+        <p:txBody>
+          <a:bodyPr spcFirstLastPara="1" wrap="square" lIns="91425" tIns="91425" rIns="91425" bIns="91425" anchor="t" anchorCtr="0">
+            <a:noAutofit/>
+          </a:bodyPr>
+          <a:lstStyle/>
+          <a:p>
+            <a:pPr marL="0" lvl="0" indent="0" algn="l" rtl="0">
+              <a:spcBef>
+                <a:spcPts val="0"/>
+              </a:spcBef>
+              <a:spcAft>
+                <a:spcPts val="0"/>
+              </a:spcAft>
+              <a:buNone/>
+            </a:pPr>
+            <a:r>
+              <a:rPr lang="en"/>
+              <a:t>Version Control Evidence</a:t>
+            </a:r>
+            <a:endParaRPr/>
+          </a:p>
+        </p:txBody>
+      </p:sp>
+      <p:sp>
+        <p:nvSpPr>
+          <p:cNvPr id="85" name="Google Shape;85;p18"/>
+          <p:cNvSpPr txBox="1">
+            <a:spLocks noGrp="1"/>
+          </p:cNvSpPr>
+          <p:nvPr>
+            <p:ph type="body" idx="1"/>
+          </p:nvPr>
+        </p:nvSpPr>
+        <p:spPr>
+          <a:xfrm>
+            <a:off x="311700" y="1152475"/>
+            <a:ext cx="8464200" cy="3739200"/>
+          </a:xfrm>
+          <a:prstGeom prst="rect">
+            <a:avLst/>
+          </a:prstGeom>
+        </p:spPr>
+        <p:txBody>
+          <a:bodyPr spcFirstLastPara="1" wrap="square" lIns="91425" tIns="91425" rIns="91425" bIns="91425" anchor="t" anchorCtr="0">
+            <a:noAutofit/>
+          </a:bodyPr>
+          <a:lstStyle/>
+          <a:p>
+            <a:pPr marL="0" lvl="0" indent="0" algn="l" rtl="0">
+              <a:spcBef>
+                <a:spcPts val="0"/>
+              </a:spcBef>
+              <a:spcAft>
+                <a:spcPts val="1600"/>
+              </a:spcAft>
+              <a:buNone/>
+            </a:pPr>
+            <a:r>
+              <a:rPr lang="en" i="1"/>
+              <a:t>Your version control evidence should go here.  This could be in the form of annotated screenshots which show you you managed this process or you could make a brief screencast explaining how you implemented version control.</a:t>
+            </a:r>
+            <a:endParaRPr i="1"/>
+          </a:p>
+        </p:txBody>
+      </p:sp>
+    </p:spTree>
+  </p:cSld>
+  <p:clrMapOvr>
+    <a:masterClrMapping/>
+  </p:clrMapOvr>
+</p:sld>
+</file>
+
+<file path=ppt/slides/slide14.xml><?xml version="1.0" encoding="utf-8"?>
+<p:sld xmlns:a="http://schemas.openxmlformats.org/drawingml/2006/main" xmlns:r="http://schemas.openxmlformats.org/officeDocument/2006/relationships" xmlns:p="http://schemas.openxmlformats.org/presentationml/2006/main">
+  <p:cSld>
     <p:bg>
       <p:bgPr>
         <a:solidFill>
@@ -8209,10 +10029,40 @@
           <a:bodyPr/>
           <a:lstStyle/>
           <a:p>
-            <a:endParaRPr lang="en-NZ"/>
+            <a:endParaRPr lang="en-NZ" dirty="0"/>
           </a:p>
         </p:txBody>
       </p:sp>
+      <p:pic>
+        <p:nvPicPr>
+          <p:cNvPr id="5" name="Picture 4">
+            <a:extLst>
+              <a:ext uri="{FF2B5EF4-FFF2-40B4-BE49-F238E27FC236}">
+                <a16:creationId xmlns:a16="http://schemas.microsoft.com/office/drawing/2014/main" id="{5B487D94-EF87-4D06-BB95-183998455A5F}"/>
+              </a:ext>
+            </a:extLst>
+          </p:cNvPr>
+          <p:cNvPicPr>
+            <a:picLocks noChangeAspect="1"/>
+          </p:cNvPicPr>
+          <p:nvPr/>
+        </p:nvPicPr>
+        <p:blipFill>
+          <a:blip r:embed="rId2"/>
+          <a:stretch>
+            <a:fillRect/>
+          </a:stretch>
+        </p:blipFill>
+        <p:spPr>
+          <a:xfrm>
+            <a:off x="586408" y="1301342"/>
+            <a:ext cx="5357191" cy="1411777"/>
+          </a:xfrm>
+          <a:prstGeom prst="rect">
+            <a:avLst/>
+          </a:prstGeom>
+        </p:spPr>
+      </p:pic>
     </p:spTree>
     <p:extLst>
       <p:ext uri="{BB962C8B-B14F-4D97-AF65-F5344CB8AC3E}">
@@ -8279,7 +10129,7 @@
             </a:pPr>
             <a:r>
               <a:rPr lang="en" dirty="0"/>
-              <a:t>Component 2 - Test Plan (?and screenshot)</a:t>
+              <a:t>Component 2 version 1 - Test Plan (?and screenshot)</a:t>
             </a:r>
             <a:endParaRPr dirty="0"/>
           </a:p>
@@ -8292,14 +10142,14 @@
           <p:nvPr>
             <p:extLst>
               <p:ext uri="{D42A27DB-BD31-4B8C-83A1-F6EECF244321}">
-                <p14:modId xmlns:p14="http://schemas.microsoft.com/office/powerpoint/2010/main" val="2726191236"/>
+                <p14:modId xmlns:p14="http://schemas.microsoft.com/office/powerpoint/2010/main" val="1509083329"/>
               </p:ext>
             </p:extLst>
           </p:nvPr>
         </p:nvGraphicFramePr>
         <p:xfrm>
-          <a:off x="311700" y="3960287"/>
-          <a:ext cx="8520600" cy="2194470"/>
+          <a:off x="411091" y="3913302"/>
+          <a:ext cx="8520600" cy="1462980"/>
         </p:xfrm>
         <a:graphic>
           <a:graphicData uri="http://schemas.openxmlformats.org/drawingml/2006/table">
@@ -8435,7 +10285,316 @@
                       </a:pPr>
                       <a:r>
                         <a:rPr lang="en-US" sz="1800" dirty="0"/>
-                        <a:t>Main and welcome run correctly. Welcome message prints with random name.  </a:t>
+                        <a:t>Enter p program prints pickup</a:t>
+                      </a:r>
+                    </a:p>
+                    <a:p>
+                      <a:pPr marL="0" marR="0" lvl="0" indent="0" algn="l" defTabSz="914400" rtl="0" eaLnBrk="1" fontAlgn="auto" latinLnBrk="0" hangingPunct="1">
+                        <a:lnSpc>
+                          <a:spcPct val="100000"/>
+                        </a:lnSpc>
+                        <a:spcBef>
+                          <a:spcPts val="0"/>
+                        </a:spcBef>
+                        <a:spcAft>
+                          <a:spcPts val="0"/>
+                        </a:spcAft>
+                        <a:buClr>
+                          <a:srgbClr val="000000"/>
+                        </a:buClr>
+                        <a:buSzTx/>
+                        <a:buFont typeface="Arial"/>
+                        <a:buNone/>
+                        <a:tabLst/>
+                        <a:defRPr/>
+                      </a:pPr>
+                      <a:r>
+                        <a:rPr lang="en-US" sz="1800" dirty="0"/>
+                        <a:t>Enter d program prints delivery</a:t>
+                      </a:r>
+                    </a:p>
+                    <a:p>
+                      <a:pPr marL="0" marR="0" lvl="0" indent="0" algn="l" defTabSz="914400" rtl="0" eaLnBrk="1" fontAlgn="auto" latinLnBrk="0" hangingPunct="1">
+                        <a:lnSpc>
+                          <a:spcPct val="100000"/>
+                        </a:lnSpc>
+                        <a:spcBef>
+                          <a:spcPts val="0"/>
+                        </a:spcBef>
+                        <a:spcAft>
+                          <a:spcPts val="0"/>
+                        </a:spcAft>
+                        <a:buClr>
+                          <a:srgbClr val="000000"/>
+                        </a:buClr>
+                        <a:buSzTx/>
+                        <a:buFont typeface="Arial"/>
+                        <a:buNone/>
+                        <a:tabLst/>
+                        <a:defRPr/>
+                      </a:pPr>
+                      <a:r>
+                        <a:rPr lang="en-US" sz="1800" dirty="0"/>
+                        <a:t>Enter invalid program stops</a:t>
+                      </a:r>
+                      <a:endParaRPr sz="1800" dirty="0"/>
+                    </a:p>
+                  </a:txBody>
+                  <a:tcPr marL="91425" marR="91425" marT="91425" marB="91425"/>
+                </a:tc>
+                <a:extLst>
+                  <a:ext uri="{0D108BD9-81ED-4DB2-BD59-A6C34878D82A}">
+                    <a16:rowId xmlns:a16="http://schemas.microsoft.com/office/drawing/2014/main" val="10001"/>
+                  </a:ext>
+                </a:extLst>
+              </a:tr>
+            </a:tbl>
+          </a:graphicData>
+        </a:graphic>
+      </p:graphicFrame>
+      <p:pic>
+        <p:nvPicPr>
+          <p:cNvPr id="3" name="Picture 2">
+            <a:extLst>
+              <a:ext uri="{FF2B5EF4-FFF2-40B4-BE49-F238E27FC236}">
+                <a16:creationId xmlns:a16="http://schemas.microsoft.com/office/drawing/2014/main" id="{23BA341E-02C3-4385-BCD0-BEFE97FE294C}"/>
+              </a:ext>
+            </a:extLst>
+          </p:cNvPr>
+          <p:cNvPicPr>
+            <a:picLocks noChangeAspect="1"/>
+          </p:cNvPicPr>
+          <p:nvPr/>
+        </p:nvPicPr>
+        <p:blipFill>
+          <a:blip r:embed="rId3"/>
+          <a:stretch>
+            <a:fillRect/>
+          </a:stretch>
+        </p:blipFill>
+        <p:spPr>
+          <a:xfrm>
+            <a:off x="2582775" y="1017725"/>
+            <a:ext cx="3282710" cy="2783805"/>
+          </a:xfrm>
+          <a:prstGeom prst="rect">
+            <a:avLst/>
+          </a:prstGeom>
+        </p:spPr>
+      </p:pic>
+    </p:spTree>
+    <p:extLst>
+      <p:ext uri="{BB962C8B-B14F-4D97-AF65-F5344CB8AC3E}">
+        <p14:creationId xmlns:p14="http://schemas.microsoft.com/office/powerpoint/2010/main" val="2073674580"/>
+      </p:ext>
+    </p:extLst>
+  </p:cSld>
+  <p:clrMapOvr>
+    <a:masterClrMapping/>
+  </p:clrMapOvr>
+</p:sld>
+</file>
+
+<file path=ppt/slides/slide9.xml><?xml version="1.0" encoding="utf-8"?>
+<p:sld xmlns:a="http://schemas.openxmlformats.org/drawingml/2006/main" xmlns:r="http://schemas.openxmlformats.org/officeDocument/2006/relationships" xmlns:p="http://schemas.openxmlformats.org/presentationml/2006/main">
+  <p:cSld>
+    <p:spTree>
+      <p:nvGrpSpPr>
+        <p:cNvPr id="1" name="Shape 77"/>
+        <p:cNvGrpSpPr/>
+        <p:nvPr/>
+      </p:nvGrpSpPr>
+      <p:grpSpPr>
+        <a:xfrm>
+          <a:off x="0" y="0"/>
+          <a:ext cx="0" cy="0"/>
+          <a:chOff x="0" y="0"/>
+          <a:chExt cx="0" cy="0"/>
+        </a:xfrm>
+      </p:grpSpPr>
+      <p:sp>
+        <p:nvSpPr>
+          <p:cNvPr id="78" name="Google Shape;78;p17"/>
+          <p:cNvSpPr txBox="1">
+            <a:spLocks noGrp="1"/>
+          </p:cNvSpPr>
+          <p:nvPr>
+            <p:ph type="title"/>
+          </p:nvPr>
+        </p:nvSpPr>
+        <p:spPr>
+          <a:xfrm>
+            <a:off x="311700" y="445025"/>
+            <a:ext cx="8520600" cy="572700"/>
+          </a:xfrm>
+          <a:prstGeom prst="rect">
+            <a:avLst/>
+          </a:prstGeom>
+        </p:spPr>
+        <p:txBody>
+          <a:bodyPr spcFirstLastPara="1" wrap="square" lIns="91425" tIns="91425" rIns="91425" bIns="91425" anchor="t" anchorCtr="0">
+            <a:noAutofit/>
+          </a:bodyPr>
+          <a:lstStyle/>
+          <a:p>
+            <a:pPr marL="0" lvl="0" indent="0" algn="l" rtl="0">
+              <a:spcBef>
+                <a:spcPts val="0"/>
+              </a:spcBef>
+              <a:spcAft>
+                <a:spcPts val="0"/>
+              </a:spcAft>
+              <a:buNone/>
+            </a:pPr>
+            <a:r>
+              <a:rPr lang="en" dirty="0"/>
+              <a:t>Component 2 v2 - Test Plan (?and screenshot)</a:t>
+            </a:r>
+            <a:endParaRPr dirty="0"/>
+          </a:p>
+        </p:txBody>
+      </p:sp>
+      <p:graphicFrame>
+        <p:nvGraphicFramePr>
+          <p:cNvPr id="79" name="Google Shape;79;p17"/>
+          <p:cNvGraphicFramePr/>
+          <p:nvPr>
+            <p:extLst>
+              <p:ext uri="{D42A27DB-BD31-4B8C-83A1-F6EECF244321}">
+                <p14:modId xmlns:p14="http://schemas.microsoft.com/office/powerpoint/2010/main" val="3618628985"/>
+              </p:ext>
+            </p:extLst>
+          </p:nvPr>
+        </p:nvGraphicFramePr>
+        <p:xfrm>
+          <a:off x="311700" y="3960287"/>
+          <a:ext cx="8520600" cy="2194470"/>
+        </p:xfrm>
+        <a:graphic>
+          <a:graphicData uri="http://schemas.openxmlformats.org/drawingml/2006/table">
+            <a:tbl>
+              <a:tblPr>
+                <a:noFill/>
+                <a:tableStyleId>{E1099E06-0E6B-448D-9D27-60429F06E6F4}</a:tableStyleId>
+              </a:tblPr>
+              <a:tblGrid>
+                <a:gridCol w="4260300">
+                  <a:extLst>
+                    <a:ext uri="{9D8B030D-6E8A-4147-A177-3AD203B41FA5}">
+                      <a16:colId xmlns:a16="http://schemas.microsoft.com/office/drawing/2014/main" val="20000"/>
+                    </a:ext>
+                  </a:extLst>
+                </a:gridCol>
+                <a:gridCol w="4260300">
+                  <a:extLst>
+                    <a:ext uri="{9D8B030D-6E8A-4147-A177-3AD203B41FA5}">
+                      <a16:colId xmlns:a16="http://schemas.microsoft.com/office/drawing/2014/main" val="20001"/>
+                    </a:ext>
+                  </a:extLst>
+                </a:gridCol>
+              </a:tblGrid>
+              <a:tr h="0">
+                <a:tc>
+                  <a:txBody>
+                    <a:bodyPr/>
+                    <a:lstStyle/>
+                    <a:p>
+                      <a:pPr marL="0" lvl="0" indent="0" algn="l" rtl="0">
+                        <a:spcBef>
+                          <a:spcPts val="0"/>
+                        </a:spcBef>
+                        <a:spcAft>
+                          <a:spcPts val="0"/>
+                        </a:spcAft>
+                        <a:buNone/>
+                      </a:pPr>
+                      <a:r>
+                        <a:rPr lang="en" sz="1800" b="1" dirty="0"/>
+                        <a:t>Test Case</a:t>
+                      </a:r>
+                      <a:endParaRPr sz="1800" b="1" dirty="0"/>
+                    </a:p>
+                  </a:txBody>
+                  <a:tcPr marL="91425" marR="91425" marT="91425" marB="91425">
+                    <a:solidFill>
+                      <a:srgbClr val="CCCCCC"/>
+                    </a:solidFill>
+                  </a:tcPr>
+                </a:tc>
+                <a:tc>
+                  <a:txBody>
+                    <a:bodyPr/>
+                    <a:lstStyle/>
+                    <a:p>
+                      <a:pPr marL="0" lvl="0" indent="0" algn="l" rtl="0">
+                        <a:spcBef>
+                          <a:spcPts val="0"/>
+                        </a:spcBef>
+                        <a:spcAft>
+                          <a:spcPts val="0"/>
+                        </a:spcAft>
+                        <a:buNone/>
+                      </a:pPr>
+                      <a:r>
+                        <a:rPr lang="en" sz="1800" b="1" dirty="0"/>
+                        <a:t>Expected Values</a:t>
+                      </a:r>
+                      <a:endParaRPr sz="1800" b="1" dirty="0"/>
+                    </a:p>
+                  </a:txBody>
+                  <a:tcPr marL="91425" marR="91425" marT="91425" marB="91425">
+                    <a:solidFill>
+                      <a:srgbClr val="CCCCCC"/>
+                    </a:solidFill>
+                  </a:tcPr>
+                </a:tc>
+                <a:extLst>
+                  <a:ext uri="{0D108BD9-81ED-4DB2-BD59-A6C34878D82A}">
+                    <a16:rowId xmlns:a16="http://schemas.microsoft.com/office/drawing/2014/main" val="10000"/>
+                  </a:ext>
+                </a:extLst>
+              </a:tr>
+              <a:tr h="396200">
+                <a:tc>
+                  <a:txBody>
+                    <a:bodyPr/>
+                    <a:lstStyle/>
+                    <a:p>
+                      <a:pPr marL="0" lvl="0" indent="0" algn="l" rtl="0">
+                        <a:spcBef>
+                          <a:spcPts val="0"/>
+                        </a:spcBef>
+                        <a:spcAft>
+                          <a:spcPts val="0"/>
+                        </a:spcAft>
+                        <a:buNone/>
+                      </a:pPr>
+                      <a:r>
+                        <a:rPr lang="en-NZ" sz="1800" dirty="0"/>
+                        <a:t>Run programme</a:t>
+                      </a:r>
+                      <a:endParaRPr sz="1800" dirty="0"/>
+                    </a:p>
+                  </a:txBody>
+                  <a:tcPr marL="91425" marR="91425" marT="91425" marB="91425"/>
+                </a:tc>
+                <a:tc>
+                  <a:txBody>
+                    <a:bodyPr/>
+                    <a:lstStyle/>
+                    <a:p>
+                      <a:pPr marL="0" lvl="0" indent="0" algn="l" rtl="0">
+                        <a:spcBef>
+                          <a:spcPts val="0"/>
+                        </a:spcBef>
+                        <a:spcAft>
+                          <a:spcPts val="0"/>
+                        </a:spcAft>
+                        <a:buNone/>
+                      </a:pPr>
+                      <a:r>
+                        <a:rPr lang="en-NZ" sz="1800" dirty="0"/>
+                        <a:t>Enter p program prints pickup</a:t>
                       </a:r>
                     </a:p>
                     <a:p>
@@ -8448,6 +10607,25 @@
                         </a:spcAft>
                         <a:buNone/>
                       </a:pPr>
+                      <a:r>
+                        <a:rPr lang="en-NZ" sz="1800" dirty="0"/>
+                        <a:t>Enter d program prints deliver</a:t>
+                      </a:r>
+                    </a:p>
+                    <a:p>
+                      <a:pPr marL="0" lvl="0" indent="0" algn="l" rtl="0">
+                        <a:spcBef>
+                          <a:spcPts val="0"/>
+                        </a:spcBef>
+                        <a:spcAft>
+                          <a:spcPts val="0"/>
+                        </a:spcAft>
+                        <a:buNone/>
+                      </a:pPr>
+                      <a:r>
+                        <a:rPr lang="en-NZ" sz="1800" dirty="0"/>
+                        <a:t>Enter invalid program prints error message</a:t>
+                      </a:r>
                       <a:endParaRPr sz="1800" dirty="0"/>
                     </a:p>
                   </a:txBody>
@@ -8510,10 +10688,10 @@
       </p:graphicFrame>
       <p:pic>
         <p:nvPicPr>
-          <p:cNvPr id="4" name="Picture 3">
+          <p:cNvPr id="5" name="Picture 4">
             <a:extLst>
               <a:ext uri="{FF2B5EF4-FFF2-40B4-BE49-F238E27FC236}">
-                <a16:creationId xmlns:a16="http://schemas.microsoft.com/office/drawing/2014/main" id="{976A0231-75F0-4183-92B1-9941888C23F8}"/>
+                <a16:creationId xmlns:a16="http://schemas.microsoft.com/office/drawing/2014/main" id="{C25B2C43-CDCB-4690-B8A6-BB4E44298424}"/>
               </a:ext>
             </a:extLst>
           </p:cNvPr>
@@ -8530,38 +10708,8 @@
         </p:blipFill>
         <p:spPr>
           <a:xfrm>
-            <a:off x="480665" y="1432133"/>
-            <a:ext cx="3232438" cy="2279234"/>
-          </a:xfrm>
-          <a:prstGeom prst="rect">
-            <a:avLst/>
-          </a:prstGeom>
-        </p:spPr>
-      </p:pic>
-      <p:pic>
-        <p:nvPicPr>
-          <p:cNvPr id="3" name="Picture 2">
-            <a:extLst>
-              <a:ext uri="{FF2B5EF4-FFF2-40B4-BE49-F238E27FC236}">
-                <a16:creationId xmlns:a16="http://schemas.microsoft.com/office/drawing/2014/main" id="{A6F8F1CA-4423-4F47-839D-94983EBDB959}"/>
-              </a:ext>
-            </a:extLst>
-          </p:cNvPr>
-          <p:cNvPicPr>
-            <a:picLocks noChangeAspect="1"/>
-          </p:cNvPicPr>
-          <p:nvPr/>
-        </p:nvPicPr>
-        <p:blipFill>
-          <a:blip r:embed="rId4"/>
-          <a:stretch>
-            <a:fillRect/>
-          </a:stretch>
-        </p:blipFill>
-        <p:spPr>
-          <a:xfrm>
-            <a:off x="3955360" y="1835633"/>
-            <a:ext cx="5061998" cy="914340"/>
+            <a:off x="1242391" y="1110698"/>
+            <a:ext cx="2598862" cy="2571750"/>
           </a:xfrm>
           <a:prstGeom prst="rect">
             <a:avLst/>
@@ -8574,123 +10722,6 @@
         <p14:creationId xmlns:p14="http://schemas.microsoft.com/office/powerpoint/2010/main" val="3427482966"/>
       </p:ext>
     </p:extLst>
-  </p:cSld>
-  <p:clrMapOvr>
-    <a:masterClrMapping/>
-  </p:clrMapOvr>
-</p:sld>
-</file>
-
-<file path=ppt/slides/slide9.xml><?xml version="1.0" encoding="utf-8"?>
-<p:sld xmlns:a="http://schemas.openxmlformats.org/drawingml/2006/main" xmlns:r="http://schemas.openxmlformats.org/officeDocument/2006/relationships" xmlns:p="http://schemas.openxmlformats.org/presentationml/2006/main">
-  <p:cSld>
-    <p:bg>
-      <p:bgPr>
-        <a:solidFill>
-          <a:srgbClr val="D9EAD3"/>
-        </a:solidFill>
-        <a:effectLst/>
-      </p:bgPr>
-    </p:bg>
-    <p:spTree>
-      <p:nvGrpSpPr>
-        <p:cNvPr id="1" name="Shape 83"/>
-        <p:cNvGrpSpPr/>
-        <p:nvPr/>
-      </p:nvGrpSpPr>
-      <p:grpSpPr>
-        <a:xfrm>
-          <a:off x="0" y="0"/>
-          <a:ext cx="0" cy="0"/>
-          <a:chOff x="0" y="0"/>
-          <a:chExt cx="0" cy="0"/>
-        </a:xfrm>
-      </p:grpSpPr>
-      <p:sp>
-        <p:nvSpPr>
-          <p:cNvPr id="84" name="Google Shape;84;p18"/>
-          <p:cNvSpPr txBox="1">
-            <a:spLocks noGrp="1"/>
-          </p:cNvSpPr>
-          <p:nvPr>
-            <p:ph type="title"/>
-          </p:nvPr>
-        </p:nvSpPr>
-        <p:spPr>
-          <a:xfrm>
-            <a:off x="311700" y="445025"/>
-            <a:ext cx="8520600" cy="572700"/>
-          </a:xfrm>
-          <a:prstGeom prst="rect">
-            <a:avLst/>
-          </a:prstGeom>
-        </p:spPr>
-        <p:txBody>
-          <a:bodyPr spcFirstLastPara="1" wrap="square" lIns="91425" tIns="91425" rIns="91425" bIns="91425" anchor="t" anchorCtr="0">
-            <a:noAutofit/>
-          </a:bodyPr>
-          <a:lstStyle/>
-          <a:p>
-            <a:pPr marL="0" lvl="0" indent="0" algn="l" rtl="0">
-              <a:spcBef>
-                <a:spcPts val="0"/>
-              </a:spcBef>
-              <a:spcAft>
-                <a:spcPts val="0"/>
-              </a:spcAft>
-              <a:buNone/>
-            </a:pPr>
-            <a:r>
-              <a:rPr lang="en"/>
-              <a:t>Version Control Evidence</a:t>
-            </a:r>
-            <a:endParaRPr/>
-          </a:p>
-        </p:txBody>
-      </p:sp>
-      <p:sp>
-        <p:nvSpPr>
-          <p:cNvPr id="85" name="Google Shape;85;p18"/>
-          <p:cNvSpPr txBox="1">
-            <a:spLocks noGrp="1"/>
-          </p:cNvSpPr>
-          <p:nvPr>
-            <p:ph type="body" idx="1"/>
-          </p:nvPr>
-        </p:nvSpPr>
-        <p:spPr>
-          <a:xfrm>
-            <a:off x="311700" y="1152475"/>
-            <a:ext cx="8464200" cy="3739200"/>
-          </a:xfrm>
-          <a:prstGeom prst="rect">
-            <a:avLst/>
-          </a:prstGeom>
-        </p:spPr>
-        <p:txBody>
-          <a:bodyPr spcFirstLastPara="1" wrap="square" lIns="91425" tIns="91425" rIns="91425" bIns="91425" anchor="t" anchorCtr="0">
-            <a:noAutofit/>
-          </a:bodyPr>
-          <a:lstStyle/>
-          <a:p>
-            <a:pPr marL="0" lvl="0" indent="0" algn="l" rtl="0">
-              <a:spcBef>
-                <a:spcPts val="0"/>
-              </a:spcBef>
-              <a:spcAft>
-                <a:spcPts val="1600"/>
-              </a:spcAft>
-              <a:buNone/>
-            </a:pPr>
-            <a:r>
-              <a:rPr lang="en" i="1"/>
-              <a:t>Your version control evidence should go here.  This could be in the form of annotated screenshots which show you you managed this process or you could make a brief screencast explaining how you implemented version control.</a:t>
-            </a:r>
-            <a:endParaRPr i="1"/>
-          </a:p>
-        </p:txBody>
-      </p:sp>
-    </p:spTree>
   </p:cSld>
   <p:clrMapOvr>
     <a:masterClrMapping/>

</xml_diff>

<commit_message>
Added version 1 pizza_menu
Created a basic pizza menu
</commit_message>
<xml_diff>
--- a/022_91893+_+91897+Documentation.pptx
+++ b/022_91893+_+91897+Documentation.pptx
@@ -5,7 +5,7 @@
     <p:sldMasterId id="2147483659" r:id="rId1"/>
   </p:sldMasterIdLst>
   <p:notesMasterIdLst>
-    <p:notesMasterId r:id="rId27"/>
+    <p:notesMasterId r:id="rId32"/>
   </p:notesMasterIdLst>
   <p:sldIdLst>
     <p:sldId id="256" r:id="rId2"/>
@@ -31,8 +31,13 @@
     <p:sldId id="278" r:id="rId22"/>
     <p:sldId id="279" r:id="rId23"/>
     <p:sldId id="280" r:id="rId24"/>
-    <p:sldId id="261" r:id="rId25"/>
-    <p:sldId id="262" r:id="rId26"/>
+    <p:sldId id="282" r:id="rId25"/>
+    <p:sldId id="281" r:id="rId26"/>
+    <p:sldId id="283" r:id="rId27"/>
+    <p:sldId id="284" r:id="rId28"/>
+    <p:sldId id="285" r:id="rId29"/>
+    <p:sldId id="261" r:id="rId30"/>
+    <p:sldId id="262" r:id="rId31"/>
   </p:sldIdLst>
   <p:sldSz cx="9144000" cy="5143500" type="screen16x9"/>
   <p:notesSz cx="6858000" cy="9144000"/>
@@ -287,7 +292,7 @@
 <file path=ppt/revisionInfo.xml><?xml version="1.0" encoding="utf-8"?>
 <p1510:revInfo xmlns:a="http://schemas.openxmlformats.org/drawingml/2006/main" xmlns:r="http://schemas.openxmlformats.org/officeDocument/2006/relationships" xmlns:p1510="http://schemas.microsoft.com/office/powerpoint/2015/10/main">
   <p1510:revLst>
-    <p1510:client id="{A4AAC254-D7E0-4DF8-8DE4-52E7473F4233}" v="9" dt="2022-03-04T01:45:22.367"/>
+    <p1510:client id="{A4AAC254-D7E0-4DF8-8DE4-52E7473F4233}" v="10" dt="2022-03-07T01:38:13.045"/>
   </p1510:revLst>
 </p1510:revInfo>
 </file>
@@ -297,7 +302,7 @@
   <pc:docChgLst>
     <pc:chgData name="Jodek" userId="e5b00c06eb42c71a" providerId="LiveId" clId="{A4AAC254-D7E0-4DF8-8DE4-52E7473F4233}"/>
     <pc:docChg chg="custSel addSld delSld modSld sldOrd">
-      <pc:chgData name="Jodek" userId="e5b00c06eb42c71a" providerId="LiveId" clId="{A4AAC254-D7E0-4DF8-8DE4-52E7473F4233}" dt="2022-03-04T01:51:26.312" v="1639" actId="1076"/>
+      <pc:chgData name="Jodek" userId="e5b00c06eb42c71a" providerId="LiveId" clId="{A4AAC254-D7E0-4DF8-8DE4-52E7473F4233}" dt="2022-03-07T01:39:51.966" v="1838" actId="20577"/>
       <pc:docMkLst>
         <pc:docMk/>
       </pc:docMkLst>
@@ -1074,7 +1079,7 @@
         </pc:picChg>
       </pc:sldChg>
       <pc:sldChg chg="addSp delSp modSp add mod ord">
-        <pc:chgData name="Jodek" userId="e5b00c06eb42c71a" providerId="LiveId" clId="{A4AAC254-D7E0-4DF8-8DE4-52E7473F4233}" dt="2022-03-04T01:51:26.312" v="1639" actId="1076"/>
+        <pc:chgData name="Jodek" userId="e5b00c06eb42c71a" providerId="LiveId" clId="{A4AAC254-D7E0-4DF8-8DE4-52E7473F4233}" dt="2022-03-04T02:07:31.889" v="1704" actId="20577"/>
         <pc:sldMkLst>
           <pc:docMk/>
           <pc:sldMk cId="3884760378" sldId="280"/>
@@ -1088,7 +1093,7 @@
           </ac:spMkLst>
         </pc:spChg>
         <pc:graphicFrameChg chg="mod modGraphic">
-          <ac:chgData name="Jodek" userId="e5b00c06eb42c71a" providerId="LiveId" clId="{A4AAC254-D7E0-4DF8-8DE4-52E7473F4233}" dt="2022-03-04T01:51:26.312" v="1639" actId="1076"/>
+          <ac:chgData name="Jodek" userId="e5b00c06eb42c71a" providerId="LiveId" clId="{A4AAC254-D7E0-4DF8-8DE4-52E7473F4233}" dt="2022-03-04T02:07:31.889" v="1704" actId="20577"/>
           <ac:graphicFrameMkLst>
             <pc:docMk/>
             <pc:sldMk cId="3884760378" sldId="280"/>
@@ -1117,6 +1122,209 @@
             <pc:docMk/>
             <pc:sldMk cId="3884760378" sldId="280"/>
             <ac:picMk id="6" creationId="{66492AB1-6652-44A3-951E-93E57FC79DFC}"/>
+          </ac:picMkLst>
+        </pc:picChg>
+      </pc:sldChg>
+      <pc:sldChg chg="addSp delSp modSp add mod">
+        <pc:chgData name="Jodek" userId="e5b00c06eb42c71a" providerId="LiveId" clId="{A4AAC254-D7E0-4DF8-8DE4-52E7473F4233}" dt="2022-03-04T02:07:37.618" v="1716" actId="20577"/>
+        <pc:sldMkLst>
+          <pc:docMk/>
+          <pc:sldMk cId="1675299264" sldId="281"/>
+        </pc:sldMkLst>
+        <pc:spChg chg="mod">
+          <ac:chgData name="Jodek" userId="e5b00c06eb42c71a" providerId="LiveId" clId="{A4AAC254-D7E0-4DF8-8DE4-52E7473F4233}" dt="2022-03-04T01:57:08.241" v="1647" actId="20577"/>
+          <ac:spMkLst>
+            <pc:docMk/>
+            <pc:sldMk cId="1675299264" sldId="281"/>
+            <ac:spMk id="78" creationId="{00000000-0000-0000-0000-000000000000}"/>
+          </ac:spMkLst>
+        </pc:spChg>
+        <pc:graphicFrameChg chg="modGraphic">
+          <ac:chgData name="Jodek" userId="e5b00c06eb42c71a" providerId="LiveId" clId="{A4AAC254-D7E0-4DF8-8DE4-52E7473F4233}" dt="2022-03-04T02:07:37.618" v="1716" actId="20577"/>
+          <ac:graphicFrameMkLst>
+            <pc:docMk/>
+            <pc:sldMk cId="1675299264" sldId="281"/>
+            <ac:graphicFrameMk id="79" creationId="{00000000-0000-0000-0000-000000000000}"/>
+          </ac:graphicFrameMkLst>
+        </pc:graphicFrameChg>
+        <pc:picChg chg="del">
+          <ac:chgData name="Jodek" userId="e5b00c06eb42c71a" providerId="LiveId" clId="{A4AAC254-D7E0-4DF8-8DE4-52E7473F4233}" dt="2022-03-04T01:57:10.223" v="1648" actId="478"/>
+          <ac:picMkLst>
+            <pc:docMk/>
+            <pc:sldMk cId="1675299264" sldId="281"/>
+            <ac:picMk id="3" creationId="{1F13A2EB-AD47-40F3-BA8E-C4D0CD21A921}"/>
+          </ac:picMkLst>
+        </pc:picChg>
+        <pc:picChg chg="add mod">
+          <ac:chgData name="Jodek" userId="e5b00c06eb42c71a" providerId="LiveId" clId="{A4AAC254-D7E0-4DF8-8DE4-52E7473F4233}" dt="2022-03-04T02:05:20.487" v="1663" actId="1076"/>
+          <ac:picMkLst>
+            <pc:docMk/>
+            <pc:sldMk cId="1675299264" sldId="281"/>
+            <ac:picMk id="4" creationId="{D1E90186-0F7E-4A5A-9D8C-83EBAD311C40}"/>
+          </ac:picMkLst>
+        </pc:picChg>
+        <pc:picChg chg="del">
+          <ac:chgData name="Jodek" userId="e5b00c06eb42c71a" providerId="LiveId" clId="{A4AAC254-D7E0-4DF8-8DE4-52E7473F4233}" dt="2022-03-04T01:57:10.493" v="1649" actId="478"/>
+          <ac:picMkLst>
+            <pc:docMk/>
+            <pc:sldMk cId="1675299264" sldId="281"/>
+            <ac:picMk id="6" creationId="{66492AB1-6652-44A3-951E-93E57FC79DFC}"/>
+          </ac:picMkLst>
+        </pc:picChg>
+        <pc:picChg chg="add mod">
+          <ac:chgData name="Jodek" userId="e5b00c06eb42c71a" providerId="LiveId" clId="{A4AAC254-D7E0-4DF8-8DE4-52E7473F4233}" dt="2022-03-04T02:06:06.437" v="1666" actId="1076"/>
+          <ac:picMkLst>
+            <pc:docMk/>
+            <pc:sldMk cId="1675299264" sldId="281"/>
+            <ac:picMk id="7" creationId="{EF288939-9932-40CB-8CA2-145F01C67BC4}"/>
+          </ac:picMkLst>
+        </pc:picChg>
+      </pc:sldChg>
+      <pc:sldChg chg="addSp delSp modSp add mod ord">
+        <pc:chgData name="Jodek" userId="e5b00c06eb42c71a" providerId="LiveId" clId="{A4AAC254-D7E0-4DF8-8DE4-52E7473F4233}" dt="2022-03-04T01:58:02.630" v="1657" actId="1076"/>
+        <pc:sldMkLst>
+          <pc:docMk/>
+          <pc:sldMk cId="917565860" sldId="282"/>
+        </pc:sldMkLst>
+        <pc:spChg chg="mod">
+          <ac:chgData name="Jodek" userId="e5b00c06eb42c71a" providerId="LiveId" clId="{A4AAC254-D7E0-4DF8-8DE4-52E7473F4233}" dt="2022-03-04T01:57:04.512" v="1646" actId="20577"/>
+          <ac:spMkLst>
+            <pc:docMk/>
+            <pc:sldMk cId="917565860" sldId="282"/>
+            <ac:spMk id="2" creationId="{C3DFE246-6269-4B71-B16A-DAFB87B63AF2}"/>
+          </ac:spMkLst>
+        </pc:spChg>
+        <pc:picChg chg="del mod">
+          <ac:chgData name="Jodek" userId="e5b00c06eb42c71a" providerId="LiveId" clId="{A4AAC254-D7E0-4DF8-8DE4-52E7473F4233}" dt="2022-03-04T01:57:59.580" v="1653" actId="478"/>
+          <ac:picMkLst>
+            <pc:docMk/>
+            <pc:sldMk cId="917565860" sldId="282"/>
+            <ac:picMk id="5" creationId="{290984D5-4C56-47B1-80C5-C269D07E9BA1}"/>
+          </ac:picMkLst>
+        </pc:picChg>
+        <pc:picChg chg="add mod">
+          <ac:chgData name="Jodek" userId="e5b00c06eb42c71a" providerId="LiveId" clId="{A4AAC254-D7E0-4DF8-8DE4-52E7473F4233}" dt="2022-03-04T01:58:02.630" v="1657" actId="1076"/>
+          <ac:picMkLst>
+            <pc:docMk/>
+            <pc:sldMk cId="917565860" sldId="282"/>
+            <ac:picMk id="6" creationId="{5E9DCE5D-208C-4B87-A119-5981E3D386A3}"/>
+          </ac:picMkLst>
+        </pc:picChg>
+      </pc:sldChg>
+      <pc:sldChg chg="addSp delSp modSp add mod">
+        <pc:chgData name="Jodek" userId="e5b00c06eb42c71a" providerId="LiveId" clId="{A4AAC254-D7E0-4DF8-8DE4-52E7473F4233}" dt="2022-03-07T01:03:35.509" v="1723" actId="1076"/>
+        <pc:sldMkLst>
+          <pc:docMk/>
+          <pc:sldMk cId="2573828473" sldId="283"/>
+        </pc:sldMkLst>
+        <pc:picChg chg="add mod">
+          <ac:chgData name="Jodek" userId="e5b00c06eb42c71a" providerId="LiveId" clId="{A4AAC254-D7E0-4DF8-8DE4-52E7473F4233}" dt="2022-03-07T01:03:35.509" v="1723" actId="1076"/>
+          <ac:picMkLst>
+            <pc:docMk/>
+            <pc:sldMk cId="2573828473" sldId="283"/>
+            <ac:picMk id="3" creationId="{0EB8D3DB-B389-464B-BA77-37810B80B710}"/>
+          </ac:picMkLst>
+        </pc:picChg>
+        <pc:picChg chg="del">
+          <ac:chgData name="Jodek" userId="e5b00c06eb42c71a" providerId="LiveId" clId="{A4AAC254-D7E0-4DF8-8DE4-52E7473F4233}" dt="2022-03-07T01:03:03.236" v="1718" actId="478"/>
+          <ac:picMkLst>
+            <pc:docMk/>
+            <pc:sldMk cId="2573828473" sldId="283"/>
+            <ac:picMk id="4" creationId="{D1E90186-0F7E-4A5A-9D8C-83EBAD311C40}"/>
+          </ac:picMkLst>
+        </pc:picChg>
+      </pc:sldChg>
+      <pc:sldChg chg="addSp delSp modSp add mod ord">
+        <pc:chgData name="Jodek" userId="e5b00c06eb42c71a" providerId="LiveId" clId="{A4AAC254-D7E0-4DF8-8DE4-52E7473F4233}" dt="2022-03-07T01:11:27.644" v="1747" actId="22"/>
+        <pc:sldMkLst>
+          <pc:docMk/>
+          <pc:sldMk cId="4040156422" sldId="284"/>
+        </pc:sldMkLst>
+        <pc:spChg chg="mod">
+          <ac:chgData name="Jodek" userId="e5b00c06eb42c71a" providerId="LiveId" clId="{A4AAC254-D7E0-4DF8-8DE4-52E7473F4233}" dt="2022-03-07T01:11:26.277" v="1746" actId="20577"/>
+          <ac:spMkLst>
+            <pc:docMk/>
+            <pc:sldMk cId="4040156422" sldId="284"/>
+            <ac:spMk id="2" creationId="{C3DFE246-6269-4B71-B16A-DAFB87B63AF2}"/>
+          </ac:spMkLst>
+        </pc:spChg>
+        <pc:picChg chg="add">
+          <ac:chgData name="Jodek" userId="e5b00c06eb42c71a" providerId="LiveId" clId="{A4AAC254-D7E0-4DF8-8DE4-52E7473F4233}" dt="2022-03-07T01:11:27.644" v="1747" actId="22"/>
+          <ac:picMkLst>
+            <pc:docMk/>
+            <pc:sldMk cId="4040156422" sldId="284"/>
+            <ac:picMk id="5" creationId="{60995615-8773-46A7-90AE-95498EA528BA}"/>
+          </ac:picMkLst>
+        </pc:picChg>
+        <pc:picChg chg="del">
+          <ac:chgData name="Jodek" userId="e5b00c06eb42c71a" providerId="LiveId" clId="{A4AAC254-D7E0-4DF8-8DE4-52E7473F4233}" dt="2022-03-07T01:11:18.633" v="1730" actId="478"/>
+          <ac:picMkLst>
+            <pc:docMk/>
+            <pc:sldMk cId="4040156422" sldId="284"/>
+            <ac:picMk id="6" creationId="{5E9DCE5D-208C-4B87-A119-5981E3D386A3}"/>
+          </ac:picMkLst>
+        </pc:picChg>
+      </pc:sldChg>
+      <pc:sldChg chg="addSp delSp modSp add mod ord">
+        <pc:chgData name="Jodek" userId="e5b00c06eb42c71a" providerId="LiveId" clId="{A4AAC254-D7E0-4DF8-8DE4-52E7473F4233}" dt="2022-03-07T01:39:51.966" v="1838" actId="20577"/>
+        <pc:sldMkLst>
+          <pc:docMk/>
+          <pc:sldMk cId="3395803084" sldId="285"/>
+        </pc:sldMkLst>
+        <pc:spChg chg="add del mod">
+          <ac:chgData name="Jodek" userId="e5b00c06eb42c71a" providerId="LiveId" clId="{A4AAC254-D7E0-4DF8-8DE4-52E7473F4233}" dt="2022-03-07T01:38:14.780" v="1763" actId="478"/>
+          <ac:spMkLst>
+            <pc:docMk/>
+            <pc:sldMk cId="3395803084" sldId="285"/>
+            <ac:spMk id="6" creationId="{9291F367-162F-44C5-BA28-D6FC1514FFDC}"/>
+          </ac:spMkLst>
+        </pc:spChg>
+        <pc:spChg chg="mod">
+          <ac:chgData name="Jodek" userId="e5b00c06eb42c71a" providerId="LiveId" clId="{A4AAC254-D7E0-4DF8-8DE4-52E7473F4233}" dt="2022-03-07T01:11:35.077" v="1761" actId="20577"/>
+          <ac:spMkLst>
+            <pc:docMk/>
+            <pc:sldMk cId="3395803084" sldId="285"/>
+            <ac:spMk id="78" creationId="{00000000-0000-0000-0000-000000000000}"/>
+          </ac:spMkLst>
+        </pc:spChg>
+        <pc:graphicFrameChg chg="modGraphic">
+          <ac:chgData name="Jodek" userId="e5b00c06eb42c71a" providerId="LiveId" clId="{A4AAC254-D7E0-4DF8-8DE4-52E7473F4233}" dt="2022-03-07T01:39:51.966" v="1838" actId="20577"/>
+          <ac:graphicFrameMkLst>
+            <pc:docMk/>
+            <pc:sldMk cId="3395803084" sldId="285"/>
+            <ac:graphicFrameMk id="79" creationId="{00000000-0000-0000-0000-000000000000}"/>
+          </ac:graphicFrameMkLst>
+        </pc:graphicFrameChg>
+        <pc:picChg chg="del">
+          <ac:chgData name="Jodek" userId="e5b00c06eb42c71a" providerId="LiveId" clId="{A4AAC254-D7E0-4DF8-8DE4-52E7473F4233}" dt="2022-03-07T01:11:30.759" v="1748" actId="478"/>
+          <ac:picMkLst>
+            <pc:docMk/>
+            <pc:sldMk cId="3395803084" sldId="285"/>
+            <ac:picMk id="3" creationId="{0EB8D3DB-B389-464B-BA77-37810B80B710}"/>
+          </ac:picMkLst>
+        </pc:picChg>
+        <pc:picChg chg="add mod">
+          <ac:chgData name="Jodek" userId="e5b00c06eb42c71a" providerId="LiveId" clId="{A4AAC254-D7E0-4DF8-8DE4-52E7473F4233}" dt="2022-03-07T01:38:28.872" v="1770" actId="1076"/>
+          <ac:picMkLst>
+            <pc:docMk/>
+            <pc:sldMk cId="3395803084" sldId="285"/>
+            <ac:picMk id="4" creationId="{4A5DD385-396B-4AAC-AE33-3EA87C771854}"/>
+          </ac:picMkLst>
+        </pc:picChg>
+        <pc:picChg chg="del mod">
+          <ac:chgData name="Jodek" userId="e5b00c06eb42c71a" providerId="LiveId" clId="{A4AAC254-D7E0-4DF8-8DE4-52E7473F4233}" dt="2022-03-07T01:11:31.141" v="1750" actId="478"/>
+          <ac:picMkLst>
+            <pc:docMk/>
+            <pc:sldMk cId="3395803084" sldId="285"/>
+            <ac:picMk id="7" creationId="{EF288939-9932-40CB-8CA2-145F01C67BC4}"/>
+          </ac:picMkLst>
+        </pc:picChg>
+        <pc:picChg chg="add mod">
+          <ac:chgData name="Jodek" userId="e5b00c06eb42c71a" providerId="LiveId" clId="{A4AAC254-D7E0-4DF8-8DE4-52E7473F4233}" dt="2022-03-07T01:39:01.382" v="1773" actId="1076"/>
+          <ac:picMkLst>
+            <pc:docMk/>
+            <pc:sldMk cId="3395803084" sldId="285"/>
+            <ac:picMk id="8" creationId="{EEC0B3A2-232E-46E8-A41E-305686FFAFA1}"/>
           </ac:picMkLst>
         </pc:picChg>
       </pc:sldChg>
@@ -2477,7 +2685,7 @@
   <p:cSld>
     <p:spTree>
       <p:nvGrpSpPr>
-        <p:cNvPr id="1" name="Shape 80"/>
+        <p:cNvPr id="1" name="Shape 74"/>
         <p:cNvGrpSpPr/>
         <p:nvPr/>
       </p:nvGrpSpPr>
@@ -2491,7 +2699,7 @@
       </p:grpSpPr>
       <p:sp>
         <p:nvSpPr>
-          <p:cNvPr id="81" name="Google Shape;81;gac10fef634_0_25:notes"/>
+          <p:cNvPr id="75" name="Google Shape;75;gac10fef634_0_20:notes"/>
           <p:cNvSpPr>
             <a:spLocks noGrp="1" noRot="1" noChangeAspect="1"/>
           </p:cNvSpPr>
@@ -2532,7 +2740,7 @@
       </p:sp>
       <p:sp>
         <p:nvSpPr>
-          <p:cNvPr id="82" name="Google Shape;82;gac10fef634_0_25:notes"/>
+          <p:cNvPr id="76" name="Google Shape;76;gac10fef634_0_20:notes"/>
           <p:cNvSpPr txBox="1">
             <a:spLocks noGrp="1"/>
           </p:cNvSpPr>
@@ -2562,27 +2770,6 @@
               <a:spcAft>
                 <a:spcPts val="0"/>
               </a:spcAft>
-              <a:buClr>
-                <a:schemeClr val="dk1"/>
-              </a:buClr>
-              <a:buSzPts val="1100"/>
-              <a:buFont typeface="Arial"/>
-              <a:buNone/>
-            </a:pPr>
-            <a:r>
-              <a:rPr lang="en"/>
-              <a:t>Your version control evidence should go here.  This could be in the form of annotated screenshots which show you you managed this process or you could make a brief screencast explaining how you implemented version control.</a:t>
-            </a:r>
-            <a:endParaRPr/>
-          </a:p>
-          <a:p>
-            <a:pPr marL="0" lvl="0" indent="0" algn="l" rtl="0">
-              <a:spcBef>
-                <a:spcPts val="0"/>
-              </a:spcBef>
-              <a:spcAft>
-                <a:spcPts val="0"/>
-              </a:spcAft>
               <a:buNone/>
             </a:pPr>
             <a:endParaRPr/>
@@ -2590,6 +2777,11 @@
         </p:txBody>
       </p:sp>
     </p:spTree>
+    <p:extLst>
+      <p:ext uri="{BB962C8B-B14F-4D97-AF65-F5344CB8AC3E}">
+        <p14:creationId xmlns:p14="http://schemas.microsoft.com/office/powerpoint/2010/main" val="1253221482"/>
+      </p:ext>
+    </p:extLst>
   </p:cSld>
   <p:clrMapOvr>
     <a:masterClrMapping/>
@@ -2602,7 +2794,7 @@
   <p:cSld>
     <p:spTree>
       <p:nvGrpSpPr>
-        <p:cNvPr id="1" name="Shape 86"/>
+        <p:cNvPr id="1" name="Shape 74"/>
         <p:cNvGrpSpPr/>
         <p:nvPr/>
       </p:nvGrpSpPr>
@@ -2616,7 +2808,7 @@
       </p:grpSpPr>
       <p:sp>
         <p:nvSpPr>
-          <p:cNvPr id="87" name="Google Shape;87;gac10fef634_0_30:notes"/>
+          <p:cNvPr id="75" name="Google Shape;75;gac10fef634_0_20:notes"/>
           <p:cNvSpPr>
             <a:spLocks noGrp="1" noRot="1" noChangeAspect="1"/>
           </p:cNvSpPr>
@@ -2657,7 +2849,7 @@
       </p:sp>
       <p:sp>
         <p:nvSpPr>
-          <p:cNvPr id="88" name="Google Shape;88;gac10fef634_0_30:notes"/>
+          <p:cNvPr id="76" name="Google Shape;76;gac10fef634_0_20:notes"/>
           <p:cNvSpPr txBox="1">
             <a:spLocks noGrp="1"/>
           </p:cNvSpPr>
@@ -2689,15 +2881,125 @@
               </a:spcAft>
               <a:buNone/>
             </a:pPr>
-            <a:r>
-              <a:rPr lang="en"/>
-              <a:t>Discusses how the information from planning, testing and trialling of components assisted in the development of a high-quality outcome</a:t>
-            </a:r>
             <a:endParaRPr/>
           </a:p>
         </p:txBody>
       </p:sp>
     </p:spTree>
+    <p:extLst>
+      <p:ext uri="{BB962C8B-B14F-4D97-AF65-F5344CB8AC3E}">
+        <p14:creationId xmlns:p14="http://schemas.microsoft.com/office/powerpoint/2010/main" val="2775703997"/>
+      </p:ext>
+    </p:extLst>
+  </p:cSld>
+  <p:clrMapOvr>
+    <a:masterClrMapping/>
+  </p:clrMapOvr>
+</p:notes>
+</file>
+
+<file path=ppt/notesSlides/notesSlide19.xml><?xml version="1.0" encoding="utf-8"?>
+<p:notes xmlns:a="http://schemas.openxmlformats.org/drawingml/2006/main" xmlns:r="http://schemas.openxmlformats.org/officeDocument/2006/relationships" xmlns:p="http://schemas.openxmlformats.org/presentationml/2006/main" showMasterSp="0" showMasterPhAnim="0">
+  <p:cSld>
+    <p:spTree>
+      <p:nvGrpSpPr>
+        <p:cNvPr id="1" name="Shape 74"/>
+        <p:cNvGrpSpPr/>
+        <p:nvPr/>
+      </p:nvGrpSpPr>
+      <p:grpSpPr>
+        <a:xfrm>
+          <a:off x="0" y="0"/>
+          <a:ext cx="0" cy="0"/>
+          <a:chOff x="0" y="0"/>
+          <a:chExt cx="0" cy="0"/>
+        </a:xfrm>
+      </p:grpSpPr>
+      <p:sp>
+        <p:nvSpPr>
+          <p:cNvPr id="75" name="Google Shape;75;gac10fef634_0_20:notes"/>
+          <p:cNvSpPr>
+            <a:spLocks noGrp="1" noRot="1" noChangeAspect="1"/>
+          </p:cNvSpPr>
+          <p:nvPr>
+            <p:ph type="sldImg" idx="2"/>
+          </p:nvPr>
+        </p:nvSpPr>
+        <p:spPr>
+          <a:xfrm>
+            <a:off x="381000" y="685800"/>
+            <a:ext cx="6096000" cy="3429000"/>
+          </a:xfrm>
+          <a:custGeom>
+            <a:avLst/>
+            <a:gdLst/>
+            <a:ahLst/>
+            <a:cxnLst/>
+            <a:rect l="l" t="t" r="r" b="b"/>
+            <a:pathLst>
+              <a:path w="120000" h="120000" extrusionOk="0">
+                <a:moveTo>
+                  <a:pt x="0" y="0"/>
+                </a:moveTo>
+                <a:lnTo>
+                  <a:pt x="120000" y="0"/>
+                </a:lnTo>
+                <a:lnTo>
+                  <a:pt x="120000" y="120000"/>
+                </a:lnTo>
+                <a:lnTo>
+                  <a:pt x="0" y="120000"/>
+                </a:lnTo>
+                <a:close/>
+              </a:path>
+            </a:pathLst>
+          </a:custGeom>
+        </p:spPr>
+      </p:sp>
+      <p:sp>
+        <p:nvSpPr>
+          <p:cNvPr id="76" name="Google Shape;76;gac10fef634_0_20:notes"/>
+          <p:cNvSpPr txBox="1">
+            <a:spLocks noGrp="1"/>
+          </p:cNvSpPr>
+          <p:nvPr>
+            <p:ph type="body" idx="1"/>
+          </p:nvPr>
+        </p:nvSpPr>
+        <p:spPr>
+          <a:xfrm>
+            <a:off x="685800" y="4343400"/>
+            <a:ext cx="5486400" cy="4114800"/>
+          </a:xfrm>
+          <a:prstGeom prst="rect">
+            <a:avLst/>
+          </a:prstGeom>
+        </p:spPr>
+        <p:txBody>
+          <a:bodyPr spcFirstLastPara="1" wrap="square" lIns="91425" tIns="91425" rIns="91425" bIns="91425" anchor="t" anchorCtr="0">
+            <a:noAutofit/>
+          </a:bodyPr>
+          <a:lstStyle/>
+          <a:p>
+            <a:pPr marL="0" lvl="0" indent="0" algn="l" rtl="0">
+              <a:spcBef>
+                <a:spcPts val="0"/>
+              </a:spcBef>
+              <a:spcAft>
+                <a:spcPts val="0"/>
+              </a:spcAft>
+              <a:buNone/>
+            </a:pPr>
+            <a:endParaRPr/>
+          </a:p>
+        </p:txBody>
+      </p:sp>
+    </p:spTree>
+    <p:extLst>
+      <p:ext uri="{BB962C8B-B14F-4D97-AF65-F5344CB8AC3E}">
+        <p14:creationId xmlns:p14="http://schemas.microsoft.com/office/powerpoint/2010/main" val="1372339853"/>
+      </p:ext>
+    </p:extLst>
   </p:cSld>
   <p:clrMapOvr>
     <a:masterClrMapping/>
@@ -2800,6 +3102,239 @@
             <a:r>
               <a:rPr lang="en"/>
               <a:t>Explain the relevant implications here.  Then as you work, develop your code, discuss how the implications are being met.</a:t>
+            </a:r>
+            <a:endParaRPr/>
+          </a:p>
+        </p:txBody>
+      </p:sp>
+    </p:spTree>
+  </p:cSld>
+  <p:clrMapOvr>
+    <a:masterClrMapping/>
+  </p:clrMapOvr>
+</p:notes>
+</file>
+
+<file path=ppt/notesSlides/notesSlide20.xml><?xml version="1.0" encoding="utf-8"?>
+<p:notes xmlns:a="http://schemas.openxmlformats.org/drawingml/2006/main" xmlns:r="http://schemas.openxmlformats.org/officeDocument/2006/relationships" xmlns:p="http://schemas.openxmlformats.org/presentationml/2006/main" showMasterSp="0" showMasterPhAnim="0">
+  <p:cSld>
+    <p:spTree>
+      <p:nvGrpSpPr>
+        <p:cNvPr id="1" name="Shape 80"/>
+        <p:cNvGrpSpPr/>
+        <p:nvPr/>
+      </p:nvGrpSpPr>
+      <p:grpSpPr>
+        <a:xfrm>
+          <a:off x="0" y="0"/>
+          <a:ext cx="0" cy="0"/>
+          <a:chOff x="0" y="0"/>
+          <a:chExt cx="0" cy="0"/>
+        </a:xfrm>
+      </p:grpSpPr>
+      <p:sp>
+        <p:nvSpPr>
+          <p:cNvPr id="81" name="Google Shape;81;gac10fef634_0_25:notes"/>
+          <p:cNvSpPr>
+            <a:spLocks noGrp="1" noRot="1" noChangeAspect="1"/>
+          </p:cNvSpPr>
+          <p:nvPr>
+            <p:ph type="sldImg" idx="2"/>
+          </p:nvPr>
+        </p:nvSpPr>
+        <p:spPr>
+          <a:xfrm>
+            <a:off x="381000" y="685800"/>
+            <a:ext cx="6096000" cy="3429000"/>
+          </a:xfrm>
+          <a:custGeom>
+            <a:avLst/>
+            <a:gdLst/>
+            <a:ahLst/>
+            <a:cxnLst/>
+            <a:rect l="l" t="t" r="r" b="b"/>
+            <a:pathLst>
+              <a:path w="120000" h="120000" extrusionOk="0">
+                <a:moveTo>
+                  <a:pt x="0" y="0"/>
+                </a:moveTo>
+                <a:lnTo>
+                  <a:pt x="120000" y="0"/>
+                </a:lnTo>
+                <a:lnTo>
+                  <a:pt x="120000" y="120000"/>
+                </a:lnTo>
+                <a:lnTo>
+                  <a:pt x="0" y="120000"/>
+                </a:lnTo>
+                <a:close/>
+              </a:path>
+            </a:pathLst>
+          </a:custGeom>
+        </p:spPr>
+      </p:sp>
+      <p:sp>
+        <p:nvSpPr>
+          <p:cNvPr id="82" name="Google Shape;82;gac10fef634_0_25:notes"/>
+          <p:cNvSpPr txBox="1">
+            <a:spLocks noGrp="1"/>
+          </p:cNvSpPr>
+          <p:nvPr>
+            <p:ph type="body" idx="1"/>
+          </p:nvPr>
+        </p:nvSpPr>
+        <p:spPr>
+          <a:xfrm>
+            <a:off x="685800" y="4343400"/>
+            <a:ext cx="5486400" cy="4114800"/>
+          </a:xfrm>
+          <a:prstGeom prst="rect">
+            <a:avLst/>
+          </a:prstGeom>
+        </p:spPr>
+        <p:txBody>
+          <a:bodyPr spcFirstLastPara="1" wrap="square" lIns="91425" tIns="91425" rIns="91425" bIns="91425" anchor="t" anchorCtr="0">
+            <a:noAutofit/>
+          </a:bodyPr>
+          <a:lstStyle/>
+          <a:p>
+            <a:pPr marL="0" lvl="0" indent="0" algn="l" rtl="0">
+              <a:spcBef>
+                <a:spcPts val="0"/>
+              </a:spcBef>
+              <a:spcAft>
+                <a:spcPts val="0"/>
+              </a:spcAft>
+              <a:buClr>
+                <a:schemeClr val="dk1"/>
+              </a:buClr>
+              <a:buSzPts val="1100"/>
+              <a:buFont typeface="Arial"/>
+              <a:buNone/>
+            </a:pPr>
+            <a:r>
+              <a:rPr lang="en"/>
+              <a:t>Your version control evidence should go here.  This could be in the form of annotated screenshots which show you you managed this process or you could make a brief screencast explaining how you implemented version control.</a:t>
+            </a:r>
+            <a:endParaRPr/>
+          </a:p>
+          <a:p>
+            <a:pPr marL="0" lvl="0" indent="0" algn="l" rtl="0">
+              <a:spcBef>
+                <a:spcPts val="0"/>
+              </a:spcBef>
+              <a:spcAft>
+                <a:spcPts val="0"/>
+              </a:spcAft>
+              <a:buNone/>
+            </a:pPr>
+            <a:endParaRPr/>
+          </a:p>
+        </p:txBody>
+      </p:sp>
+    </p:spTree>
+  </p:cSld>
+  <p:clrMapOvr>
+    <a:masterClrMapping/>
+  </p:clrMapOvr>
+</p:notes>
+</file>
+
+<file path=ppt/notesSlides/notesSlide21.xml><?xml version="1.0" encoding="utf-8"?>
+<p:notes xmlns:a="http://schemas.openxmlformats.org/drawingml/2006/main" xmlns:r="http://schemas.openxmlformats.org/officeDocument/2006/relationships" xmlns:p="http://schemas.openxmlformats.org/presentationml/2006/main" showMasterSp="0" showMasterPhAnim="0">
+  <p:cSld>
+    <p:spTree>
+      <p:nvGrpSpPr>
+        <p:cNvPr id="1" name="Shape 86"/>
+        <p:cNvGrpSpPr/>
+        <p:nvPr/>
+      </p:nvGrpSpPr>
+      <p:grpSpPr>
+        <a:xfrm>
+          <a:off x="0" y="0"/>
+          <a:ext cx="0" cy="0"/>
+          <a:chOff x="0" y="0"/>
+          <a:chExt cx="0" cy="0"/>
+        </a:xfrm>
+      </p:grpSpPr>
+      <p:sp>
+        <p:nvSpPr>
+          <p:cNvPr id="87" name="Google Shape;87;gac10fef634_0_30:notes"/>
+          <p:cNvSpPr>
+            <a:spLocks noGrp="1" noRot="1" noChangeAspect="1"/>
+          </p:cNvSpPr>
+          <p:nvPr>
+            <p:ph type="sldImg" idx="2"/>
+          </p:nvPr>
+        </p:nvSpPr>
+        <p:spPr>
+          <a:xfrm>
+            <a:off x="381000" y="685800"/>
+            <a:ext cx="6096000" cy="3429000"/>
+          </a:xfrm>
+          <a:custGeom>
+            <a:avLst/>
+            <a:gdLst/>
+            <a:ahLst/>
+            <a:cxnLst/>
+            <a:rect l="l" t="t" r="r" b="b"/>
+            <a:pathLst>
+              <a:path w="120000" h="120000" extrusionOk="0">
+                <a:moveTo>
+                  <a:pt x="0" y="0"/>
+                </a:moveTo>
+                <a:lnTo>
+                  <a:pt x="120000" y="0"/>
+                </a:lnTo>
+                <a:lnTo>
+                  <a:pt x="120000" y="120000"/>
+                </a:lnTo>
+                <a:lnTo>
+                  <a:pt x="0" y="120000"/>
+                </a:lnTo>
+                <a:close/>
+              </a:path>
+            </a:pathLst>
+          </a:custGeom>
+        </p:spPr>
+      </p:sp>
+      <p:sp>
+        <p:nvSpPr>
+          <p:cNvPr id="88" name="Google Shape;88;gac10fef634_0_30:notes"/>
+          <p:cNvSpPr txBox="1">
+            <a:spLocks noGrp="1"/>
+          </p:cNvSpPr>
+          <p:nvPr>
+            <p:ph type="body" idx="1"/>
+          </p:nvPr>
+        </p:nvSpPr>
+        <p:spPr>
+          <a:xfrm>
+            <a:off x="685800" y="4343400"/>
+            <a:ext cx="5486400" cy="4114800"/>
+          </a:xfrm>
+          <a:prstGeom prst="rect">
+            <a:avLst/>
+          </a:prstGeom>
+        </p:spPr>
+        <p:txBody>
+          <a:bodyPr spcFirstLastPara="1" wrap="square" lIns="91425" tIns="91425" rIns="91425" bIns="91425" anchor="t" anchorCtr="0">
+            <a:noAutofit/>
+          </a:bodyPr>
+          <a:lstStyle/>
+          <a:p>
+            <a:pPr marL="0" lvl="0" indent="0" algn="l" rtl="0">
+              <a:spcBef>
+                <a:spcPts val="0"/>
+              </a:spcBef>
+              <a:spcAft>
+                <a:spcPts val="0"/>
+              </a:spcAft>
+              <a:buNone/>
+            </a:pPr>
+            <a:r>
+              <a:rPr lang="en"/>
+              <a:t>Discusses how the information from planning, testing and trialling of components assisted in the development of a high-quality outcome</a:t>
             </a:r>
             <a:endParaRPr/>
           </a:p>
@@ -12232,7 +12767,7 @@
           <p:nvPr>
             <p:extLst>
               <p:ext uri="{D42A27DB-BD31-4B8C-83A1-F6EECF244321}">
-                <p14:modId xmlns:p14="http://schemas.microsoft.com/office/powerpoint/2010/main" val="1797357386"/>
+                <p14:modId xmlns:p14="http://schemas.microsoft.com/office/powerpoint/2010/main" val="2949237890"/>
               </p:ext>
             </p:extLst>
           </p:nvPr>
@@ -12485,7 +13020,7 @@
                       </a:pPr>
                       <a:r>
                         <a:rPr lang="en-US" sz="1200" dirty="0"/>
-                        <a:t>Asked street and suburb name</a:t>
+                        <a:t>Printed street and suburb name</a:t>
                       </a:r>
                     </a:p>
                     <a:p>
@@ -12592,6 +13127,1386 @@
 <file path=ppt/slides/slide24.xml><?xml version="1.0" encoding="utf-8"?>
 <p:sld xmlns:a="http://schemas.openxmlformats.org/drawingml/2006/main" xmlns:r="http://schemas.openxmlformats.org/officeDocument/2006/relationships" xmlns:p="http://schemas.openxmlformats.org/presentationml/2006/main">
   <p:cSld>
+    <p:spTree>
+      <p:nvGrpSpPr>
+        <p:cNvPr id="1" name=""/>
+        <p:cNvGrpSpPr/>
+        <p:nvPr/>
+      </p:nvGrpSpPr>
+      <p:grpSpPr>
+        <a:xfrm>
+          <a:off x="0" y="0"/>
+          <a:ext cx="0" cy="0"/>
+          <a:chOff x="0" y="0"/>
+          <a:chExt cx="0" cy="0"/>
+        </a:xfrm>
+      </p:grpSpPr>
+      <p:sp>
+        <p:nvSpPr>
+          <p:cNvPr id="2" name="Title 1">
+            <a:extLst>
+              <a:ext uri="{FF2B5EF4-FFF2-40B4-BE49-F238E27FC236}">
+                <a16:creationId xmlns:a16="http://schemas.microsoft.com/office/drawing/2014/main" id="{C3DFE246-6269-4B71-B16A-DAFB87B63AF2}"/>
+              </a:ext>
+            </a:extLst>
+          </p:cNvPr>
+          <p:cNvSpPr>
+            <a:spLocks noGrp="1"/>
+          </p:cNvSpPr>
+          <p:nvPr>
+            <p:ph type="title"/>
+          </p:nvPr>
+        </p:nvSpPr>
+        <p:spPr/>
+        <p:txBody>
+          <a:bodyPr/>
+          <a:lstStyle/>
+          <a:p>
+            <a:r>
+              <a:rPr lang="en-NZ" dirty="0"/>
+              <a:t>Component 4 Delivery info v2(Trello screenshot)</a:t>
+            </a:r>
+          </a:p>
+        </p:txBody>
+      </p:sp>
+      <p:sp>
+        <p:nvSpPr>
+          <p:cNvPr id="3" name="Text Placeholder 2">
+            <a:extLst>
+              <a:ext uri="{FF2B5EF4-FFF2-40B4-BE49-F238E27FC236}">
+                <a16:creationId xmlns:a16="http://schemas.microsoft.com/office/drawing/2014/main" id="{416E92CD-764C-4C99-A526-941F7CE7B79E}"/>
+              </a:ext>
+            </a:extLst>
+          </p:cNvPr>
+          <p:cNvSpPr>
+            <a:spLocks noGrp="1"/>
+          </p:cNvSpPr>
+          <p:nvPr>
+            <p:ph type="body" idx="1"/>
+          </p:nvPr>
+        </p:nvSpPr>
+        <p:spPr>
+          <a:xfrm>
+            <a:off x="311700" y="1057017"/>
+            <a:ext cx="8520600" cy="3416400"/>
+          </a:xfrm>
+        </p:spPr>
+        <p:txBody>
+          <a:bodyPr/>
+          <a:lstStyle/>
+          <a:p>
+            <a:endParaRPr lang="en-NZ" dirty="0"/>
+          </a:p>
+        </p:txBody>
+      </p:sp>
+      <p:pic>
+        <p:nvPicPr>
+          <p:cNvPr id="6" name="Picture 5">
+            <a:extLst>
+              <a:ext uri="{FF2B5EF4-FFF2-40B4-BE49-F238E27FC236}">
+                <a16:creationId xmlns:a16="http://schemas.microsoft.com/office/drawing/2014/main" id="{5E9DCE5D-208C-4B87-A119-5981E3D386A3}"/>
+              </a:ext>
+            </a:extLst>
+          </p:cNvPr>
+          <p:cNvPicPr>
+            <a:picLocks noChangeAspect="1"/>
+          </p:cNvPicPr>
+          <p:nvPr/>
+        </p:nvPicPr>
+        <p:blipFill>
+          <a:blip r:embed="rId2"/>
+          <a:stretch>
+            <a:fillRect/>
+          </a:stretch>
+        </p:blipFill>
+        <p:spPr>
+          <a:xfrm>
+            <a:off x="311700" y="1057017"/>
+            <a:ext cx="8067675" cy="3467100"/>
+          </a:xfrm>
+          <a:prstGeom prst="rect">
+            <a:avLst/>
+          </a:prstGeom>
+        </p:spPr>
+      </p:pic>
+    </p:spTree>
+    <p:extLst>
+      <p:ext uri="{BB962C8B-B14F-4D97-AF65-F5344CB8AC3E}">
+        <p14:creationId xmlns:p14="http://schemas.microsoft.com/office/powerpoint/2010/main" val="917565860"/>
+      </p:ext>
+    </p:extLst>
+  </p:cSld>
+  <p:clrMapOvr>
+    <a:masterClrMapping/>
+  </p:clrMapOvr>
+</p:sld>
+</file>
+
+<file path=ppt/slides/slide25.xml><?xml version="1.0" encoding="utf-8"?>
+<p:sld xmlns:a="http://schemas.openxmlformats.org/drawingml/2006/main" xmlns:r="http://schemas.openxmlformats.org/officeDocument/2006/relationships" xmlns:p="http://schemas.openxmlformats.org/presentationml/2006/main">
+  <p:cSld>
+    <p:spTree>
+      <p:nvGrpSpPr>
+        <p:cNvPr id="1" name="Shape 77"/>
+        <p:cNvGrpSpPr/>
+        <p:nvPr/>
+      </p:nvGrpSpPr>
+      <p:grpSpPr>
+        <a:xfrm>
+          <a:off x="0" y="0"/>
+          <a:ext cx="0" cy="0"/>
+          <a:chOff x="0" y="0"/>
+          <a:chExt cx="0" cy="0"/>
+        </a:xfrm>
+      </p:grpSpPr>
+      <p:sp>
+        <p:nvSpPr>
+          <p:cNvPr id="78" name="Google Shape;78;p17"/>
+          <p:cNvSpPr txBox="1">
+            <a:spLocks noGrp="1"/>
+          </p:cNvSpPr>
+          <p:nvPr>
+            <p:ph type="title"/>
+          </p:nvPr>
+        </p:nvSpPr>
+        <p:spPr>
+          <a:xfrm>
+            <a:off x="311700" y="216425"/>
+            <a:ext cx="8520600" cy="572700"/>
+          </a:xfrm>
+          <a:prstGeom prst="rect">
+            <a:avLst/>
+          </a:prstGeom>
+        </p:spPr>
+        <p:txBody>
+          <a:bodyPr spcFirstLastPara="1" wrap="square" lIns="91425" tIns="91425" rIns="91425" bIns="91425" anchor="t" anchorCtr="0">
+            <a:noAutofit/>
+          </a:bodyPr>
+          <a:lstStyle/>
+          <a:p>
+            <a:pPr marL="0" lvl="0" indent="0" algn="l" rtl="0">
+              <a:spcBef>
+                <a:spcPts val="0"/>
+              </a:spcBef>
+              <a:spcAft>
+                <a:spcPts val="0"/>
+              </a:spcAft>
+              <a:buNone/>
+            </a:pPr>
+            <a:r>
+              <a:rPr lang="en" dirty="0"/>
+              <a:t>Component 4 v2 - Test Plan (?and screenshot)</a:t>
+            </a:r>
+            <a:endParaRPr dirty="0"/>
+          </a:p>
+        </p:txBody>
+      </p:sp>
+      <p:graphicFrame>
+        <p:nvGraphicFramePr>
+          <p:cNvPr id="79" name="Google Shape;79;p17"/>
+          <p:cNvGraphicFramePr/>
+          <p:nvPr>
+            <p:extLst>
+              <p:ext uri="{D42A27DB-BD31-4B8C-83A1-F6EECF244321}">
+                <p14:modId xmlns:p14="http://schemas.microsoft.com/office/powerpoint/2010/main" val="577719544"/>
+              </p:ext>
+            </p:extLst>
+          </p:nvPr>
+        </p:nvGraphicFramePr>
+        <p:xfrm>
+          <a:off x="311700" y="3406200"/>
+          <a:ext cx="8520600" cy="1737300"/>
+        </p:xfrm>
+        <a:graphic>
+          <a:graphicData uri="http://schemas.openxmlformats.org/drawingml/2006/table">
+            <a:tbl>
+              <a:tblPr>
+                <a:noFill/>
+                <a:tableStyleId>{E1099E06-0E6B-448D-9D27-60429F06E6F4}</a:tableStyleId>
+              </a:tblPr>
+              <a:tblGrid>
+                <a:gridCol w="2421561">
+                  <a:extLst>
+                    <a:ext uri="{9D8B030D-6E8A-4147-A177-3AD203B41FA5}">
+                      <a16:colId xmlns:a16="http://schemas.microsoft.com/office/drawing/2014/main" val="20000"/>
+                    </a:ext>
+                  </a:extLst>
+                </a:gridCol>
+                <a:gridCol w="6099039">
+                  <a:extLst>
+                    <a:ext uri="{9D8B030D-6E8A-4147-A177-3AD203B41FA5}">
+                      <a16:colId xmlns:a16="http://schemas.microsoft.com/office/drawing/2014/main" val="20001"/>
+                    </a:ext>
+                  </a:extLst>
+                </a:gridCol>
+              </a:tblGrid>
+              <a:tr h="0">
+                <a:tc>
+                  <a:txBody>
+                    <a:bodyPr/>
+                    <a:lstStyle/>
+                    <a:p>
+                      <a:pPr marL="0" lvl="0" indent="0" algn="l" rtl="0">
+                        <a:spcBef>
+                          <a:spcPts val="0"/>
+                        </a:spcBef>
+                        <a:spcAft>
+                          <a:spcPts val="0"/>
+                        </a:spcAft>
+                        <a:buNone/>
+                      </a:pPr>
+                      <a:r>
+                        <a:rPr lang="en" sz="1800" b="1" dirty="0"/>
+                        <a:t>Test Case</a:t>
+                      </a:r>
+                      <a:endParaRPr sz="1800" b="1" dirty="0"/>
+                    </a:p>
+                  </a:txBody>
+                  <a:tcPr marL="91425" marR="91425" marT="91425" marB="91425">
+                    <a:solidFill>
+                      <a:srgbClr val="CCCCCC"/>
+                    </a:solidFill>
+                  </a:tcPr>
+                </a:tc>
+                <a:tc>
+                  <a:txBody>
+                    <a:bodyPr/>
+                    <a:lstStyle/>
+                    <a:p>
+                      <a:pPr marL="0" lvl="0" indent="0" algn="l" rtl="0">
+                        <a:spcBef>
+                          <a:spcPts val="0"/>
+                        </a:spcBef>
+                        <a:spcAft>
+                          <a:spcPts val="0"/>
+                        </a:spcAft>
+                        <a:buNone/>
+                      </a:pPr>
+                      <a:r>
+                        <a:rPr lang="en" sz="1800" b="1" dirty="0"/>
+                        <a:t>Expected Values</a:t>
+                      </a:r>
+                      <a:endParaRPr sz="1800" b="1" dirty="0"/>
+                    </a:p>
+                  </a:txBody>
+                  <a:tcPr marL="91425" marR="91425" marT="91425" marB="91425">
+                    <a:solidFill>
+                      <a:srgbClr val="CCCCCC"/>
+                    </a:solidFill>
+                  </a:tcPr>
+                </a:tc>
+                <a:extLst>
+                  <a:ext uri="{0D108BD9-81ED-4DB2-BD59-A6C34878D82A}">
+                    <a16:rowId xmlns:a16="http://schemas.microsoft.com/office/drawing/2014/main" val="10000"/>
+                  </a:ext>
+                </a:extLst>
+              </a:tr>
+              <a:tr h="569141">
+                <a:tc>
+                  <a:txBody>
+                    <a:bodyPr/>
+                    <a:lstStyle/>
+                    <a:p>
+                      <a:pPr marL="0" lvl="0" indent="0" algn="l" rtl="0">
+                        <a:spcBef>
+                          <a:spcPts val="0"/>
+                        </a:spcBef>
+                        <a:spcAft>
+                          <a:spcPts val="0"/>
+                        </a:spcAft>
+                        <a:buNone/>
+                      </a:pPr>
+                      <a:r>
+                        <a:rPr lang="en-NZ" sz="1200" dirty="0"/>
+                        <a:t>Input name</a:t>
+                      </a:r>
+                    </a:p>
+                    <a:p>
+                      <a:pPr marL="0" lvl="0" indent="0" algn="l" rtl="0">
+                        <a:spcBef>
+                          <a:spcPts val="0"/>
+                        </a:spcBef>
+                        <a:spcAft>
+                          <a:spcPts val="0"/>
+                        </a:spcAft>
+                        <a:buNone/>
+                      </a:pPr>
+                      <a:r>
+                        <a:rPr lang="en-NZ" sz="1200" dirty="0"/>
+                        <a:t>Input phone</a:t>
+                      </a:r>
+                    </a:p>
+                    <a:p>
+                      <a:pPr marL="0" lvl="0" indent="0" algn="l" rtl="0">
+                        <a:spcBef>
+                          <a:spcPts val="0"/>
+                        </a:spcBef>
+                        <a:spcAft>
+                          <a:spcPts val="0"/>
+                        </a:spcAft>
+                        <a:buNone/>
+                      </a:pPr>
+                      <a:r>
+                        <a:rPr lang="en-NZ" sz="1200" dirty="0"/>
+                        <a:t>Input house number</a:t>
+                      </a:r>
+                    </a:p>
+                    <a:p>
+                      <a:pPr marL="0" lvl="0" indent="0" algn="l" rtl="0">
+                        <a:spcBef>
+                          <a:spcPts val="0"/>
+                        </a:spcBef>
+                        <a:spcAft>
+                          <a:spcPts val="0"/>
+                        </a:spcAft>
+                        <a:buNone/>
+                      </a:pPr>
+                      <a:r>
+                        <a:rPr lang="en-NZ" sz="1200" dirty="0"/>
+                        <a:t>Input street name</a:t>
+                      </a:r>
+                    </a:p>
+                    <a:p>
+                      <a:pPr marL="0" lvl="0" indent="0" algn="l" rtl="0">
+                        <a:spcBef>
+                          <a:spcPts val="0"/>
+                        </a:spcBef>
+                        <a:spcAft>
+                          <a:spcPts val="0"/>
+                        </a:spcAft>
+                        <a:buNone/>
+                      </a:pPr>
+                      <a:r>
+                        <a:rPr lang="en-NZ" sz="1200" dirty="0"/>
+                        <a:t>Input suburb</a:t>
+                      </a:r>
+                    </a:p>
+                    <a:p>
+                      <a:pPr marL="0" lvl="0" indent="0" algn="l" rtl="0">
+                        <a:spcBef>
+                          <a:spcPts val="0"/>
+                        </a:spcBef>
+                        <a:spcAft>
+                          <a:spcPts val="0"/>
+                        </a:spcAft>
+                        <a:buNone/>
+                      </a:pPr>
+                      <a:r>
+                        <a:rPr lang="en-NZ" sz="1200" dirty="0"/>
+                        <a:t>Left input blank </a:t>
+                      </a:r>
+                      <a:endParaRPr sz="1200" dirty="0"/>
+                    </a:p>
+                  </a:txBody>
+                  <a:tcPr marL="91425" marR="91425" marT="91425" marB="91425"/>
+                </a:tc>
+                <a:tc>
+                  <a:txBody>
+                    <a:bodyPr/>
+                    <a:lstStyle/>
+                    <a:p>
+                      <a:pPr marL="0" lvl="0" indent="0" algn="l" rtl="0">
+                        <a:spcBef>
+                          <a:spcPts val="0"/>
+                        </a:spcBef>
+                        <a:spcAft>
+                          <a:spcPts val="0"/>
+                        </a:spcAft>
+                        <a:buNone/>
+                      </a:pPr>
+                      <a:r>
+                        <a:rPr lang="en-US" sz="1200" dirty="0"/>
+                        <a:t>Printed name correctly</a:t>
+                      </a:r>
+                    </a:p>
+                    <a:p>
+                      <a:pPr marL="0" lvl="0" indent="0" algn="l" rtl="0">
+                        <a:spcBef>
+                          <a:spcPts val="0"/>
+                        </a:spcBef>
+                        <a:spcAft>
+                          <a:spcPts val="0"/>
+                        </a:spcAft>
+                        <a:buNone/>
+                      </a:pPr>
+                      <a:r>
+                        <a:rPr lang="en-US" sz="1200" dirty="0"/>
+                        <a:t>Printed phone number correctly </a:t>
+                      </a:r>
+                    </a:p>
+                    <a:p>
+                      <a:pPr marL="0" lvl="0" indent="0" algn="l" rtl="0">
+                        <a:spcBef>
+                          <a:spcPts val="0"/>
+                        </a:spcBef>
+                        <a:spcAft>
+                          <a:spcPts val="0"/>
+                        </a:spcAft>
+                        <a:buNone/>
+                      </a:pPr>
+                      <a:r>
+                        <a:rPr lang="en-US" sz="1200" dirty="0"/>
+                        <a:t>Printed house number</a:t>
+                      </a:r>
+                    </a:p>
+                    <a:p>
+                      <a:pPr marL="0" lvl="0" indent="0" algn="l" rtl="0">
+                        <a:spcBef>
+                          <a:spcPts val="0"/>
+                        </a:spcBef>
+                        <a:spcAft>
+                          <a:spcPts val="0"/>
+                        </a:spcAft>
+                        <a:buNone/>
+                      </a:pPr>
+                      <a:r>
+                        <a:rPr lang="en-US" sz="1200"/>
+                        <a:t>Printed </a:t>
+                      </a:r>
+                      <a:r>
+                        <a:rPr lang="en-US" sz="1200" dirty="0"/>
+                        <a:t>street and suburb name</a:t>
+                      </a:r>
+                    </a:p>
+                    <a:p>
+                      <a:pPr marL="0" lvl="0" indent="0" algn="l" rtl="0">
+                        <a:spcBef>
+                          <a:spcPts val="0"/>
+                        </a:spcBef>
+                        <a:spcAft>
+                          <a:spcPts val="0"/>
+                        </a:spcAft>
+                        <a:buNone/>
+                      </a:pPr>
+                      <a:r>
+                        <a:rPr lang="en-US" sz="1200" dirty="0"/>
+                        <a:t>Asked for input again</a:t>
+                      </a:r>
+                    </a:p>
+                  </a:txBody>
+                  <a:tcPr marL="91425" marR="91425" marT="91425" marB="91425"/>
+                </a:tc>
+                <a:extLst>
+                  <a:ext uri="{0D108BD9-81ED-4DB2-BD59-A6C34878D82A}">
+                    <a16:rowId xmlns:a16="http://schemas.microsoft.com/office/drawing/2014/main" val="10001"/>
+                  </a:ext>
+                </a:extLst>
+              </a:tr>
+            </a:tbl>
+          </a:graphicData>
+        </a:graphic>
+      </p:graphicFrame>
+      <p:pic>
+        <p:nvPicPr>
+          <p:cNvPr id="4" name="Picture 3">
+            <a:extLst>
+              <a:ext uri="{FF2B5EF4-FFF2-40B4-BE49-F238E27FC236}">
+                <a16:creationId xmlns:a16="http://schemas.microsoft.com/office/drawing/2014/main" id="{D1E90186-0F7E-4A5A-9D8C-83EBAD311C40}"/>
+              </a:ext>
+            </a:extLst>
+          </p:cNvPr>
+          <p:cNvPicPr>
+            <a:picLocks noChangeAspect="1"/>
+          </p:cNvPicPr>
+          <p:nvPr/>
+        </p:nvPicPr>
+        <p:blipFill>
+          <a:blip r:embed="rId3"/>
+          <a:stretch>
+            <a:fillRect/>
+          </a:stretch>
+        </p:blipFill>
+        <p:spPr>
+          <a:xfrm>
+            <a:off x="871820" y="992555"/>
+            <a:ext cx="2175833" cy="2210214"/>
+          </a:xfrm>
+          <a:prstGeom prst="rect">
+            <a:avLst/>
+          </a:prstGeom>
+        </p:spPr>
+      </p:pic>
+      <p:pic>
+        <p:nvPicPr>
+          <p:cNvPr id="7" name="Picture 6">
+            <a:extLst>
+              <a:ext uri="{FF2B5EF4-FFF2-40B4-BE49-F238E27FC236}">
+                <a16:creationId xmlns:a16="http://schemas.microsoft.com/office/drawing/2014/main" id="{EF288939-9932-40CB-8CA2-145F01C67BC4}"/>
+              </a:ext>
+            </a:extLst>
+          </p:cNvPr>
+          <p:cNvPicPr>
+            <a:picLocks noChangeAspect="1"/>
+          </p:cNvPicPr>
+          <p:nvPr/>
+        </p:nvPicPr>
+        <p:blipFill>
+          <a:blip r:embed="rId4"/>
+          <a:stretch>
+            <a:fillRect/>
+          </a:stretch>
+        </p:blipFill>
+        <p:spPr>
+          <a:xfrm>
+            <a:off x="3772117" y="1737300"/>
+            <a:ext cx="4276922" cy="1151903"/>
+          </a:xfrm>
+          <a:prstGeom prst="rect">
+            <a:avLst/>
+          </a:prstGeom>
+        </p:spPr>
+      </p:pic>
+    </p:spTree>
+    <p:extLst>
+      <p:ext uri="{BB962C8B-B14F-4D97-AF65-F5344CB8AC3E}">
+        <p14:creationId xmlns:p14="http://schemas.microsoft.com/office/powerpoint/2010/main" val="1675299264"/>
+      </p:ext>
+    </p:extLst>
+  </p:cSld>
+  <p:clrMapOvr>
+    <a:masterClrMapping/>
+  </p:clrMapOvr>
+</p:sld>
+</file>
+
+<file path=ppt/slides/slide26.xml><?xml version="1.0" encoding="utf-8"?>
+<p:sld xmlns:a="http://schemas.openxmlformats.org/drawingml/2006/main" xmlns:r="http://schemas.openxmlformats.org/officeDocument/2006/relationships" xmlns:p="http://schemas.openxmlformats.org/presentationml/2006/main">
+  <p:cSld>
+    <p:spTree>
+      <p:nvGrpSpPr>
+        <p:cNvPr id="1" name="Shape 77"/>
+        <p:cNvGrpSpPr/>
+        <p:nvPr/>
+      </p:nvGrpSpPr>
+      <p:grpSpPr>
+        <a:xfrm>
+          <a:off x="0" y="0"/>
+          <a:ext cx="0" cy="0"/>
+          <a:chOff x="0" y="0"/>
+          <a:chExt cx="0" cy="0"/>
+        </a:xfrm>
+      </p:grpSpPr>
+      <p:sp>
+        <p:nvSpPr>
+          <p:cNvPr id="78" name="Google Shape;78;p17"/>
+          <p:cNvSpPr txBox="1">
+            <a:spLocks noGrp="1"/>
+          </p:cNvSpPr>
+          <p:nvPr>
+            <p:ph type="title"/>
+          </p:nvPr>
+        </p:nvSpPr>
+        <p:spPr>
+          <a:xfrm>
+            <a:off x="311700" y="216425"/>
+            <a:ext cx="8520600" cy="572700"/>
+          </a:xfrm>
+          <a:prstGeom prst="rect">
+            <a:avLst/>
+          </a:prstGeom>
+        </p:spPr>
+        <p:txBody>
+          <a:bodyPr spcFirstLastPara="1" wrap="square" lIns="91425" tIns="91425" rIns="91425" bIns="91425" anchor="t" anchorCtr="0">
+            <a:noAutofit/>
+          </a:bodyPr>
+          <a:lstStyle/>
+          <a:p>
+            <a:pPr marL="0" lvl="0" indent="0" algn="l" rtl="0">
+              <a:spcBef>
+                <a:spcPts val="0"/>
+              </a:spcBef>
+              <a:spcAft>
+                <a:spcPts val="0"/>
+              </a:spcAft>
+              <a:buNone/>
+            </a:pPr>
+            <a:r>
+              <a:rPr lang="en" dirty="0"/>
+              <a:t>Component 4 v2 - Test Plan (?and screenshot)</a:t>
+            </a:r>
+            <a:endParaRPr dirty="0"/>
+          </a:p>
+        </p:txBody>
+      </p:sp>
+      <p:graphicFrame>
+        <p:nvGraphicFramePr>
+          <p:cNvPr id="79" name="Google Shape;79;p17"/>
+          <p:cNvGraphicFramePr/>
+          <p:nvPr/>
+        </p:nvGraphicFramePr>
+        <p:xfrm>
+          <a:off x="311700" y="3406200"/>
+          <a:ext cx="8520600" cy="1737300"/>
+        </p:xfrm>
+        <a:graphic>
+          <a:graphicData uri="http://schemas.openxmlformats.org/drawingml/2006/table">
+            <a:tbl>
+              <a:tblPr>
+                <a:noFill/>
+                <a:tableStyleId>{E1099E06-0E6B-448D-9D27-60429F06E6F4}</a:tableStyleId>
+              </a:tblPr>
+              <a:tblGrid>
+                <a:gridCol w="2421561">
+                  <a:extLst>
+                    <a:ext uri="{9D8B030D-6E8A-4147-A177-3AD203B41FA5}">
+                      <a16:colId xmlns:a16="http://schemas.microsoft.com/office/drawing/2014/main" val="20000"/>
+                    </a:ext>
+                  </a:extLst>
+                </a:gridCol>
+                <a:gridCol w="6099039">
+                  <a:extLst>
+                    <a:ext uri="{9D8B030D-6E8A-4147-A177-3AD203B41FA5}">
+                      <a16:colId xmlns:a16="http://schemas.microsoft.com/office/drawing/2014/main" val="20001"/>
+                    </a:ext>
+                  </a:extLst>
+                </a:gridCol>
+              </a:tblGrid>
+              <a:tr h="0">
+                <a:tc>
+                  <a:txBody>
+                    <a:bodyPr/>
+                    <a:lstStyle/>
+                    <a:p>
+                      <a:pPr marL="0" lvl="0" indent="0" algn="l" rtl="0">
+                        <a:spcBef>
+                          <a:spcPts val="0"/>
+                        </a:spcBef>
+                        <a:spcAft>
+                          <a:spcPts val="0"/>
+                        </a:spcAft>
+                        <a:buNone/>
+                      </a:pPr>
+                      <a:r>
+                        <a:rPr lang="en" sz="1800" b="1" dirty="0"/>
+                        <a:t>Test Case</a:t>
+                      </a:r>
+                      <a:endParaRPr sz="1800" b="1" dirty="0"/>
+                    </a:p>
+                  </a:txBody>
+                  <a:tcPr marL="91425" marR="91425" marT="91425" marB="91425">
+                    <a:solidFill>
+                      <a:srgbClr val="CCCCCC"/>
+                    </a:solidFill>
+                  </a:tcPr>
+                </a:tc>
+                <a:tc>
+                  <a:txBody>
+                    <a:bodyPr/>
+                    <a:lstStyle/>
+                    <a:p>
+                      <a:pPr marL="0" lvl="0" indent="0" algn="l" rtl="0">
+                        <a:spcBef>
+                          <a:spcPts val="0"/>
+                        </a:spcBef>
+                        <a:spcAft>
+                          <a:spcPts val="0"/>
+                        </a:spcAft>
+                        <a:buNone/>
+                      </a:pPr>
+                      <a:r>
+                        <a:rPr lang="en" sz="1800" b="1" dirty="0"/>
+                        <a:t>Expected Values</a:t>
+                      </a:r>
+                      <a:endParaRPr sz="1800" b="1" dirty="0"/>
+                    </a:p>
+                  </a:txBody>
+                  <a:tcPr marL="91425" marR="91425" marT="91425" marB="91425">
+                    <a:solidFill>
+                      <a:srgbClr val="CCCCCC"/>
+                    </a:solidFill>
+                  </a:tcPr>
+                </a:tc>
+                <a:extLst>
+                  <a:ext uri="{0D108BD9-81ED-4DB2-BD59-A6C34878D82A}">
+                    <a16:rowId xmlns:a16="http://schemas.microsoft.com/office/drawing/2014/main" val="10000"/>
+                  </a:ext>
+                </a:extLst>
+              </a:tr>
+              <a:tr h="569141">
+                <a:tc>
+                  <a:txBody>
+                    <a:bodyPr/>
+                    <a:lstStyle/>
+                    <a:p>
+                      <a:pPr marL="0" lvl="0" indent="0" algn="l" rtl="0">
+                        <a:spcBef>
+                          <a:spcPts val="0"/>
+                        </a:spcBef>
+                        <a:spcAft>
+                          <a:spcPts val="0"/>
+                        </a:spcAft>
+                        <a:buNone/>
+                      </a:pPr>
+                      <a:r>
+                        <a:rPr lang="en-NZ" sz="1200" dirty="0"/>
+                        <a:t>Input name</a:t>
+                      </a:r>
+                    </a:p>
+                    <a:p>
+                      <a:pPr marL="0" lvl="0" indent="0" algn="l" rtl="0">
+                        <a:spcBef>
+                          <a:spcPts val="0"/>
+                        </a:spcBef>
+                        <a:spcAft>
+                          <a:spcPts val="0"/>
+                        </a:spcAft>
+                        <a:buNone/>
+                      </a:pPr>
+                      <a:r>
+                        <a:rPr lang="en-NZ" sz="1200" dirty="0"/>
+                        <a:t>Input phone</a:t>
+                      </a:r>
+                    </a:p>
+                    <a:p>
+                      <a:pPr marL="0" lvl="0" indent="0" algn="l" rtl="0">
+                        <a:spcBef>
+                          <a:spcPts val="0"/>
+                        </a:spcBef>
+                        <a:spcAft>
+                          <a:spcPts val="0"/>
+                        </a:spcAft>
+                        <a:buNone/>
+                      </a:pPr>
+                      <a:r>
+                        <a:rPr lang="en-NZ" sz="1200" dirty="0"/>
+                        <a:t>Input house number</a:t>
+                      </a:r>
+                    </a:p>
+                    <a:p>
+                      <a:pPr marL="0" lvl="0" indent="0" algn="l" rtl="0">
+                        <a:spcBef>
+                          <a:spcPts val="0"/>
+                        </a:spcBef>
+                        <a:spcAft>
+                          <a:spcPts val="0"/>
+                        </a:spcAft>
+                        <a:buNone/>
+                      </a:pPr>
+                      <a:r>
+                        <a:rPr lang="en-NZ" sz="1200" dirty="0"/>
+                        <a:t>Input street name</a:t>
+                      </a:r>
+                    </a:p>
+                    <a:p>
+                      <a:pPr marL="0" lvl="0" indent="0" algn="l" rtl="0">
+                        <a:spcBef>
+                          <a:spcPts val="0"/>
+                        </a:spcBef>
+                        <a:spcAft>
+                          <a:spcPts val="0"/>
+                        </a:spcAft>
+                        <a:buNone/>
+                      </a:pPr>
+                      <a:r>
+                        <a:rPr lang="en-NZ" sz="1200" dirty="0"/>
+                        <a:t>Input suburb</a:t>
+                      </a:r>
+                    </a:p>
+                    <a:p>
+                      <a:pPr marL="0" lvl="0" indent="0" algn="l" rtl="0">
+                        <a:spcBef>
+                          <a:spcPts val="0"/>
+                        </a:spcBef>
+                        <a:spcAft>
+                          <a:spcPts val="0"/>
+                        </a:spcAft>
+                        <a:buNone/>
+                      </a:pPr>
+                      <a:r>
+                        <a:rPr lang="en-NZ" sz="1200" dirty="0"/>
+                        <a:t>Left input blank </a:t>
+                      </a:r>
+                      <a:endParaRPr sz="1200" dirty="0"/>
+                    </a:p>
+                  </a:txBody>
+                  <a:tcPr marL="91425" marR="91425" marT="91425" marB="91425"/>
+                </a:tc>
+                <a:tc>
+                  <a:txBody>
+                    <a:bodyPr/>
+                    <a:lstStyle/>
+                    <a:p>
+                      <a:pPr marL="0" lvl="0" indent="0" algn="l" rtl="0">
+                        <a:spcBef>
+                          <a:spcPts val="0"/>
+                        </a:spcBef>
+                        <a:spcAft>
+                          <a:spcPts val="0"/>
+                        </a:spcAft>
+                        <a:buNone/>
+                      </a:pPr>
+                      <a:r>
+                        <a:rPr lang="en-US" sz="1200" dirty="0"/>
+                        <a:t>Printed name correctly</a:t>
+                      </a:r>
+                    </a:p>
+                    <a:p>
+                      <a:pPr marL="0" lvl="0" indent="0" algn="l" rtl="0">
+                        <a:spcBef>
+                          <a:spcPts val="0"/>
+                        </a:spcBef>
+                        <a:spcAft>
+                          <a:spcPts val="0"/>
+                        </a:spcAft>
+                        <a:buNone/>
+                      </a:pPr>
+                      <a:r>
+                        <a:rPr lang="en-US" sz="1200" dirty="0"/>
+                        <a:t>Printed phone number correctly </a:t>
+                      </a:r>
+                    </a:p>
+                    <a:p>
+                      <a:pPr marL="0" lvl="0" indent="0" algn="l" rtl="0">
+                        <a:spcBef>
+                          <a:spcPts val="0"/>
+                        </a:spcBef>
+                        <a:spcAft>
+                          <a:spcPts val="0"/>
+                        </a:spcAft>
+                        <a:buNone/>
+                      </a:pPr>
+                      <a:r>
+                        <a:rPr lang="en-US" sz="1200" dirty="0"/>
+                        <a:t>Printed house number</a:t>
+                      </a:r>
+                    </a:p>
+                    <a:p>
+                      <a:pPr marL="0" lvl="0" indent="0" algn="l" rtl="0">
+                        <a:spcBef>
+                          <a:spcPts val="0"/>
+                        </a:spcBef>
+                        <a:spcAft>
+                          <a:spcPts val="0"/>
+                        </a:spcAft>
+                        <a:buNone/>
+                      </a:pPr>
+                      <a:r>
+                        <a:rPr lang="en-US" sz="1200"/>
+                        <a:t>Printed </a:t>
+                      </a:r>
+                      <a:r>
+                        <a:rPr lang="en-US" sz="1200" dirty="0"/>
+                        <a:t>street and suburb name</a:t>
+                      </a:r>
+                    </a:p>
+                    <a:p>
+                      <a:pPr marL="0" lvl="0" indent="0" algn="l" rtl="0">
+                        <a:spcBef>
+                          <a:spcPts val="0"/>
+                        </a:spcBef>
+                        <a:spcAft>
+                          <a:spcPts val="0"/>
+                        </a:spcAft>
+                        <a:buNone/>
+                      </a:pPr>
+                      <a:r>
+                        <a:rPr lang="en-US" sz="1200" dirty="0"/>
+                        <a:t>Asked for input again</a:t>
+                      </a:r>
+                    </a:p>
+                  </a:txBody>
+                  <a:tcPr marL="91425" marR="91425" marT="91425" marB="91425"/>
+                </a:tc>
+                <a:extLst>
+                  <a:ext uri="{0D108BD9-81ED-4DB2-BD59-A6C34878D82A}">
+                    <a16:rowId xmlns:a16="http://schemas.microsoft.com/office/drawing/2014/main" val="10001"/>
+                  </a:ext>
+                </a:extLst>
+              </a:tr>
+            </a:tbl>
+          </a:graphicData>
+        </a:graphic>
+      </p:graphicFrame>
+      <p:pic>
+        <p:nvPicPr>
+          <p:cNvPr id="7" name="Picture 6">
+            <a:extLst>
+              <a:ext uri="{FF2B5EF4-FFF2-40B4-BE49-F238E27FC236}">
+                <a16:creationId xmlns:a16="http://schemas.microsoft.com/office/drawing/2014/main" id="{EF288939-9932-40CB-8CA2-145F01C67BC4}"/>
+              </a:ext>
+            </a:extLst>
+          </p:cNvPr>
+          <p:cNvPicPr>
+            <a:picLocks noChangeAspect="1"/>
+          </p:cNvPicPr>
+          <p:nvPr/>
+        </p:nvPicPr>
+        <p:blipFill>
+          <a:blip r:embed="rId3"/>
+          <a:stretch>
+            <a:fillRect/>
+          </a:stretch>
+        </p:blipFill>
+        <p:spPr>
+          <a:xfrm>
+            <a:off x="3772117" y="1737300"/>
+            <a:ext cx="4276922" cy="1151903"/>
+          </a:xfrm>
+          <a:prstGeom prst="rect">
+            <a:avLst/>
+          </a:prstGeom>
+        </p:spPr>
+      </p:pic>
+      <p:pic>
+        <p:nvPicPr>
+          <p:cNvPr id="3" name="Picture 2">
+            <a:extLst>
+              <a:ext uri="{FF2B5EF4-FFF2-40B4-BE49-F238E27FC236}">
+                <a16:creationId xmlns:a16="http://schemas.microsoft.com/office/drawing/2014/main" id="{0EB8D3DB-B389-464B-BA77-37810B80B710}"/>
+              </a:ext>
+            </a:extLst>
+          </p:cNvPr>
+          <p:cNvPicPr>
+            <a:picLocks noChangeAspect="1"/>
+          </p:cNvPicPr>
+          <p:nvPr/>
+        </p:nvPicPr>
+        <p:blipFill>
+          <a:blip r:embed="rId4"/>
+          <a:stretch>
+            <a:fillRect/>
+          </a:stretch>
+        </p:blipFill>
+        <p:spPr>
+          <a:xfrm>
+            <a:off x="640985" y="924339"/>
+            <a:ext cx="2303068" cy="2151163"/>
+          </a:xfrm>
+          <a:prstGeom prst="rect">
+            <a:avLst/>
+          </a:prstGeom>
+        </p:spPr>
+      </p:pic>
+    </p:spTree>
+    <p:extLst>
+      <p:ext uri="{BB962C8B-B14F-4D97-AF65-F5344CB8AC3E}">
+        <p14:creationId xmlns:p14="http://schemas.microsoft.com/office/powerpoint/2010/main" val="2573828473"/>
+      </p:ext>
+    </p:extLst>
+  </p:cSld>
+  <p:clrMapOvr>
+    <a:masterClrMapping/>
+  </p:clrMapOvr>
+</p:sld>
+</file>
+
+<file path=ppt/slides/slide27.xml><?xml version="1.0" encoding="utf-8"?>
+<p:sld xmlns:a="http://schemas.openxmlformats.org/drawingml/2006/main" xmlns:r="http://schemas.openxmlformats.org/officeDocument/2006/relationships" xmlns:p="http://schemas.openxmlformats.org/presentationml/2006/main">
+  <p:cSld>
+    <p:spTree>
+      <p:nvGrpSpPr>
+        <p:cNvPr id="1" name=""/>
+        <p:cNvGrpSpPr/>
+        <p:nvPr/>
+      </p:nvGrpSpPr>
+      <p:grpSpPr>
+        <a:xfrm>
+          <a:off x="0" y="0"/>
+          <a:ext cx="0" cy="0"/>
+          <a:chOff x="0" y="0"/>
+          <a:chExt cx="0" cy="0"/>
+        </a:xfrm>
+      </p:grpSpPr>
+      <p:sp>
+        <p:nvSpPr>
+          <p:cNvPr id="2" name="Title 1">
+            <a:extLst>
+              <a:ext uri="{FF2B5EF4-FFF2-40B4-BE49-F238E27FC236}">
+                <a16:creationId xmlns:a16="http://schemas.microsoft.com/office/drawing/2014/main" id="{C3DFE246-6269-4B71-B16A-DAFB87B63AF2}"/>
+              </a:ext>
+            </a:extLst>
+          </p:cNvPr>
+          <p:cNvSpPr>
+            <a:spLocks noGrp="1"/>
+          </p:cNvSpPr>
+          <p:nvPr>
+            <p:ph type="title"/>
+          </p:nvPr>
+        </p:nvSpPr>
+        <p:spPr/>
+        <p:txBody>
+          <a:bodyPr/>
+          <a:lstStyle/>
+          <a:p>
+            <a:r>
+              <a:rPr lang="en-NZ" dirty="0"/>
+              <a:t>Component 5 Pizza menu(Trello screenshot)</a:t>
+            </a:r>
+          </a:p>
+        </p:txBody>
+      </p:sp>
+      <p:sp>
+        <p:nvSpPr>
+          <p:cNvPr id="3" name="Text Placeholder 2">
+            <a:extLst>
+              <a:ext uri="{FF2B5EF4-FFF2-40B4-BE49-F238E27FC236}">
+                <a16:creationId xmlns:a16="http://schemas.microsoft.com/office/drawing/2014/main" id="{416E92CD-764C-4C99-A526-941F7CE7B79E}"/>
+              </a:ext>
+            </a:extLst>
+          </p:cNvPr>
+          <p:cNvSpPr>
+            <a:spLocks noGrp="1"/>
+          </p:cNvSpPr>
+          <p:nvPr>
+            <p:ph type="body" idx="1"/>
+          </p:nvPr>
+        </p:nvSpPr>
+        <p:spPr>
+          <a:xfrm>
+            <a:off x="311700" y="1057017"/>
+            <a:ext cx="8520600" cy="3416400"/>
+          </a:xfrm>
+        </p:spPr>
+        <p:txBody>
+          <a:bodyPr/>
+          <a:lstStyle/>
+          <a:p>
+            <a:endParaRPr lang="en-NZ" dirty="0"/>
+          </a:p>
+        </p:txBody>
+      </p:sp>
+      <p:pic>
+        <p:nvPicPr>
+          <p:cNvPr id="5" name="Picture 4">
+            <a:extLst>
+              <a:ext uri="{FF2B5EF4-FFF2-40B4-BE49-F238E27FC236}">
+                <a16:creationId xmlns:a16="http://schemas.microsoft.com/office/drawing/2014/main" id="{60995615-8773-46A7-90AE-95498EA528BA}"/>
+              </a:ext>
+            </a:extLst>
+          </p:cNvPr>
+          <p:cNvPicPr>
+            <a:picLocks noChangeAspect="1"/>
+          </p:cNvPicPr>
+          <p:nvPr/>
+        </p:nvPicPr>
+        <p:blipFill>
+          <a:blip r:embed="rId2"/>
+          <a:stretch>
+            <a:fillRect/>
+          </a:stretch>
+        </p:blipFill>
+        <p:spPr>
+          <a:xfrm>
+            <a:off x="604837" y="1204912"/>
+            <a:ext cx="7934325" cy="2733675"/>
+          </a:xfrm>
+          <a:prstGeom prst="rect">
+            <a:avLst/>
+          </a:prstGeom>
+        </p:spPr>
+      </p:pic>
+    </p:spTree>
+    <p:extLst>
+      <p:ext uri="{BB962C8B-B14F-4D97-AF65-F5344CB8AC3E}">
+        <p14:creationId xmlns:p14="http://schemas.microsoft.com/office/powerpoint/2010/main" val="4040156422"/>
+      </p:ext>
+    </p:extLst>
+  </p:cSld>
+  <p:clrMapOvr>
+    <a:masterClrMapping/>
+  </p:clrMapOvr>
+</p:sld>
+</file>
+
+<file path=ppt/slides/slide28.xml><?xml version="1.0" encoding="utf-8"?>
+<p:sld xmlns:a="http://schemas.openxmlformats.org/drawingml/2006/main" xmlns:r="http://schemas.openxmlformats.org/officeDocument/2006/relationships" xmlns:p="http://schemas.openxmlformats.org/presentationml/2006/main">
+  <p:cSld>
+    <p:spTree>
+      <p:nvGrpSpPr>
+        <p:cNvPr id="1" name="Shape 77"/>
+        <p:cNvGrpSpPr/>
+        <p:nvPr/>
+      </p:nvGrpSpPr>
+      <p:grpSpPr>
+        <a:xfrm>
+          <a:off x="0" y="0"/>
+          <a:ext cx="0" cy="0"/>
+          <a:chOff x="0" y="0"/>
+          <a:chExt cx="0" cy="0"/>
+        </a:xfrm>
+      </p:grpSpPr>
+      <p:sp>
+        <p:nvSpPr>
+          <p:cNvPr id="78" name="Google Shape;78;p17"/>
+          <p:cNvSpPr txBox="1">
+            <a:spLocks noGrp="1"/>
+          </p:cNvSpPr>
+          <p:nvPr>
+            <p:ph type="title"/>
+          </p:nvPr>
+        </p:nvSpPr>
+        <p:spPr>
+          <a:xfrm>
+            <a:off x="311700" y="216425"/>
+            <a:ext cx="8520600" cy="572700"/>
+          </a:xfrm>
+          <a:prstGeom prst="rect">
+            <a:avLst/>
+          </a:prstGeom>
+        </p:spPr>
+        <p:txBody>
+          <a:bodyPr spcFirstLastPara="1" wrap="square" lIns="91425" tIns="91425" rIns="91425" bIns="91425" anchor="t" anchorCtr="0">
+            <a:noAutofit/>
+          </a:bodyPr>
+          <a:lstStyle/>
+          <a:p>
+            <a:pPr marL="0" lvl="0" indent="0" algn="l" rtl="0">
+              <a:spcBef>
+                <a:spcPts val="0"/>
+              </a:spcBef>
+              <a:spcAft>
+                <a:spcPts val="0"/>
+              </a:spcAft>
+              <a:buNone/>
+            </a:pPr>
+            <a:r>
+              <a:rPr lang="en" dirty="0"/>
+              <a:t>Component 5 - Test Plan (?and screenshot)</a:t>
+            </a:r>
+            <a:endParaRPr dirty="0"/>
+          </a:p>
+        </p:txBody>
+      </p:sp>
+      <p:graphicFrame>
+        <p:nvGraphicFramePr>
+          <p:cNvPr id="79" name="Google Shape;79;p17"/>
+          <p:cNvGraphicFramePr/>
+          <p:nvPr>
+            <p:extLst>
+              <p:ext uri="{D42A27DB-BD31-4B8C-83A1-F6EECF244321}">
+                <p14:modId xmlns:p14="http://schemas.microsoft.com/office/powerpoint/2010/main" val="1121839158"/>
+              </p:ext>
+            </p:extLst>
+          </p:nvPr>
+        </p:nvGraphicFramePr>
+        <p:xfrm>
+          <a:off x="311700" y="3406200"/>
+          <a:ext cx="8520600" cy="1026311"/>
+        </p:xfrm>
+        <a:graphic>
+          <a:graphicData uri="http://schemas.openxmlformats.org/drawingml/2006/table">
+            <a:tbl>
+              <a:tblPr>
+                <a:noFill/>
+                <a:tableStyleId>{E1099E06-0E6B-448D-9D27-60429F06E6F4}</a:tableStyleId>
+              </a:tblPr>
+              <a:tblGrid>
+                <a:gridCol w="2421561">
+                  <a:extLst>
+                    <a:ext uri="{9D8B030D-6E8A-4147-A177-3AD203B41FA5}">
+                      <a16:colId xmlns:a16="http://schemas.microsoft.com/office/drawing/2014/main" val="20000"/>
+                    </a:ext>
+                  </a:extLst>
+                </a:gridCol>
+                <a:gridCol w="6099039">
+                  <a:extLst>
+                    <a:ext uri="{9D8B030D-6E8A-4147-A177-3AD203B41FA5}">
+                      <a16:colId xmlns:a16="http://schemas.microsoft.com/office/drawing/2014/main" val="20001"/>
+                    </a:ext>
+                  </a:extLst>
+                </a:gridCol>
+              </a:tblGrid>
+              <a:tr h="0">
+                <a:tc>
+                  <a:txBody>
+                    <a:bodyPr/>
+                    <a:lstStyle/>
+                    <a:p>
+                      <a:pPr marL="0" lvl="0" indent="0" algn="l" rtl="0">
+                        <a:spcBef>
+                          <a:spcPts val="0"/>
+                        </a:spcBef>
+                        <a:spcAft>
+                          <a:spcPts val="0"/>
+                        </a:spcAft>
+                        <a:buNone/>
+                      </a:pPr>
+                      <a:r>
+                        <a:rPr lang="en" sz="1800" b="1" dirty="0"/>
+                        <a:t>Test Case</a:t>
+                      </a:r>
+                      <a:endParaRPr sz="1800" b="1" dirty="0"/>
+                    </a:p>
+                  </a:txBody>
+                  <a:tcPr marL="91425" marR="91425" marT="91425" marB="91425">
+                    <a:solidFill>
+                      <a:srgbClr val="CCCCCC"/>
+                    </a:solidFill>
+                  </a:tcPr>
+                </a:tc>
+                <a:tc>
+                  <a:txBody>
+                    <a:bodyPr/>
+                    <a:lstStyle/>
+                    <a:p>
+                      <a:pPr marL="0" lvl="0" indent="0" algn="l" rtl="0">
+                        <a:spcBef>
+                          <a:spcPts val="0"/>
+                        </a:spcBef>
+                        <a:spcAft>
+                          <a:spcPts val="0"/>
+                        </a:spcAft>
+                        <a:buNone/>
+                      </a:pPr>
+                      <a:r>
+                        <a:rPr lang="en" sz="1800" b="1" dirty="0"/>
+                        <a:t>Expected Values</a:t>
+                      </a:r>
+                      <a:endParaRPr sz="1800" b="1" dirty="0"/>
+                    </a:p>
+                  </a:txBody>
+                  <a:tcPr marL="91425" marR="91425" marT="91425" marB="91425">
+                    <a:solidFill>
+                      <a:srgbClr val="CCCCCC"/>
+                    </a:solidFill>
+                  </a:tcPr>
+                </a:tc>
+                <a:extLst>
+                  <a:ext uri="{0D108BD9-81ED-4DB2-BD59-A6C34878D82A}">
+                    <a16:rowId xmlns:a16="http://schemas.microsoft.com/office/drawing/2014/main" val="10000"/>
+                  </a:ext>
+                </a:extLst>
+              </a:tr>
+              <a:tr h="569141">
+                <a:tc>
+                  <a:txBody>
+                    <a:bodyPr/>
+                    <a:lstStyle/>
+                    <a:p>
+                      <a:pPr marL="0" lvl="0" indent="0" algn="l" rtl="0">
+                        <a:spcBef>
+                          <a:spcPts val="0"/>
+                        </a:spcBef>
+                        <a:spcAft>
+                          <a:spcPts val="0"/>
+                        </a:spcAft>
+                        <a:buNone/>
+                      </a:pPr>
+                      <a:r>
+                        <a:rPr lang="en-NZ" sz="1200" dirty="0"/>
+                        <a:t>Run file</a:t>
+                      </a:r>
+                      <a:endParaRPr sz="1200" dirty="0"/>
+                    </a:p>
+                  </a:txBody>
+                  <a:tcPr marL="91425" marR="91425" marT="91425" marB="91425"/>
+                </a:tc>
+                <a:tc>
+                  <a:txBody>
+                    <a:bodyPr/>
+                    <a:lstStyle/>
+                    <a:p>
+                      <a:pPr marL="0" lvl="0" indent="0" algn="l" rtl="0">
+                        <a:spcBef>
+                          <a:spcPts val="0"/>
+                        </a:spcBef>
+                        <a:spcAft>
+                          <a:spcPts val="0"/>
+                        </a:spcAft>
+                        <a:buNone/>
+                      </a:pPr>
+                      <a:r>
+                        <a:rPr lang="en-US" sz="1200" dirty="0"/>
+                        <a:t>Printed list with </a:t>
+                      </a:r>
+                      <a:r>
+                        <a:rPr lang="en-US" sz="1200"/>
+                        <a:t>index number, </a:t>
+                      </a:r>
+                      <a:r>
+                        <a:rPr lang="en-US" sz="1200" dirty="0"/>
+                        <a:t>pizzas and prices</a:t>
+                      </a:r>
+                    </a:p>
+                  </a:txBody>
+                  <a:tcPr marL="91425" marR="91425" marT="91425" marB="91425"/>
+                </a:tc>
+                <a:extLst>
+                  <a:ext uri="{0D108BD9-81ED-4DB2-BD59-A6C34878D82A}">
+                    <a16:rowId xmlns:a16="http://schemas.microsoft.com/office/drawing/2014/main" val="10001"/>
+                  </a:ext>
+                </a:extLst>
+              </a:tr>
+            </a:tbl>
+          </a:graphicData>
+        </a:graphic>
+      </p:graphicFrame>
+      <p:pic>
+        <p:nvPicPr>
+          <p:cNvPr id="4" name="Picture 3">
+            <a:extLst>
+              <a:ext uri="{FF2B5EF4-FFF2-40B4-BE49-F238E27FC236}">
+                <a16:creationId xmlns:a16="http://schemas.microsoft.com/office/drawing/2014/main" id="{4A5DD385-396B-4AAC-AE33-3EA87C771854}"/>
+              </a:ext>
+            </a:extLst>
+          </p:cNvPr>
+          <p:cNvPicPr>
+            <a:picLocks noChangeAspect="1"/>
+          </p:cNvPicPr>
+          <p:nvPr/>
+        </p:nvPicPr>
+        <p:blipFill>
+          <a:blip r:embed="rId3"/>
+          <a:stretch>
+            <a:fillRect/>
+          </a:stretch>
+        </p:blipFill>
+        <p:spPr>
+          <a:xfrm>
+            <a:off x="311700" y="918334"/>
+            <a:ext cx="4353405" cy="1377592"/>
+          </a:xfrm>
+          <a:prstGeom prst="rect">
+            <a:avLst/>
+          </a:prstGeom>
+        </p:spPr>
+      </p:pic>
+      <p:pic>
+        <p:nvPicPr>
+          <p:cNvPr id="8" name="Picture 7">
+            <a:extLst>
+              <a:ext uri="{FF2B5EF4-FFF2-40B4-BE49-F238E27FC236}">
+                <a16:creationId xmlns:a16="http://schemas.microsoft.com/office/drawing/2014/main" id="{EEC0B3A2-232E-46E8-A41E-305686FFAFA1}"/>
+              </a:ext>
+            </a:extLst>
+          </p:cNvPr>
+          <p:cNvPicPr>
+            <a:picLocks noChangeAspect="1"/>
+          </p:cNvPicPr>
+          <p:nvPr/>
+        </p:nvPicPr>
+        <p:blipFill>
+          <a:blip r:embed="rId4"/>
+          <a:stretch>
+            <a:fillRect/>
+          </a:stretch>
+        </p:blipFill>
+        <p:spPr>
+          <a:xfrm>
+            <a:off x="4952561" y="1137605"/>
+            <a:ext cx="3879739" cy="1920115"/>
+          </a:xfrm>
+          <a:prstGeom prst="rect">
+            <a:avLst/>
+          </a:prstGeom>
+        </p:spPr>
+      </p:pic>
+    </p:spTree>
+    <p:extLst>
+      <p:ext uri="{BB962C8B-B14F-4D97-AF65-F5344CB8AC3E}">
+        <p14:creationId xmlns:p14="http://schemas.microsoft.com/office/powerpoint/2010/main" val="3395803084"/>
+      </p:ext>
+    </p:extLst>
+  </p:cSld>
+  <p:clrMapOvr>
+    <a:masterClrMapping/>
+  </p:clrMapOvr>
+</p:sld>
+</file>
+
+<file path=ppt/slides/slide29.xml><?xml version="1.0" encoding="utf-8"?>
+<p:sld xmlns:a="http://schemas.openxmlformats.org/drawingml/2006/main" xmlns:r="http://schemas.openxmlformats.org/officeDocument/2006/relationships" xmlns:p="http://schemas.openxmlformats.org/presentationml/2006/main">
+  <p:cSld>
     <p:bg>
       <p:bgPr>
         <a:solidFill>
@@ -12695,85 +14610,6 @@
               <a:t>Your version control evidence should go here.  This could be in the form of annotated screenshots which show you you managed this process or you could make a brief screencast explaining how you implemented version control.</a:t>
             </a:r>
             <a:endParaRPr i="1"/>
-          </a:p>
-        </p:txBody>
-      </p:sp>
-    </p:spTree>
-  </p:cSld>
-  <p:clrMapOvr>
-    <a:masterClrMapping/>
-  </p:clrMapOvr>
-</p:sld>
-</file>
-
-<file path=ppt/slides/slide25.xml><?xml version="1.0" encoding="utf-8"?>
-<p:sld xmlns:a="http://schemas.openxmlformats.org/drawingml/2006/main" xmlns:r="http://schemas.openxmlformats.org/officeDocument/2006/relationships" xmlns:p="http://schemas.openxmlformats.org/presentationml/2006/main">
-  <p:cSld>
-    <p:bg>
-      <p:bgPr>
-        <a:solidFill>
-          <a:srgbClr val="FFE599"/>
-        </a:solidFill>
-        <a:effectLst/>
-      </p:bgPr>
-    </p:bg>
-    <p:spTree>
-      <p:nvGrpSpPr>
-        <p:cNvPr id="1" name="Shape 89"/>
-        <p:cNvGrpSpPr/>
-        <p:nvPr/>
-      </p:nvGrpSpPr>
-      <p:grpSpPr>
-        <a:xfrm>
-          <a:off x="0" y="0"/>
-          <a:ext cx="0" cy="0"/>
-          <a:chOff x="0" y="0"/>
-          <a:chExt cx="0" cy="0"/>
-        </a:xfrm>
-      </p:grpSpPr>
-      <p:sp>
-        <p:nvSpPr>
-          <p:cNvPr id="90" name="Google Shape;90;p19"/>
-          <p:cNvSpPr txBox="1">
-            <a:spLocks noGrp="1"/>
-          </p:cNvSpPr>
-          <p:nvPr>
-            <p:ph type="body" idx="1"/>
-          </p:nvPr>
-        </p:nvSpPr>
-        <p:spPr>
-          <a:xfrm>
-            <a:off x="311700" y="397700"/>
-            <a:ext cx="8520600" cy="4171200"/>
-          </a:xfrm>
-          <a:prstGeom prst="rect">
-            <a:avLst/>
-          </a:prstGeom>
-        </p:spPr>
-        <p:txBody>
-          <a:bodyPr spcFirstLastPara="1" wrap="square" lIns="91425" tIns="91425" rIns="91425" bIns="91425" anchor="t" anchorCtr="0">
-            <a:noAutofit/>
-          </a:bodyPr>
-          <a:lstStyle/>
-          <a:p>
-            <a:pPr marL="0" lvl="0" indent="0" algn="l" rtl="0">
-              <a:spcBef>
-                <a:spcPts val="0"/>
-              </a:spcBef>
-              <a:spcAft>
-                <a:spcPts val="1600"/>
-              </a:spcAft>
-              <a:buNone/>
-            </a:pPr>
-            <a:r>
-              <a:rPr lang="en" b="1" i="1">
-                <a:solidFill>
-                  <a:srgbClr val="595959"/>
-                </a:solidFill>
-              </a:rPr>
-              <a:t>Discusses how the information from planning, testing and trialling of components assisted in the development of a high-quality outcome</a:t>
-            </a:r>
-            <a:endParaRPr/>
           </a:p>
         </p:txBody>
       </p:sp>
@@ -12924,6 +14760,85 @@
           </a:prstGeom>
         </p:spPr>
       </p:pic>
+    </p:spTree>
+  </p:cSld>
+  <p:clrMapOvr>
+    <a:masterClrMapping/>
+  </p:clrMapOvr>
+</p:sld>
+</file>
+
+<file path=ppt/slides/slide30.xml><?xml version="1.0" encoding="utf-8"?>
+<p:sld xmlns:a="http://schemas.openxmlformats.org/drawingml/2006/main" xmlns:r="http://schemas.openxmlformats.org/officeDocument/2006/relationships" xmlns:p="http://schemas.openxmlformats.org/presentationml/2006/main">
+  <p:cSld>
+    <p:bg>
+      <p:bgPr>
+        <a:solidFill>
+          <a:srgbClr val="FFE599"/>
+        </a:solidFill>
+        <a:effectLst/>
+      </p:bgPr>
+    </p:bg>
+    <p:spTree>
+      <p:nvGrpSpPr>
+        <p:cNvPr id="1" name="Shape 89"/>
+        <p:cNvGrpSpPr/>
+        <p:nvPr/>
+      </p:nvGrpSpPr>
+      <p:grpSpPr>
+        <a:xfrm>
+          <a:off x="0" y="0"/>
+          <a:ext cx="0" cy="0"/>
+          <a:chOff x="0" y="0"/>
+          <a:chExt cx="0" cy="0"/>
+        </a:xfrm>
+      </p:grpSpPr>
+      <p:sp>
+        <p:nvSpPr>
+          <p:cNvPr id="90" name="Google Shape;90;p19"/>
+          <p:cNvSpPr txBox="1">
+            <a:spLocks noGrp="1"/>
+          </p:cNvSpPr>
+          <p:nvPr>
+            <p:ph type="body" idx="1"/>
+          </p:nvPr>
+        </p:nvSpPr>
+        <p:spPr>
+          <a:xfrm>
+            <a:off x="311700" y="397700"/>
+            <a:ext cx="8520600" cy="4171200"/>
+          </a:xfrm>
+          <a:prstGeom prst="rect">
+            <a:avLst/>
+          </a:prstGeom>
+        </p:spPr>
+        <p:txBody>
+          <a:bodyPr spcFirstLastPara="1" wrap="square" lIns="91425" tIns="91425" rIns="91425" bIns="91425" anchor="t" anchorCtr="0">
+            <a:noAutofit/>
+          </a:bodyPr>
+          <a:lstStyle/>
+          <a:p>
+            <a:pPr marL="0" lvl="0" indent="0" algn="l" rtl="0">
+              <a:spcBef>
+                <a:spcPts val="0"/>
+              </a:spcBef>
+              <a:spcAft>
+                <a:spcPts val="1600"/>
+              </a:spcAft>
+              <a:buNone/>
+            </a:pPr>
+            <a:r>
+              <a:rPr lang="en" b="1" i="1">
+                <a:solidFill>
+                  <a:srgbClr val="595959"/>
+                </a:solidFill>
+              </a:rPr>
+              <a:t>Discusses how the information from planning, testing and trialling of components assisted in the development of a high-quality outcome</a:t>
+            </a:r>
+            <a:endParaRPr/>
+          </a:p>
+        </p:txBody>
+      </p:sp>
     </p:spTree>
   </p:cSld>
   <p:clrMapOvr>

</xml_diff>